<commit_message>
Random sheets erin geplakt dit lijkt nog nergens op
</commit_message>
<xml_diff>
--- a/presentatie.pptx
+++ b/presentatie.pptx
@@ -9,8 +9,16 @@
     <p:sldId id="257" r:id="rId3"/>
     <p:sldId id="258" r:id="rId4"/>
     <p:sldId id="259" r:id="rId5"/>
-    <p:sldId id="260" r:id="rId6"/>
-    <p:sldId id="261" r:id="rId7"/>
+    <p:sldId id="262" r:id="rId6"/>
+    <p:sldId id="263" r:id="rId7"/>
+    <p:sldId id="264" r:id="rId8"/>
+    <p:sldId id="265" r:id="rId9"/>
+    <p:sldId id="266" r:id="rId10"/>
+    <p:sldId id="267" r:id="rId11"/>
+    <p:sldId id="268" r:id="rId12"/>
+    <p:sldId id="269" r:id="rId13"/>
+    <p:sldId id="260" r:id="rId14"/>
+    <p:sldId id="261" r:id="rId15"/>
   </p:sldIdLst>
   <p:sldSz cx="9144000" cy="6858000" type="screen4x3"/>
   <p:notesSz cx="6858000" cy="9144000"/>
@@ -5076,6 +5084,523 @@
 </p:sld>
 </file>
 
+<file path=ppt/slides/slide10.xml><?xml version="1.0" encoding="utf-8"?>
+<p:sld xmlns:a="http://schemas.openxmlformats.org/drawingml/2006/main" xmlns:r="http://schemas.openxmlformats.org/officeDocument/2006/relationships" xmlns:p="http://schemas.openxmlformats.org/presentationml/2006/main">
+  <p:cSld>
+    <p:spTree>
+      <p:nvGrpSpPr>
+        <p:cNvPr id="1" name=""/>
+        <p:cNvGrpSpPr/>
+        <p:nvPr/>
+      </p:nvGrpSpPr>
+      <p:grpSpPr>
+        <a:xfrm>
+          <a:off x="0" y="0"/>
+          <a:ext cx="0" cy="0"/>
+          <a:chOff x="0" y="0"/>
+          <a:chExt cx="0" cy="0"/>
+        </a:xfrm>
+      </p:grpSpPr>
+      <p:sp>
+        <p:nvSpPr>
+          <p:cNvPr id="2" name="Titel 1"/>
+          <p:cNvSpPr>
+            <a:spLocks noGrp="1"/>
+          </p:cNvSpPr>
+          <p:nvPr>
+            <p:ph type="title"/>
+          </p:nvPr>
+        </p:nvSpPr>
+        <p:spPr/>
+        <p:txBody>
+          <a:bodyPr/>
+          <a:lstStyle/>
+          <a:p>
+            <a:r>
+              <a:rPr lang="nl-NL" dirty="0" smtClean="0"/>
+              <a:t>Bootjeswinkel</a:t>
+            </a:r>
+            <a:endParaRPr lang="nl-NL" dirty="0"/>
+          </a:p>
+        </p:txBody>
+      </p:sp>
+      <p:sp>
+        <p:nvSpPr>
+          <p:cNvPr id="3" name="Tijdelijke aanduiding voor inhoud 2"/>
+          <p:cNvSpPr>
+            <a:spLocks noGrp="1"/>
+          </p:cNvSpPr>
+          <p:nvPr>
+            <p:ph idx="1"/>
+          </p:nvPr>
+        </p:nvSpPr>
+        <p:spPr/>
+        <p:txBody>
+          <a:bodyPr/>
+          <a:lstStyle/>
+          <a:p>
+            <a:r>
+              <a:rPr lang="nl-NL" dirty="0" smtClean="0"/>
+              <a:t>HTML code genereren met </a:t>
+            </a:r>
+            <a:r>
+              <a:rPr lang="nl-NL" dirty="0" err="1" smtClean="0"/>
+              <a:t>jquery</a:t>
+            </a:r>
+            <a:endParaRPr lang="nl-NL" dirty="0" smtClean="0"/>
+          </a:p>
+          <a:p>
+            <a:pPr lvl="1"/>
+            <a:r>
+              <a:rPr lang="nl-NL" dirty="0" smtClean="0"/>
+              <a:t>Code?</a:t>
+            </a:r>
+            <a:endParaRPr lang="nl-NL" dirty="0"/>
+          </a:p>
+        </p:txBody>
+      </p:sp>
+    </p:spTree>
+    <p:extLst>
+      <p:ext uri="{BB962C8B-B14F-4D97-AF65-F5344CB8AC3E}">
+        <p14:creationId xmlns:p14="http://schemas.microsoft.com/office/powerpoint/2010/main" val="4216259755"/>
+      </p:ext>
+    </p:extLst>
+  </p:cSld>
+  <p:clrMapOvr>
+    <a:masterClrMapping/>
+  </p:clrMapOvr>
+</p:sld>
+</file>
+
+<file path=ppt/slides/slide11.xml><?xml version="1.0" encoding="utf-8"?>
+<p:sld xmlns:a="http://schemas.openxmlformats.org/drawingml/2006/main" xmlns:r="http://schemas.openxmlformats.org/officeDocument/2006/relationships" xmlns:p="http://schemas.openxmlformats.org/presentationml/2006/main">
+  <p:cSld>
+    <p:spTree>
+      <p:nvGrpSpPr>
+        <p:cNvPr id="1" name=""/>
+        <p:cNvGrpSpPr/>
+        <p:nvPr/>
+      </p:nvGrpSpPr>
+      <p:grpSpPr>
+        <a:xfrm>
+          <a:off x="0" y="0"/>
+          <a:ext cx="0" cy="0"/>
+          <a:chOff x="0" y="0"/>
+          <a:chExt cx="0" cy="0"/>
+        </a:xfrm>
+      </p:grpSpPr>
+      <p:sp>
+        <p:nvSpPr>
+          <p:cNvPr id="2" name="Titel 1"/>
+          <p:cNvSpPr>
+            <a:spLocks noGrp="1"/>
+          </p:cNvSpPr>
+          <p:nvPr>
+            <p:ph type="title"/>
+          </p:nvPr>
+        </p:nvSpPr>
+        <p:spPr/>
+        <p:txBody>
+          <a:bodyPr/>
+          <a:lstStyle/>
+          <a:p>
+            <a:r>
+              <a:rPr lang="nl-NL" dirty="0" smtClean="0"/>
+              <a:t>Bootjeswinkel</a:t>
+            </a:r>
+            <a:endParaRPr lang="nl-NL" dirty="0"/>
+          </a:p>
+        </p:txBody>
+      </p:sp>
+      <p:sp>
+        <p:nvSpPr>
+          <p:cNvPr id="3" name="Tijdelijke aanduiding voor inhoud 2"/>
+          <p:cNvSpPr>
+            <a:spLocks noGrp="1"/>
+          </p:cNvSpPr>
+          <p:nvPr>
+            <p:ph idx="1"/>
+          </p:nvPr>
+        </p:nvSpPr>
+        <p:spPr/>
+        <p:txBody>
+          <a:bodyPr/>
+          <a:lstStyle/>
+          <a:p>
+            <a:r>
+              <a:rPr lang="nl-NL" dirty="0" smtClean="0"/>
+              <a:t>Updaten van de pagina met </a:t>
+            </a:r>
+            <a:r>
+              <a:rPr lang="nl-NL" dirty="0" err="1" smtClean="0"/>
+              <a:t>jquery</a:t>
+            </a:r>
+            <a:r>
+              <a:rPr lang="nl-NL" dirty="0" smtClean="0"/>
+              <a:t> (en </a:t>
+            </a:r>
+            <a:r>
+              <a:rPr lang="nl-NL" dirty="0" err="1" smtClean="0"/>
+              <a:t>recursie</a:t>
+            </a:r>
+            <a:r>
+              <a:rPr lang="nl-NL" dirty="0" smtClean="0"/>
+              <a:t>… spannend)</a:t>
+            </a:r>
+          </a:p>
+          <a:p>
+            <a:pPr lvl="1"/>
+            <a:r>
+              <a:rPr lang="nl-NL" dirty="0" smtClean="0"/>
+              <a:t>Code?</a:t>
+            </a:r>
+            <a:endParaRPr lang="nl-NL" dirty="0"/>
+          </a:p>
+        </p:txBody>
+      </p:sp>
+    </p:spTree>
+    <p:extLst>
+      <p:ext uri="{BB962C8B-B14F-4D97-AF65-F5344CB8AC3E}">
+        <p14:creationId xmlns:p14="http://schemas.microsoft.com/office/powerpoint/2010/main" val="3997746775"/>
+      </p:ext>
+    </p:extLst>
+  </p:cSld>
+  <p:clrMapOvr>
+    <a:masterClrMapping/>
+  </p:clrMapOvr>
+</p:sld>
+</file>
+
+<file path=ppt/slides/slide12.xml><?xml version="1.0" encoding="utf-8"?>
+<p:sld xmlns:a="http://schemas.openxmlformats.org/drawingml/2006/main" xmlns:r="http://schemas.openxmlformats.org/officeDocument/2006/relationships" xmlns:p="http://schemas.openxmlformats.org/presentationml/2006/main">
+  <p:cSld>
+    <p:spTree>
+      <p:nvGrpSpPr>
+        <p:cNvPr id="1" name=""/>
+        <p:cNvGrpSpPr/>
+        <p:nvPr/>
+      </p:nvGrpSpPr>
+      <p:grpSpPr>
+        <a:xfrm>
+          <a:off x="0" y="0"/>
+          <a:ext cx="0" cy="0"/>
+          <a:chOff x="0" y="0"/>
+          <a:chExt cx="0" cy="0"/>
+        </a:xfrm>
+      </p:grpSpPr>
+      <p:sp>
+        <p:nvSpPr>
+          <p:cNvPr id="2" name="Titel 1"/>
+          <p:cNvSpPr>
+            <a:spLocks noGrp="1"/>
+          </p:cNvSpPr>
+          <p:nvPr>
+            <p:ph type="title"/>
+          </p:nvPr>
+        </p:nvSpPr>
+        <p:spPr/>
+        <p:txBody>
+          <a:bodyPr/>
+          <a:lstStyle/>
+          <a:p>
+            <a:r>
+              <a:rPr lang="nl-NL" dirty="0" smtClean="0"/>
+              <a:t>Wat hebben we/ ik geleerd</a:t>
+            </a:r>
+            <a:endParaRPr lang="nl-NL" dirty="0"/>
+          </a:p>
+        </p:txBody>
+      </p:sp>
+      <p:sp>
+        <p:nvSpPr>
+          <p:cNvPr id="3" name="Tijdelijke aanduiding voor inhoud 2"/>
+          <p:cNvSpPr>
+            <a:spLocks noGrp="1"/>
+          </p:cNvSpPr>
+          <p:nvPr>
+            <p:ph idx="1"/>
+          </p:nvPr>
+        </p:nvSpPr>
+        <p:spPr/>
+        <p:txBody>
+          <a:bodyPr>
+            <a:normAutofit fontScale="92500" lnSpcReduction="20000"/>
+          </a:bodyPr>
+          <a:lstStyle/>
+          <a:p>
+            <a:r>
+              <a:rPr lang="nl-NL" dirty="0" smtClean="0"/>
+              <a:t>Hele hoop nieuwe technieken </a:t>
+            </a:r>
+            <a:r>
+              <a:rPr lang="nl-NL" dirty="0" err="1" smtClean="0"/>
+              <a:t>ofc</a:t>
+            </a:r>
+            <a:r>
+              <a:rPr lang="nl-NL" dirty="0" smtClean="0"/>
+              <a:t> (</a:t>
+            </a:r>
+            <a:r>
+              <a:rPr lang="nl-NL" dirty="0" err="1" smtClean="0"/>
+              <a:t>java</a:t>
+            </a:r>
+            <a:r>
+              <a:rPr lang="nl-NL" dirty="0" smtClean="0"/>
+              <a:t> kon ik al een beetje, maar de rest nog niet. Ik vond ook de volgorde best fijn, ondanks dat we eerst een hele hoop “oude” dingen hebben geleerd)</a:t>
+            </a:r>
+          </a:p>
+          <a:p>
+            <a:r>
+              <a:rPr lang="nl-NL" dirty="0" smtClean="0"/>
+              <a:t>Het is fijn om een direct line of </a:t>
+            </a:r>
+            <a:r>
+              <a:rPr lang="nl-NL" dirty="0" err="1" smtClean="0"/>
+              <a:t>communication</a:t>
+            </a:r>
+            <a:r>
+              <a:rPr lang="nl-NL" dirty="0" smtClean="0"/>
+              <a:t> te hebben met je medeprogrammeurs.</a:t>
+            </a:r>
+          </a:p>
+          <a:p>
+            <a:r>
+              <a:rPr lang="nl-NL" dirty="0" smtClean="0"/>
+              <a:t>Git is handig, maar soms verwarrend</a:t>
+            </a:r>
+          </a:p>
+          <a:p>
+            <a:r>
+              <a:rPr lang="nl-NL" dirty="0" smtClean="0"/>
+              <a:t>Ik ben niet heel goed in het overzicht van alles bewaren. Ik zou </a:t>
+            </a:r>
+            <a:r>
+              <a:rPr lang="nl-NL" dirty="0" err="1" smtClean="0"/>
+              <a:t>gestructureerder</a:t>
+            </a:r>
+            <a:r>
+              <a:rPr lang="nl-NL" dirty="0" smtClean="0"/>
+              <a:t> aan de slag gaan, met duidelijke naamgeving, en verschillende code apart (geen javascript tussen de html </a:t>
+            </a:r>
+            <a:r>
+              <a:rPr lang="nl-NL" dirty="0" err="1" smtClean="0"/>
+              <a:t>enzo</a:t>
+            </a:r>
+            <a:r>
+              <a:rPr lang="nl-NL" dirty="0" smtClean="0"/>
+              <a:t>). En dingen documenteren! Dat deed ik nog heel braaf op dag 1 (en </a:t>
+            </a:r>
+            <a:r>
+              <a:rPr lang="nl-NL" dirty="0" err="1" smtClean="0"/>
+              <a:t>mss</a:t>
+            </a:r>
+            <a:r>
+              <a:rPr lang="nl-NL" dirty="0" smtClean="0"/>
+              <a:t> 2), maar daarna niet echt meer, terwijl dat echt nuttig is naderhand, of als je teamgenoot met jouw code wil werken.</a:t>
+            </a:r>
+          </a:p>
+          <a:p>
+            <a:r>
+              <a:rPr lang="nl-NL" dirty="0" smtClean="0"/>
+              <a:t>…</a:t>
+            </a:r>
+            <a:endParaRPr lang="nl-NL" dirty="0"/>
+          </a:p>
+        </p:txBody>
+      </p:sp>
+    </p:spTree>
+    <p:extLst>
+      <p:ext uri="{BB962C8B-B14F-4D97-AF65-F5344CB8AC3E}">
+        <p14:creationId xmlns:p14="http://schemas.microsoft.com/office/powerpoint/2010/main" val="3961685479"/>
+      </p:ext>
+    </p:extLst>
+  </p:cSld>
+  <p:clrMapOvr>
+    <a:masterClrMapping/>
+  </p:clrMapOvr>
+</p:sld>
+</file>
+
+<file path=ppt/slides/slide13.xml><?xml version="1.0" encoding="utf-8"?>
+<p:sld xmlns:a="http://schemas.openxmlformats.org/drawingml/2006/main" xmlns:r="http://schemas.openxmlformats.org/officeDocument/2006/relationships" xmlns:p="http://schemas.openxmlformats.org/presentationml/2006/main">
+  <p:cSld>
+    <p:spTree>
+      <p:nvGrpSpPr>
+        <p:cNvPr id="1" name=""/>
+        <p:cNvGrpSpPr/>
+        <p:nvPr/>
+      </p:nvGrpSpPr>
+      <p:grpSpPr>
+        <a:xfrm>
+          <a:off x="0" y="0"/>
+          <a:ext cx="0" cy="0"/>
+          <a:chOff x="0" y="0"/>
+          <a:chExt cx="0" cy="0"/>
+        </a:xfrm>
+      </p:grpSpPr>
+      <p:sp>
+        <p:nvSpPr>
+          <p:cNvPr id="2" name="Titel 1"/>
+          <p:cNvSpPr>
+            <a:spLocks noGrp="1"/>
+          </p:cNvSpPr>
+          <p:nvPr>
+            <p:ph type="title"/>
+          </p:nvPr>
+        </p:nvSpPr>
+        <p:spPr/>
+        <p:txBody>
+          <a:bodyPr/>
+          <a:lstStyle/>
+          <a:p>
+            <a:r>
+              <a:rPr lang="nl-NL" dirty="0" smtClean="0"/>
+              <a:t>Hoe kon het beter</a:t>
+            </a:r>
+            <a:endParaRPr lang="nl-NL" dirty="0"/>
+          </a:p>
+        </p:txBody>
+      </p:sp>
+      <p:sp>
+        <p:nvSpPr>
+          <p:cNvPr id="3" name="Tijdelijke aanduiding voor inhoud 2"/>
+          <p:cNvSpPr>
+            <a:spLocks noGrp="1"/>
+          </p:cNvSpPr>
+          <p:nvPr>
+            <p:ph sz="quarter" idx="1"/>
+          </p:nvPr>
+        </p:nvSpPr>
+        <p:spPr/>
+        <p:txBody>
+          <a:bodyPr/>
+          <a:lstStyle/>
+          <a:p>
+            <a:r>
+              <a:rPr lang="nl-NL" dirty="0" smtClean="0"/>
+              <a:t>Structuur in </a:t>
+            </a:r>
+            <a:r>
+              <a:rPr lang="nl-NL" dirty="0" err="1" smtClean="0"/>
+              <a:t>to</a:t>
+            </a:r>
+            <a:r>
+              <a:rPr lang="nl-NL" dirty="0" smtClean="0"/>
+              <a:t>-do</a:t>
+            </a:r>
+          </a:p>
+          <a:p>
+            <a:r>
+              <a:rPr lang="nl-NL" dirty="0" smtClean="0"/>
+              <a:t>Iets </a:t>
+            </a:r>
+            <a:endParaRPr lang="nl-NL" dirty="0"/>
+          </a:p>
+        </p:txBody>
+      </p:sp>
+    </p:spTree>
+    <p:extLst>
+      <p:ext uri="{BB962C8B-B14F-4D97-AF65-F5344CB8AC3E}">
+        <p14:creationId xmlns:p14="http://schemas.microsoft.com/office/powerpoint/2010/main" val="3070980931"/>
+      </p:ext>
+    </p:extLst>
+  </p:cSld>
+  <p:clrMapOvr>
+    <a:masterClrMapping/>
+  </p:clrMapOvr>
+  <p:timing>
+    <p:tnLst>
+      <p:par>
+        <p:cTn id="1" dur="indefinite" restart="never" nodeType="tmRoot"/>
+      </p:par>
+    </p:tnLst>
+  </p:timing>
+</p:sld>
+</file>
+
+<file path=ppt/slides/slide14.xml><?xml version="1.0" encoding="utf-8"?>
+<p:sld xmlns:a="http://schemas.openxmlformats.org/drawingml/2006/main" xmlns:r="http://schemas.openxmlformats.org/officeDocument/2006/relationships" xmlns:p="http://schemas.openxmlformats.org/presentationml/2006/main">
+  <p:cSld>
+    <p:spTree>
+      <p:nvGrpSpPr>
+        <p:cNvPr id="1" name=""/>
+        <p:cNvGrpSpPr/>
+        <p:nvPr/>
+      </p:nvGrpSpPr>
+      <p:grpSpPr>
+        <a:xfrm>
+          <a:off x="0" y="0"/>
+          <a:ext cx="0" cy="0"/>
+          <a:chOff x="0" y="0"/>
+          <a:chExt cx="0" cy="0"/>
+        </a:xfrm>
+      </p:grpSpPr>
+      <p:sp>
+        <p:nvSpPr>
+          <p:cNvPr id="2" name="Titel 1"/>
+          <p:cNvSpPr>
+            <a:spLocks noGrp="1"/>
+          </p:cNvSpPr>
+          <p:nvPr>
+            <p:ph type="title"/>
+          </p:nvPr>
+        </p:nvSpPr>
+        <p:spPr/>
+        <p:txBody>
+          <a:bodyPr/>
+          <a:lstStyle/>
+          <a:p>
+            <a:r>
+              <a:rPr lang="nl-NL" dirty="0" smtClean="0"/>
+              <a:t>Mooi nawoord</a:t>
+            </a:r>
+            <a:endParaRPr lang="nl-NL" dirty="0"/>
+          </a:p>
+        </p:txBody>
+      </p:sp>
+      <p:sp>
+        <p:nvSpPr>
+          <p:cNvPr id="3" name="Tijdelijke aanduiding voor inhoud 2"/>
+          <p:cNvSpPr>
+            <a:spLocks noGrp="1"/>
+          </p:cNvSpPr>
+          <p:nvPr>
+            <p:ph sz="quarter" idx="1"/>
+          </p:nvPr>
+        </p:nvSpPr>
+        <p:spPr/>
+        <p:txBody>
+          <a:bodyPr/>
+          <a:lstStyle/>
+          <a:p>
+            <a:r>
+              <a:rPr lang="nl-NL" dirty="0" smtClean="0"/>
+              <a:t>Dit is echt helemaal mooi</a:t>
+            </a:r>
+            <a:endParaRPr lang="nl-NL" dirty="0"/>
+          </a:p>
+        </p:txBody>
+      </p:sp>
+    </p:spTree>
+    <p:extLst>
+      <p:ext uri="{BB962C8B-B14F-4D97-AF65-F5344CB8AC3E}">
+        <p14:creationId xmlns:p14="http://schemas.microsoft.com/office/powerpoint/2010/main" val="273009132"/>
+      </p:ext>
+    </p:extLst>
+  </p:cSld>
+  <p:clrMapOvr>
+    <a:masterClrMapping/>
+  </p:clrMapOvr>
+  <p:timing>
+    <p:tnLst>
+      <p:par>
+        <p:cTn id="1" dur="indefinite" restart="never" nodeType="tmRoot"/>
+      </p:par>
+    </p:tnLst>
+  </p:timing>
+</p:sld>
+</file>
+
 <file path=ppt/slides/slide2.xml><?xml version="1.0" encoding="utf-8"?>
 <p:sld xmlns:a="http://schemas.openxmlformats.org/drawingml/2006/main" xmlns:r="http://schemas.openxmlformats.org/officeDocument/2006/relationships" xmlns:p="http://schemas.openxmlformats.org/presentationml/2006/main">
   <p:cSld>
@@ -5418,6 +5943,35 @@
           <a:chExt cx="0" cy="0"/>
         </a:xfrm>
       </p:grpSpPr>
+      <p:pic>
+        <p:nvPicPr>
+          <p:cNvPr id="4" name="Tijdelijke aanduiding voor inhoud 3"/>
+          <p:cNvPicPr>
+            <a:picLocks noGrp="1" noChangeAspect="1"/>
+          </p:cNvPicPr>
+          <p:nvPr>
+            <p:ph idx="1"/>
+          </p:nvPr>
+        </p:nvPicPr>
+        <p:blipFill>
+          <a:blip r:embed="rId2">
+            <a:extLst>
+              <a:ext uri="{28A0092B-C50C-407E-A947-70E740481C1C}">
+                <a14:useLocalDpi xmlns:a14="http://schemas.microsoft.com/office/drawing/2010/main" val="0"/>
+              </a:ext>
+            </a:extLst>
+          </a:blip>
+          <a:stretch>
+            <a:fillRect/>
+          </a:stretch>
+        </p:blipFill>
+        <p:spPr>
+          <a:xfrm>
+            <a:off x="107504" y="1124744"/>
+            <a:ext cx="5534761" cy="4525963"/>
+          </a:xfrm>
+        </p:spPr>
+      </p:pic>
       <p:sp>
         <p:nvSpPr>
           <p:cNvPr id="2" name="Titel 1"/>
@@ -5435,66 +5989,52 @@
           <a:p>
             <a:r>
               <a:rPr lang="nl-NL" dirty="0" smtClean="0"/>
-              <a:t>Hoe kon het beter</a:t>
+              <a:t>Originele klassendiagrammen</a:t>
             </a:r>
             <a:endParaRPr lang="nl-NL" dirty="0"/>
           </a:p>
         </p:txBody>
       </p:sp>
-      <p:sp>
-        <p:nvSpPr>
-          <p:cNvPr id="3" name="Tijdelijke aanduiding voor inhoud 2"/>
-          <p:cNvSpPr>
-            <a:spLocks noGrp="1"/>
-          </p:cNvSpPr>
-          <p:nvPr>
-            <p:ph sz="quarter" idx="1"/>
-          </p:nvPr>
-        </p:nvSpPr>
-        <p:spPr/>
-        <p:txBody>
-          <a:bodyPr/>
-          <a:lstStyle/>
-          <a:p>
-            <a:r>
-              <a:rPr lang="nl-NL" dirty="0" smtClean="0"/>
-              <a:t>Structuur in </a:t>
-            </a:r>
-            <a:r>
-              <a:rPr lang="nl-NL" dirty="0" err="1" smtClean="0"/>
-              <a:t>to</a:t>
-            </a:r>
-            <a:r>
-              <a:rPr lang="nl-NL" dirty="0" smtClean="0"/>
-              <a:t>-do</a:t>
-            </a:r>
-          </a:p>
-          <a:p>
-            <a:r>
-              <a:rPr lang="nl-NL" dirty="0" smtClean="0"/>
-              <a:t>Iets </a:t>
-            </a:r>
-            <a:endParaRPr lang="nl-NL" dirty="0"/>
-          </a:p>
-        </p:txBody>
-      </p:sp>
+      <p:pic>
+        <p:nvPicPr>
+          <p:cNvPr id="5" name="Afbeelding 4"/>
+          <p:cNvPicPr>
+            <a:picLocks noChangeAspect="1"/>
+          </p:cNvPicPr>
+          <p:nvPr/>
+        </p:nvPicPr>
+        <p:blipFill>
+          <a:blip r:embed="rId3">
+            <a:extLst>
+              <a:ext uri="{28A0092B-C50C-407E-A947-70E740481C1C}">
+                <a14:useLocalDpi xmlns:a14="http://schemas.microsoft.com/office/drawing/2010/main" val="0"/>
+              </a:ext>
+            </a:extLst>
+          </a:blip>
+          <a:stretch>
+            <a:fillRect/>
+          </a:stretch>
+        </p:blipFill>
+        <p:spPr>
+          <a:xfrm>
+            <a:off x="4427984" y="4450482"/>
+            <a:ext cx="4667250" cy="2533650"/>
+          </a:xfrm>
+          <a:prstGeom prst="rect">
+            <a:avLst/>
+          </a:prstGeom>
+        </p:spPr>
+      </p:pic>
     </p:spTree>
     <p:extLst>
       <p:ext uri="{BB962C8B-B14F-4D97-AF65-F5344CB8AC3E}">
-        <p14:creationId xmlns:p14="http://schemas.microsoft.com/office/powerpoint/2010/main" val="3070980931"/>
+        <p14:creationId xmlns:p14="http://schemas.microsoft.com/office/powerpoint/2010/main" val="1569959721"/>
       </p:ext>
     </p:extLst>
   </p:cSld>
   <p:clrMapOvr>
     <a:masterClrMapping/>
   </p:clrMapOvr>
-  <p:timing>
-    <p:tnLst>
-      <p:par>
-        <p:cTn id="1" dur="indefinite" restart="never" nodeType="tmRoot"/>
-      </p:par>
-    </p:tnLst>
-  </p:timing>
 </p:sld>
 </file>
 
@@ -5532,7 +6072,7 @@
           <a:p>
             <a:r>
               <a:rPr lang="nl-NL" dirty="0" smtClean="0"/>
-              <a:t>Mooi nawoord</a:t>
+              <a:t>Uiteindelijk klassendiagram</a:t>
             </a:r>
             <a:endParaRPr lang="nl-NL" dirty="0"/>
           </a:p>
@@ -5545,7 +6085,7 @@
             <a:spLocks noGrp="1"/>
           </p:cNvSpPr>
           <p:nvPr>
-            <p:ph sz="quarter" idx="1"/>
+            <p:ph idx="1"/>
           </p:nvPr>
         </p:nvSpPr>
         <p:spPr/>
@@ -5555,7 +6095,34 @@
           <a:p>
             <a:r>
               <a:rPr lang="nl-NL" dirty="0" smtClean="0"/>
-              <a:t>Dit is echt helemaal mooi</a:t>
+              <a:t>Moet je nog tekenen! Maar doe maar alleen van de model klassen, niet van de controllers enz.</a:t>
+            </a:r>
+          </a:p>
+          <a:p>
+            <a:r>
+              <a:rPr lang="nl-NL" dirty="0" smtClean="0"/>
+              <a:t>Waarom is dat anders?</a:t>
+            </a:r>
+          </a:p>
+          <a:p>
+            <a:pPr lvl="1"/>
+            <a:r>
+              <a:rPr lang="nl-NL" dirty="0" smtClean="0"/>
+              <a:t>Tijdsgebrek</a:t>
+            </a:r>
+          </a:p>
+          <a:p>
+            <a:pPr lvl="1"/>
+            <a:r>
+              <a:rPr lang="nl-NL" dirty="0" smtClean="0"/>
+              <a:t>Praktische overwegingen (windstreek weg, bordkolom erbij)</a:t>
+            </a:r>
+          </a:p>
+          <a:p>
+            <a:pPr lvl="1"/>
+            <a:r>
+              <a:rPr lang="nl-NL" smtClean="0"/>
+              <a:t>…</a:t>
             </a:r>
             <a:endParaRPr lang="nl-NL" dirty="0"/>
           </a:p>
@@ -5564,20 +6131,328 @@
     </p:spTree>
     <p:extLst>
       <p:ext uri="{BB962C8B-B14F-4D97-AF65-F5344CB8AC3E}">
-        <p14:creationId xmlns:p14="http://schemas.microsoft.com/office/powerpoint/2010/main" val="273009132"/>
+        <p14:creationId xmlns:p14="http://schemas.microsoft.com/office/powerpoint/2010/main" val="923071329"/>
       </p:ext>
     </p:extLst>
   </p:cSld>
   <p:clrMapOvr>
     <a:masterClrMapping/>
   </p:clrMapOvr>
-  <p:timing>
-    <p:tnLst>
-      <p:par>
-        <p:cTn id="1" dur="indefinite" restart="never" nodeType="tmRoot"/>
-      </p:par>
-    </p:tnLst>
-  </p:timing>
+</p:sld>
+</file>
+
+<file path=ppt/slides/slide7.xml><?xml version="1.0" encoding="utf-8"?>
+<p:sld xmlns:a="http://schemas.openxmlformats.org/drawingml/2006/main" xmlns:r="http://schemas.openxmlformats.org/officeDocument/2006/relationships" xmlns:p="http://schemas.openxmlformats.org/presentationml/2006/main">
+  <p:cSld>
+    <p:spTree>
+      <p:nvGrpSpPr>
+        <p:cNvPr id="1" name=""/>
+        <p:cNvGrpSpPr/>
+        <p:nvPr/>
+      </p:nvGrpSpPr>
+      <p:grpSpPr>
+        <a:xfrm>
+          <a:off x="0" y="0"/>
+          <a:ext cx="0" cy="0"/>
+          <a:chOff x="0" y="0"/>
+          <a:chExt cx="0" cy="0"/>
+        </a:xfrm>
+      </p:grpSpPr>
+      <p:sp>
+        <p:nvSpPr>
+          <p:cNvPr id="2" name="Titel 1"/>
+          <p:cNvSpPr>
+            <a:spLocks noGrp="1"/>
+          </p:cNvSpPr>
+          <p:nvPr>
+            <p:ph type="title"/>
+          </p:nvPr>
+        </p:nvSpPr>
+        <p:spPr/>
+        <p:txBody>
+          <a:bodyPr/>
+          <a:lstStyle/>
+          <a:p>
+            <a:r>
+              <a:rPr lang="nl-NL" dirty="0" smtClean="0"/>
+              <a:t>Bootjeswinkel</a:t>
+            </a:r>
+            <a:endParaRPr lang="nl-NL" dirty="0"/>
+          </a:p>
+        </p:txBody>
+      </p:sp>
+      <p:sp>
+        <p:nvSpPr>
+          <p:cNvPr id="3" name="Tijdelijke aanduiding voor inhoud 2"/>
+          <p:cNvSpPr>
+            <a:spLocks noGrp="1"/>
+          </p:cNvSpPr>
+          <p:nvPr>
+            <p:ph idx="1"/>
+          </p:nvPr>
+        </p:nvSpPr>
+        <p:spPr/>
+        <p:txBody>
+          <a:bodyPr/>
+          <a:lstStyle/>
+          <a:p>
+            <a:r>
+              <a:rPr lang="nl-NL" dirty="0" smtClean="0"/>
+              <a:t>Waarom is de bootjeswinkel cool?</a:t>
+            </a:r>
+          </a:p>
+          <a:p>
+            <a:endParaRPr lang="nl-NL" dirty="0" smtClean="0"/>
+          </a:p>
+          <a:p>
+            <a:pPr lvl="1"/>
+            <a:r>
+              <a:rPr lang="nl-NL" dirty="0" smtClean="0"/>
+              <a:t>Eerste ding wat werkte (mijn kindje)</a:t>
+            </a:r>
+          </a:p>
+          <a:p>
+            <a:pPr lvl="1"/>
+            <a:endParaRPr lang="nl-NL" dirty="0" smtClean="0"/>
+          </a:p>
+          <a:p>
+            <a:pPr lvl="1"/>
+            <a:r>
+              <a:rPr lang="nl-NL" dirty="0" smtClean="0"/>
+              <a:t>Daarna eerste ding wat naar </a:t>
+            </a:r>
+            <a:r>
+              <a:rPr lang="nl-NL" dirty="0" err="1" smtClean="0"/>
+              <a:t>jquery</a:t>
+            </a:r>
+            <a:r>
+              <a:rPr lang="nl-NL" dirty="0" smtClean="0"/>
+              <a:t> was gebouwd</a:t>
+            </a:r>
+            <a:endParaRPr lang="nl-NL" dirty="0"/>
+          </a:p>
+        </p:txBody>
+      </p:sp>
+    </p:spTree>
+    <p:extLst>
+      <p:ext uri="{BB962C8B-B14F-4D97-AF65-F5344CB8AC3E}">
+        <p14:creationId xmlns:p14="http://schemas.microsoft.com/office/powerpoint/2010/main" val="2642701995"/>
+      </p:ext>
+    </p:extLst>
+  </p:cSld>
+  <p:clrMapOvr>
+    <a:masterClrMapping/>
+  </p:clrMapOvr>
+</p:sld>
+</file>
+
+<file path=ppt/slides/slide8.xml><?xml version="1.0" encoding="utf-8"?>
+<p:sld xmlns:a="http://schemas.openxmlformats.org/drawingml/2006/main" xmlns:r="http://schemas.openxmlformats.org/officeDocument/2006/relationships" xmlns:p="http://schemas.openxmlformats.org/presentationml/2006/main">
+  <p:cSld>
+    <p:spTree>
+      <p:nvGrpSpPr>
+        <p:cNvPr id="1" name=""/>
+        <p:cNvGrpSpPr/>
+        <p:nvPr/>
+      </p:nvGrpSpPr>
+      <p:grpSpPr>
+        <a:xfrm>
+          <a:off x="0" y="0"/>
+          <a:ext cx="0" cy="0"/>
+          <a:chOff x="0" y="0"/>
+          <a:chExt cx="0" cy="0"/>
+        </a:xfrm>
+      </p:grpSpPr>
+      <p:sp>
+        <p:nvSpPr>
+          <p:cNvPr id="2" name="Titel 1"/>
+          <p:cNvSpPr>
+            <a:spLocks noGrp="1"/>
+          </p:cNvSpPr>
+          <p:nvPr>
+            <p:ph type="title"/>
+          </p:nvPr>
+        </p:nvSpPr>
+        <p:spPr/>
+        <p:txBody>
+          <a:bodyPr/>
+          <a:lstStyle/>
+          <a:p>
+            <a:r>
+              <a:rPr lang="nl-NL" dirty="0" smtClean="0"/>
+              <a:t>Bootjeswinkel</a:t>
+            </a:r>
+            <a:endParaRPr lang="nl-NL" dirty="0"/>
+          </a:p>
+        </p:txBody>
+      </p:sp>
+      <p:sp>
+        <p:nvSpPr>
+          <p:cNvPr id="3" name="Tijdelijke aanduiding voor inhoud 2"/>
+          <p:cNvSpPr>
+            <a:spLocks noGrp="1"/>
+          </p:cNvSpPr>
+          <p:nvPr>
+            <p:ph idx="1"/>
+          </p:nvPr>
+        </p:nvSpPr>
+        <p:spPr/>
+        <p:txBody>
+          <a:bodyPr/>
+          <a:lstStyle/>
+          <a:p>
+            <a:r>
+              <a:rPr lang="nl-NL" dirty="0" smtClean="0"/>
+              <a:t>Wat doet het?</a:t>
+            </a:r>
+          </a:p>
+          <a:p>
+            <a:pPr lvl="1"/>
+            <a:r>
+              <a:rPr lang="nl-NL" dirty="0" smtClean="0"/>
+              <a:t>Weergave van de bootjes die je kunt kopen</a:t>
+            </a:r>
+          </a:p>
+          <a:p>
+            <a:pPr lvl="1"/>
+            <a:r>
+              <a:rPr lang="nl-NL" dirty="0" smtClean="0"/>
+              <a:t>Als je op een bootje klikt, en je hebt genoeg “geld”, koopt de huidige speler deze en komt hij in diens inventaris</a:t>
+            </a:r>
+          </a:p>
+          <a:p>
+            <a:pPr lvl="1"/>
+            <a:r>
+              <a:rPr lang="nl-NL" dirty="0" smtClean="0"/>
+              <a:t>De bootjeswinkel wordt automatisch aangevuld tot een gegeven aantal bootjes</a:t>
+            </a:r>
+          </a:p>
+          <a:p>
+            <a:pPr lvl="1"/>
+            <a:r>
+              <a:rPr lang="nl-NL" dirty="0" smtClean="0"/>
+              <a:t>Als de bootjes op zijn, is de winkel gewoon leeg</a:t>
+            </a:r>
+          </a:p>
+          <a:p>
+            <a:pPr lvl="1"/>
+            <a:r>
+              <a:rPr lang="nl-NL" dirty="0" smtClean="0"/>
+              <a:t>(</a:t>
+            </a:r>
+            <a:r>
+              <a:rPr lang="nl-NL" dirty="0" err="1" smtClean="0"/>
+              <a:t>Evt</a:t>
+            </a:r>
+            <a:r>
+              <a:rPr lang="nl-NL" dirty="0" smtClean="0"/>
+              <a:t> nog verhaal over </a:t>
+            </a:r>
+            <a:r>
+              <a:rPr lang="nl-NL" dirty="0" err="1" smtClean="0"/>
+              <a:t>sessions</a:t>
+            </a:r>
+            <a:r>
+              <a:rPr lang="nl-NL" dirty="0" smtClean="0"/>
+              <a:t>)</a:t>
+            </a:r>
+            <a:endParaRPr lang="nl-NL" dirty="0"/>
+          </a:p>
+        </p:txBody>
+      </p:sp>
+    </p:spTree>
+    <p:extLst>
+      <p:ext uri="{BB962C8B-B14F-4D97-AF65-F5344CB8AC3E}">
+        <p14:creationId xmlns:p14="http://schemas.microsoft.com/office/powerpoint/2010/main" val="3437739375"/>
+      </p:ext>
+    </p:extLst>
+  </p:cSld>
+  <p:clrMapOvr>
+    <a:masterClrMapping/>
+  </p:clrMapOvr>
+</p:sld>
+</file>
+
+<file path=ppt/slides/slide9.xml><?xml version="1.0" encoding="utf-8"?>
+<p:sld xmlns:a="http://schemas.openxmlformats.org/drawingml/2006/main" xmlns:r="http://schemas.openxmlformats.org/officeDocument/2006/relationships" xmlns:p="http://schemas.openxmlformats.org/presentationml/2006/main">
+  <p:cSld>
+    <p:spTree>
+      <p:nvGrpSpPr>
+        <p:cNvPr id="1" name=""/>
+        <p:cNvGrpSpPr/>
+        <p:nvPr/>
+      </p:nvGrpSpPr>
+      <p:grpSpPr>
+        <a:xfrm>
+          <a:off x="0" y="0"/>
+          <a:ext cx="0" cy="0"/>
+          <a:chOff x="0" y="0"/>
+          <a:chExt cx="0" cy="0"/>
+        </a:xfrm>
+      </p:grpSpPr>
+      <p:sp>
+        <p:nvSpPr>
+          <p:cNvPr id="2" name="Titel 1"/>
+          <p:cNvSpPr>
+            <a:spLocks noGrp="1"/>
+          </p:cNvSpPr>
+          <p:nvPr>
+            <p:ph type="title"/>
+          </p:nvPr>
+        </p:nvSpPr>
+        <p:spPr/>
+        <p:txBody>
+          <a:bodyPr/>
+          <a:lstStyle/>
+          <a:p>
+            <a:r>
+              <a:rPr lang="nl-NL" dirty="0" smtClean="0"/>
+              <a:t>Bootjeswinkel</a:t>
+            </a:r>
+            <a:endParaRPr lang="nl-NL" dirty="0"/>
+          </a:p>
+        </p:txBody>
+      </p:sp>
+      <p:sp>
+        <p:nvSpPr>
+          <p:cNvPr id="3" name="Tijdelijke aanduiding voor inhoud 2"/>
+          <p:cNvSpPr>
+            <a:spLocks noGrp="1"/>
+          </p:cNvSpPr>
+          <p:nvPr>
+            <p:ph idx="1"/>
+          </p:nvPr>
+        </p:nvSpPr>
+        <p:spPr/>
+        <p:txBody>
+          <a:bodyPr/>
+          <a:lstStyle/>
+          <a:p>
+            <a:r>
+              <a:rPr lang="nl-NL" dirty="0" smtClean="0"/>
+              <a:t>Data ophalen uit de database</a:t>
+            </a:r>
+          </a:p>
+          <a:p>
+            <a:pPr lvl="1"/>
+            <a:r>
+              <a:rPr lang="nl-NL" dirty="0" smtClean="0"/>
+              <a:t>Pseudocode?</a:t>
+            </a:r>
+            <a:endParaRPr lang="nl-NL" dirty="0"/>
+          </a:p>
+        </p:txBody>
+      </p:sp>
+    </p:spTree>
+    <p:extLst>
+      <p:ext uri="{BB962C8B-B14F-4D97-AF65-F5344CB8AC3E}">
+        <p14:creationId xmlns:p14="http://schemas.microsoft.com/office/powerpoint/2010/main" val="2928454808"/>
+      </p:ext>
+    </p:extLst>
+  </p:cSld>
+  <p:clrMapOvr>
+    <a:masterClrMapping/>
+  </p:clrMapOvr>
 </p:sld>
 </file>
 

</xml_diff>

<commit_message>
Eh tijdnotatie/ -inschatting erbij gedaan in de notities
</commit_message>
<xml_diff>
--- a/presentatie.pptx
+++ b/presentatie.pptx
@@ -4,13 +4,16 @@
   <p:sldMasterIdLst>
     <p:sldMasterId id="2147483780" r:id="rId1"/>
   </p:sldMasterIdLst>
+  <p:notesMasterIdLst>
+    <p:notesMasterId r:id="rId16"/>
+  </p:notesMasterIdLst>
   <p:sldIdLst>
     <p:sldId id="256" r:id="rId2"/>
     <p:sldId id="257" r:id="rId3"/>
-    <p:sldId id="258" r:id="rId4"/>
-    <p:sldId id="259" r:id="rId5"/>
-    <p:sldId id="262" r:id="rId6"/>
-    <p:sldId id="263" r:id="rId7"/>
+    <p:sldId id="262" r:id="rId4"/>
+    <p:sldId id="258" r:id="rId5"/>
+    <p:sldId id="263" r:id="rId6"/>
+    <p:sldId id="259" r:id="rId7"/>
     <p:sldId id="264" r:id="rId8"/>
     <p:sldId id="265" r:id="rId9"/>
     <p:sldId id="266" r:id="rId10"/>
@@ -118,6 +121,808 @@
     </a:lvl9pPr>
   </p:defaultTextStyle>
 </p:presentation>
+</file>
+
+<file path=ppt/notesMasters/notesMaster1.xml><?xml version="1.0" encoding="utf-8"?>
+<p:notesMaster xmlns:a="http://schemas.openxmlformats.org/drawingml/2006/main" xmlns:r="http://schemas.openxmlformats.org/officeDocument/2006/relationships" xmlns:p="http://schemas.openxmlformats.org/presentationml/2006/main">
+  <p:cSld>
+    <p:bg>
+      <p:bgRef idx="1001">
+        <a:schemeClr val="bg1"/>
+      </p:bgRef>
+    </p:bg>
+    <p:spTree>
+      <p:nvGrpSpPr>
+        <p:cNvPr id="1" name=""/>
+        <p:cNvGrpSpPr/>
+        <p:nvPr/>
+      </p:nvGrpSpPr>
+      <p:grpSpPr>
+        <a:xfrm>
+          <a:off x="0" y="0"/>
+          <a:ext cx="0" cy="0"/>
+          <a:chOff x="0" y="0"/>
+          <a:chExt cx="0" cy="0"/>
+        </a:xfrm>
+      </p:grpSpPr>
+      <p:sp>
+        <p:nvSpPr>
+          <p:cNvPr id="2" name="Tijdelijke aanduiding voor koptekst 1"/>
+          <p:cNvSpPr>
+            <a:spLocks noGrp="1"/>
+          </p:cNvSpPr>
+          <p:nvPr>
+            <p:ph type="hdr" sz="quarter"/>
+          </p:nvPr>
+        </p:nvSpPr>
+        <p:spPr>
+          <a:xfrm>
+            <a:off x="0" y="0"/>
+            <a:ext cx="2971800" cy="457200"/>
+          </a:xfrm>
+          <a:prstGeom prst="rect">
+            <a:avLst/>
+          </a:prstGeom>
+        </p:spPr>
+        <p:txBody>
+          <a:bodyPr vert="horz" lIns="91440" tIns="45720" rIns="91440" bIns="45720" rtlCol="0"/>
+          <a:lstStyle>
+            <a:lvl1pPr algn="l">
+              <a:defRPr sz="1200"/>
+            </a:lvl1pPr>
+          </a:lstStyle>
+          <a:p>
+            <a:endParaRPr lang="nl-NL"/>
+          </a:p>
+        </p:txBody>
+      </p:sp>
+      <p:sp>
+        <p:nvSpPr>
+          <p:cNvPr id="3" name="Tijdelijke aanduiding voor datum 2"/>
+          <p:cNvSpPr>
+            <a:spLocks noGrp="1"/>
+          </p:cNvSpPr>
+          <p:nvPr>
+            <p:ph type="dt" idx="1"/>
+          </p:nvPr>
+        </p:nvSpPr>
+        <p:spPr>
+          <a:xfrm>
+            <a:off x="3884613" y="0"/>
+            <a:ext cx="2971800" cy="457200"/>
+          </a:xfrm>
+          <a:prstGeom prst="rect">
+            <a:avLst/>
+          </a:prstGeom>
+        </p:spPr>
+        <p:txBody>
+          <a:bodyPr vert="horz" lIns="91440" tIns="45720" rIns="91440" bIns="45720" rtlCol="0"/>
+          <a:lstStyle>
+            <a:lvl1pPr algn="r">
+              <a:defRPr sz="1200"/>
+            </a:lvl1pPr>
+          </a:lstStyle>
+          <a:p>
+            <a:fld id="{3FABBBE2-9040-40DB-A1C3-37688CBDF225}" type="datetimeFigureOut">
+              <a:rPr lang="nl-NL" smtClean="0"/>
+              <a:t>30-11-2016</a:t>
+            </a:fld>
+            <a:endParaRPr lang="nl-NL"/>
+          </a:p>
+        </p:txBody>
+      </p:sp>
+      <p:sp>
+        <p:nvSpPr>
+          <p:cNvPr id="4" name="Tijdelijke aanduiding voor dia-afbeelding 3"/>
+          <p:cNvSpPr>
+            <a:spLocks noGrp="1" noRot="1" noChangeAspect="1"/>
+          </p:cNvSpPr>
+          <p:nvPr>
+            <p:ph type="sldImg" idx="2"/>
+          </p:nvPr>
+        </p:nvSpPr>
+        <p:spPr>
+          <a:xfrm>
+            <a:off x="1143000" y="685800"/>
+            <a:ext cx="4572000" cy="3429000"/>
+          </a:xfrm>
+          <a:prstGeom prst="rect">
+            <a:avLst/>
+          </a:prstGeom>
+          <a:noFill/>
+          <a:ln w="12700">
+            <a:solidFill>
+              <a:prstClr val="black"/>
+            </a:solidFill>
+          </a:ln>
+        </p:spPr>
+        <p:txBody>
+          <a:bodyPr vert="horz" lIns="91440" tIns="45720" rIns="91440" bIns="45720" rtlCol="0" anchor="ctr"/>
+          <a:lstStyle/>
+          <a:p>
+            <a:endParaRPr lang="nl-NL"/>
+          </a:p>
+        </p:txBody>
+      </p:sp>
+      <p:sp>
+        <p:nvSpPr>
+          <p:cNvPr id="5" name="Tijdelijke aanduiding voor notities 4"/>
+          <p:cNvSpPr>
+            <a:spLocks noGrp="1"/>
+          </p:cNvSpPr>
+          <p:nvPr>
+            <p:ph type="body" sz="quarter" idx="3"/>
+          </p:nvPr>
+        </p:nvSpPr>
+        <p:spPr>
+          <a:xfrm>
+            <a:off x="685800" y="4343400"/>
+            <a:ext cx="5486400" cy="4114800"/>
+          </a:xfrm>
+          <a:prstGeom prst="rect">
+            <a:avLst/>
+          </a:prstGeom>
+        </p:spPr>
+        <p:txBody>
+          <a:bodyPr vert="horz" lIns="91440" tIns="45720" rIns="91440" bIns="45720" rtlCol="0"/>
+          <a:lstStyle/>
+          <a:p>
+            <a:pPr lvl="0"/>
+            <a:r>
+              <a:rPr lang="nl-NL" smtClean="0"/>
+              <a:t>Klik om de modelstijlen te bewerken</a:t>
+            </a:r>
+          </a:p>
+          <a:p>
+            <a:pPr lvl="1"/>
+            <a:r>
+              <a:rPr lang="nl-NL" smtClean="0"/>
+              <a:t>Tweede niveau</a:t>
+            </a:r>
+          </a:p>
+          <a:p>
+            <a:pPr lvl="2"/>
+            <a:r>
+              <a:rPr lang="nl-NL" smtClean="0"/>
+              <a:t>Derde niveau</a:t>
+            </a:r>
+          </a:p>
+          <a:p>
+            <a:pPr lvl="3"/>
+            <a:r>
+              <a:rPr lang="nl-NL" smtClean="0"/>
+              <a:t>Vierde niveau</a:t>
+            </a:r>
+          </a:p>
+          <a:p>
+            <a:pPr lvl="4"/>
+            <a:r>
+              <a:rPr lang="nl-NL" smtClean="0"/>
+              <a:t>Vijfde niveau</a:t>
+            </a:r>
+            <a:endParaRPr lang="nl-NL"/>
+          </a:p>
+        </p:txBody>
+      </p:sp>
+      <p:sp>
+        <p:nvSpPr>
+          <p:cNvPr id="6" name="Tijdelijke aanduiding voor voettekst 5"/>
+          <p:cNvSpPr>
+            <a:spLocks noGrp="1"/>
+          </p:cNvSpPr>
+          <p:nvPr>
+            <p:ph type="ftr" sz="quarter" idx="4"/>
+          </p:nvPr>
+        </p:nvSpPr>
+        <p:spPr>
+          <a:xfrm>
+            <a:off x="0" y="8685213"/>
+            <a:ext cx="2971800" cy="457200"/>
+          </a:xfrm>
+          <a:prstGeom prst="rect">
+            <a:avLst/>
+          </a:prstGeom>
+        </p:spPr>
+        <p:txBody>
+          <a:bodyPr vert="horz" lIns="91440" tIns="45720" rIns="91440" bIns="45720" rtlCol="0" anchor="b"/>
+          <a:lstStyle>
+            <a:lvl1pPr algn="l">
+              <a:defRPr sz="1200"/>
+            </a:lvl1pPr>
+          </a:lstStyle>
+          <a:p>
+            <a:endParaRPr lang="nl-NL"/>
+          </a:p>
+        </p:txBody>
+      </p:sp>
+      <p:sp>
+        <p:nvSpPr>
+          <p:cNvPr id="7" name="Tijdelijke aanduiding voor dianummer 6"/>
+          <p:cNvSpPr>
+            <a:spLocks noGrp="1"/>
+          </p:cNvSpPr>
+          <p:nvPr>
+            <p:ph type="sldNum" sz="quarter" idx="5"/>
+          </p:nvPr>
+        </p:nvSpPr>
+        <p:spPr>
+          <a:xfrm>
+            <a:off x="3884613" y="8685213"/>
+            <a:ext cx="2971800" cy="457200"/>
+          </a:xfrm>
+          <a:prstGeom prst="rect">
+            <a:avLst/>
+          </a:prstGeom>
+        </p:spPr>
+        <p:txBody>
+          <a:bodyPr vert="horz" lIns="91440" tIns="45720" rIns="91440" bIns="45720" rtlCol="0" anchor="b"/>
+          <a:lstStyle>
+            <a:lvl1pPr algn="r">
+              <a:defRPr sz="1200"/>
+            </a:lvl1pPr>
+          </a:lstStyle>
+          <a:p>
+            <a:fld id="{2AD8EA39-74BD-48E9-85FD-20DFA51CADF1}" type="slidenum">
+              <a:rPr lang="nl-NL" smtClean="0"/>
+              <a:t>‹nr.›</a:t>
+            </a:fld>
+            <a:endParaRPr lang="nl-NL"/>
+          </a:p>
+        </p:txBody>
+      </p:sp>
+    </p:spTree>
+    <p:extLst>
+      <p:ext uri="{BB962C8B-B14F-4D97-AF65-F5344CB8AC3E}">
+        <p14:creationId xmlns:p14="http://schemas.microsoft.com/office/powerpoint/2010/main" val="2876073126"/>
+      </p:ext>
+    </p:extLst>
+  </p:cSld>
+  <p:clrMap bg1="lt1" tx1="dk1" bg2="lt2" tx2="dk2" accent1="accent1" accent2="accent2" accent3="accent3" accent4="accent4" accent5="accent5" accent6="accent6" hlink="hlink" folHlink="folHlink"/>
+  <p:notesStyle>
+    <a:lvl1pPr marL="0" algn="l" defTabSz="914400" rtl="0" eaLnBrk="1" latinLnBrk="0" hangingPunct="1">
+      <a:defRPr sz="1200" kern="1200">
+        <a:solidFill>
+          <a:schemeClr val="tx1"/>
+        </a:solidFill>
+        <a:latin typeface="+mn-lt"/>
+        <a:ea typeface="+mn-ea"/>
+        <a:cs typeface="+mn-cs"/>
+      </a:defRPr>
+    </a:lvl1pPr>
+    <a:lvl2pPr marL="457200" algn="l" defTabSz="914400" rtl="0" eaLnBrk="1" latinLnBrk="0" hangingPunct="1">
+      <a:defRPr sz="1200" kern="1200">
+        <a:solidFill>
+          <a:schemeClr val="tx1"/>
+        </a:solidFill>
+        <a:latin typeface="+mn-lt"/>
+        <a:ea typeface="+mn-ea"/>
+        <a:cs typeface="+mn-cs"/>
+      </a:defRPr>
+    </a:lvl2pPr>
+    <a:lvl3pPr marL="914400" algn="l" defTabSz="914400" rtl="0" eaLnBrk="1" latinLnBrk="0" hangingPunct="1">
+      <a:defRPr sz="1200" kern="1200">
+        <a:solidFill>
+          <a:schemeClr val="tx1"/>
+        </a:solidFill>
+        <a:latin typeface="+mn-lt"/>
+        <a:ea typeface="+mn-ea"/>
+        <a:cs typeface="+mn-cs"/>
+      </a:defRPr>
+    </a:lvl3pPr>
+    <a:lvl4pPr marL="1371600" algn="l" defTabSz="914400" rtl="0" eaLnBrk="1" latinLnBrk="0" hangingPunct="1">
+      <a:defRPr sz="1200" kern="1200">
+        <a:solidFill>
+          <a:schemeClr val="tx1"/>
+        </a:solidFill>
+        <a:latin typeface="+mn-lt"/>
+        <a:ea typeface="+mn-ea"/>
+        <a:cs typeface="+mn-cs"/>
+      </a:defRPr>
+    </a:lvl4pPr>
+    <a:lvl5pPr marL="1828800" algn="l" defTabSz="914400" rtl="0" eaLnBrk="1" latinLnBrk="0" hangingPunct="1">
+      <a:defRPr sz="1200" kern="1200">
+        <a:solidFill>
+          <a:schemeClr val="tx1"/>
+        </a:solidFill>
+        <a:latin typeface="+mn-lt"/>
+        <a:ea typeface="+mn-ea"/>
+        <a:cs typeface="+mn-cs"/>
+      </a:defRPr>
+    </a:lvl5pPr>
+    <a:lvl6pPr marL="2286000" algn="l" defTabSz="914400" rtl="0" eaLnBrk="1" latinLnBrk="0" hangingPunct="1">
+      <a:defRPr sz="1200" kern="1200">
+        <a:solidFill>
+          <a:schemeClr val="tx1"/>
+        </a:solidFill>
+        <a:latin typeface="+mn-lt"/>
+        <a:ea typeface="+mn-ea"/>
+        <a:cs typeface="+mn-cs"/>
+      </a:defRPr>
+    </a:lvl6pPr>
+    <a:lvl7pPr marL="2743200" algn="l" defTabSz="914400" rtl="0" eaLnBrk="1" latinLnBrk="0" hangingPunct="1">
+      <a:defRPr sz="1200" kern="1200">
+        <a:solidFill>
+          <a:schemeClr val="tx1"/>
+        </a:solidFill>
+        <a:latin typeface="+mn-lt"/>
+        <a:ea typeface="+mn-ea"/>
+        <a:cs typeface="+mn-cs"/>
+      </a:defRPr>
+    </a:lvl7pPr>
+    <a:lvl8pPr marL="3200400" algn="l" defTabSz="914400" rtl="0" eaLnBrk="1" latinLnBrk="0" hangingPunct="1">
+      <a:defRPr sz="1200" kern="1200">
+        <a:solidFill>
+          <a:schemeClr val="tx1"/>
+        </a:solidFill>
+        <a:latin typeface="+mn-lt"/>
+        <a:ea typeface="+mn-ea"/>
+        <a:cs typeface="+mn-cs"/>
+      </a:defRPr>
+    </a:lvl8pPr>
+    <a:lvl9pPr marL="3657600" algn="l" defTabSz="914400" rtl="0" eaLnBrk="1" latinLnBrk="0" hangingPunct="1">
+      <a:defRPr sz="1200" kern="1200">
+        <a:solidFill>
+          <a:schemeClr val="tx1"/>
+        </a:solidFill>
+        <a:latin typeface="+mn-lt"/>
+        <a:ea typeface="+mn-ea"/>
+        <a:cs typeface="+mn-cs"/>
+      </a:defRPr>
+    </a:lvl9pPr>
+  </p:notesStyle>
+</p:notesMaster>
+</file>
+
+<file path=ppt/notesSlides/notesSlide1.xml><?xml version="1.0" encoding="utf-8"?>
+<p:notes xmlns:a="http://schemas.openxmlformats.org/drawingml/2006/main" xmlns:r="http://schemas.openxmlformats.org/officeDocument/2006/relationships" xmlns:p="http://schemas.openxmlformats.org/presentationml/2006/main">
+  <p:cSld>
+    <p:spTree>
+      <p:nvGrpSpPr>
+        <p:cNvPr id="1" name=""/>
+        <p:cNvGrpSpPr/>
+        <p:nvPr/>
+      </p:nvGrpSpPr>
+      <p:grpSpPr>
+        <a:xfrm>
+          <a:off x="0" y="0"/>
+          <a:ext cx="0" cy="0"/>
+          <a:chOff x="0" y="0"/>
+          <a:chExt cx="0" cy="0"/>
+        </a:xfrm>
+      </p:grpSpPr>
+      <p:sp>
+        <p:nvSpPr>
+          <p:cNvPr id="2" name="Tijdelijke aanduiding voor dia-afbeelding 1"/>
+          <p:cNvSpPr>
+            <a:spLocks noGrp="1" noRot="1" noChangeAspect="1"/>
+          </p:cNvSpPr>
+          <p:nvPr>
+            <p:ph type="sldImg"/>
+          </p:nvPr>
+        </p:nvSpPr>
+        <p:spPr/>
+      </p:sp>
+      <p:sp>
+        <p:nvSpPr>
+          <p:cNvPr id="3" name="Tijdelijke aanduiding voor notities 2"/>
+          <p:cNvSpPr>
+            <a:spLocks noGrp="1"/>
+          </p:cNvSpPr>
+          <p:nvPr>
+            <p:ph type="body" idx="1"/>
+          </p:nvPr>
+        </p:nvSpPr>
+        <p:spPr/>
+        <p:txBody>
+          <a:bodyPr/>
+          <a:lstStyle/>
+          <a:p>
+            <a:r>
+              <a:rPr lang="nl-NL" dirty="0" smtClean="0"/>
+              <a:t>2</a:t>
+            </a:r>
+            <a:r>
+              <a:rPr lang="nl-NL" baseline="0" dirty="0" smtClean="0"/>
+              <a:t> minuten voor dit en het klassendiagram</a:t>
+            </a:r>
+            <a:endParaRPr lang="nl-NL" dirty="0"/>
+          </a:p>
+        </p:txBody>
+      </p:sp>
+      <p:sp>
+        <p:nvSpPr>
+          <p:cNvPr id="4" name="Tijdelijke aanduiding voor dianummer 3"/>
+          <p:cNvSpPr>
+            <a:spLocks noGrp="1"/>
+          </p:cNvSpPr>
+          <p:nvPr>
+            <p:ph type="sldNum" sz="quarter" idx="10"/>
+          </p:nvPr>
+        </p:nvSpPr>
+        <p:spPr/>
+        <p:txBody>
+          <a:bodyPr/>
+          <a:lstStyle/>
+          <a:p>
+            <a:fld id="{2AD8EA39-74BD-48E9-85FD-20DFA51CADF1}" type="slidenum">
+              <a:rPr lang="nl-NL" smtClean="0"/>
+              <a:t>2</a:t>
+            </a:fld>
+            <a:endParaRPr lang="nl-NL"/>
+          </a:p>
+        </p:txBody>
+      </p:sp>
+    </p:spTree>
+    <p:extLst>
+      <p:ext uri="{BB962C8B-B14F-4D97-AF65-F5344CB8AC3E}">
+        <p14:creationId xmlns:p14="http://schemas.microsoft.com/office/powerpoint/2010/main" val="1377582382"/>
+      </p:ext>
+    </p:extLst>
+  </p:cSld>
+  <p:clrMapOvr>
+    <a:masterClrMapping/>
+  </p:clrMapOvr>
+</p:notes>
+</file>
+
+<file path=ppt/notesSlides/notesSlide2.xml><?xml version="1.0" encoding="utf-8"?>
+<p:notes xmlns:a="http://schemas.openxmlformats.org/drawingml/2006/main" xmlns:r="http://schemas.openxmlformats.org/officeDocument/2006/relationships" xmlns:p="http://schemas.openxmlformats.org/presentationml/2006/main">
+  <p:cSld>
+    <p:spTree>
+      <p:nvGrpSpPr>
+        <p:cNvPr id="1" name=""/>
+        <p:cNvGrpSpPr/>
+        <p:nvPr/>
+      </p:nvGrpSpPr>
+      <p:grpSpPr>
+        <a:xfrm>
+          <a:off x="0" y="0"/>
+          <a:ext cx="0" cy="0"/>
+          <a:chOff x="0" y="0"/>
+          <a:chExt cx="0" cy="0"/>
+        </a:xfrm>
+      </p:grpSpPr>
+      <p:sp>
+        <p:nvSpPr>
+          <p:cNvPr id="2" name="Tijdelijke aanduiding voor dia-afbeelding 1"/>
+          <p:cNvSpPr>
+            <a:spLocks noGrp="1" noRot="1" noChangeAspect="1"/>
+          </p:cNvSpPr>
+          <p:nvPr>
+            <p:ph type="sldImg"/>
+          </p:nvPr>
+        </p:nvSpPr>
+        <p:spPr/>
+      </p:sp>
+      <p:sp>
+        <p:nvSpPr>
+          <p:cNvPr id="3" name="Tijdelijke aanduiding voor notities 2"/>
+          <p:cNvSpPr>
+            <a:spLocks noGrp="1"/>
+          </p:cNvSpPr>
+          <p:nvPr>
+            <p:ph type="body" idx="1"/>
+          </p:nvPr>
+        </p:nvSpPr>
+        <p:spPr/>
+        <p:txBody>
+          <a:bodyPr/>
+          <a:lstStyle/>
+          <a:p>
+            <a:r>
+              <a:rPr lang="nl-NL" dirty="0" smtClean="0"/>
+              <a:t>2 minuten voor dit en het tweede klassendiagram</a:t>
+            </a:r>
+            <a:endParaRPr lang="nl-NL" dirty="0"/>
+          </a:p>
+        </p:txBody>
+      </p:sp>
+      <p:sp>
+        <p:nvSpPr>
+          <p:cNvPr id="4" name="Tijdelijke aanduiding voor dianummer 3"/>
+          <p:cNvSpPr>
+            <a:spLocks noGrp="1"/>
+          </p:cNvSpPr>
+          <p:nvPr>
+            <p:ph type="sldNum" sz="quarter" idx="10"/>
+          </p:nvPr>
+        </p:nvSpPr>
+        <p:spPr/>
+        <p:txBody>
+          <a:bodyPr/>
+          <a:lstStyle/>
+          <a:p>
+            <a:fld id="{2AD8EA39-74BD-48E9-85FD-20DFA51CADF1}" type="slidenum">
+              <a:rPr lang="nl-NL" smtClean="0"/>
+              <a:t>4</a:t>
+            </a:fld>
+            <a:endParaRPr lang="nl-NL"/>
+          </a:p>
+        </p:txBody>
+      </p:sp>
+    </p:spTree>
+    <p:extLst>
+      <p:ext uri="{BB962C8B-B14F-4D97-AF65-F5344CB8AC3E}">
+        <p14:creationId xmlns:p14="http://schemas.microsoft.com/office/powerpoint/2010/main" val="187992077"/>
+      </p:ext>
+    </p:extLst>
+  </p:cSld>
+  <p:clrMapOvr>
+    <a:masterClrMapping/>
+  </p:clrMapOvr>
+</p:notes>
+</file>
+
+<file path=ppt/notesSlides/notesSlide3.xml><?xml version="1.0" encoding="utf-8"?>
+<p:notes xmlns:a="http://schemas.openxmlformats.org/drawingml/2006/main" xmlns:r="http://schemas.openxmlformats.org/officeDocument/2006/relationships" xmlns:p="http://schemas.openxmlformats.org/presentationml/2006/main">
+  <p:cSld>
+    <p:spTree>
+      <p:nvGrpSpPr>
+        <p:cNvPr id="1" name=""/>
+        <p:cNvGrpSpPr/>
+        <p:nvPr/>
+      </p:nvGrpSpPr>
+      <p:grpSpPr>
+        <a:xfrm>
+          <a:off x="0" y="0"/>
+          <a:ext cx="0" cy="0"/>
+          <a:chOff x="0" y="0"/>
+          <a:chExt cx="0" cy="0"/>
+        </a:xfrm>
+      </p:grpSpPr>
+      <p:sp>
+        <p:nvSpPr>
+          <p:cNvPr id="2" name="Tijdelijke aanduiding voor dia-afbeelding 1"/>
+          <p:cNvSpPr>
+            <a:spLocks noGrp="1" noRot="1" noChangeAspect="1"/>
+          </p:cNvSpPr>
+          <p:nvPr>
+            <p:ph type="sldImg"/>
+          </p:nvPr>
+        </p:nvSpPr>
+        <p:spPr/>
+      </p:sp>
+      <p:sp>
+        <p:nvSpPr>
+          <p:cNvPr id="3" name="Tijdelijke aanduiding voor notities 2"/>
+          <p:cNvSpPr>
+            <a:spLocks noGrp="1"/>
+          </p:cNvSpPr>
+          <p:nvPr>
+            <p:ph type="body" idx="1"/>
+          </p:nvPr>
+        </p:nvSpPr>
+        <p:spPr/>
+        <p:txBody>
+          <a:bodyPr/>
+          <a:lstStyle/>
+          <a:p>
+            <a:r>
+              <a:rPr lang="nl-NL" dirty="0" smtClean="0"/>
+              <a:t>7 minuten demo:</a:t>
+            </a:r>
+            <a:r>
+              <a:rPr lang="nl-NL" baseline="0" dirty="0" smtClean="0"/>
+              <a:t> ieder 3.5 minuut. </a:t>
+            </a:r>
+            <a:r>
+              <a:rPr lang="nl-NL" baseline="0" dirty="0" err="1" smtClean="0"/>
+              <a:t>Feia</a:t>
+            </a:r>
+            <a:r>
+              <a:rPr lang="nl-NL" baseline="0" dirty="0" smtClean="0"/>
+              <a:t> doet huidige tegel en bord. Jenny doet de rest.</a:t>
+            </a:r>
+            <a:endParaRPr lang="nl-NL" dirty="0"/>
+          </a:p>
+        </p:txBody>
+      </p:sp>
+      <p:sp>
+        <p:nvSpPr>
+          <p:cNvPr id="4" name="Tijdelijke aanduiding voor dianummer 3"/>
+          <p:cNvSpPr>
+            <a:spLocks noGrp="1"/>
+          </p:cNvSpPr>
+          <p:nvPr>
+            <p:ph type="sldNum" sz="quarter" idx="10"/>
+          </p:nvPr>
+        </p:nvSpPr>
+        <p:spPr/>
+        <p:txBody>
+          <a:bodyPr/>
+          <a:lstStyle/>
+          <a:p>
+            <a:fld id="{2AD8EA39-74BD-48E9-85FD-20DFA51CADF1}" type="slidenum">
+              <a:rPr lang="nl-NL" smtClean="0"/>
+              <a:t>6</a:t>
+            </a:fld>
+            <a:endParaRPr lang="nl-NL"/>
+          </a:p>
+        </p:txBody>
+      </p:sp>
+    </p:spTree>
+    <p:extLst>
+      <p:ext uri="{BB962C8B-B14F-4D97-AF65-F5344CB8AC3E}">
+        <p14:creationId xmlns:p14="http://schemas.microsoft.com/office/powerpoint/2010/main" val="87282823"/>
+      </p:ext>
+    </p:extLst>
+  </p:cSld>
+  <p:clrMapOvr>
+    <a:masterClrMapping/>
+  </p:clrMapOvr>
+</p:notes>
+</file>
+
+<file path=ppt/notesSlides/notesSlide4.xml><?xml version="1.0" encoding="utf-8"?>
+<p:notes xmlns:a="http://schemas.openxmlformats.org/drawingml/2006/main" xmlns:r="http://schemas.openxmlformats.org/officeDocument/2006/relationships" xmlns:p="http://schemas.openxmlformats.org/presentationml/2006/main">
+  <p:cSld>
+    <p:spTree>
+      <p:nvGrpSpPr>
+        <p:cNvPr id="1" name=""/>
+        <p:cNvGrpSpPr/>
+        <p:nvPr/>
+      </p:nvGrpSpPr>
+      <p:grpSpPr>
+        <a:xfrm>
+          <a:off x="0" y="0"/>
+          <a:ext cx="0" cy="0"/>
+          <a:chOff x="0" y="0"/>
+          <a:chExt cx="0" cy="0"/>
+        </a:xfrm>
+      </p:grpSpPr>
+      <p:sp>
+        <p:nvSpPr>
+          <p:cNvPr id="2" name="Tijdelijke aanduiding voor dia-afbeelding 1"/>
+          <p:cNvSpPr>
+            <a:spLocks noGrp="1" noRot="1" noChangeAspect="1"/>
+          </p:cNvSpPr>
+          <p:nvPr>
+            <p:ph type="sldImg"/>
+          </p:nvPr>
+        </p:nvSpPr>
+        <p:spPr/>
+      </p:sp>
+      <p:sp>
+        <p:nvSpPr>
+          <p:cNvPr id="3" name="Tijdelijke aanduiding voor notities 2"/>
+          <p:cNvSpPr>
+            <a:spLocks noGrp="1"/>
+          </p:cNvSpPr>
+          <p:nvPr>
+            <p:ph type="body" idx="1"/>
+          </p:nvPr>
+        </p:nvSpPr>
+        <p:spPr/>
+        <p:txBody>
+          <a:bodyPr/>
+          <a:lstStyle/>
+          <a:p>
+            <a:r>
+              <a:rPr lang="nl-NL" dirty="0" smtClean="0"/>
+              <a:t>2 minuten wat hebben we geleerd (per persoon)</a:t>
+            </a:r>
+            <a:endParaRPr lang="nl-NL" dirty="0"/>
+          </a:p>
+        </p:txBody>
+      </p:sp>
+      <p:sp>
+        <p:nvSpPr>
+          <p:cNvPr id="4" name="Tijdelijke aanduiding voor dianummer 3"/>
+          <p:cNvSpPr>
+            <a:spLocks noGrp="1"/>
+          </p:cNvSpPr>
+          <p:nvPr>
+            <p:ph type="sldNum" sz="quarter" idx="10"/>
+          </p:nvPr>
+        </p:nvSpPr>
+        <p:spPr/>
+        <p:txBody>
+          <a:bodyPr/>
+          <a:lstStyle/>
+          <a:p>
+            <a:fld id="{2AD8EA39-74BD-48E9-85FD-20DFA51CADF1}" type="slidenum">
+              <a:rPr lang="nl-NL" smtClean="0"/>
+              <a:t>12</a:t>
+            </a:fld>
+            <a:endParaRPr lang="nl-NL"/>
+          </a:p>
+        </p:txBody>
+      </p:sp>
+    </p:spTree>
+    <p:extLst>
+      <p:ext uri="{BB962C8B-B14F-4D97-AF65-F5344CB8AC3E}">
+        <p14:creationId xmlns:p14="http://schemas.microsoft.com/office/powerpoint/2010/main" val="181902196"/>
+      </p:ext>
+    </p:extLst>
+  </p:cSld>
+  <p:clrMapOvr>
+    <a:masterClrMapping/>
+  </p:clrMapOvr>
+</p:notes>
+</file>
+
+<file path=ppt/notesSlides/notesSlide5.xml><?xml version="1.0" encoding="utf-8"?>
+<p:notes xmlns:a="http://schemas.openxmlformats.org/drawingml/2006/main" xmlns:r="http://schemas.openxmlformats.org/officeDocument/2006/relationships" xmlns:p="http://schemas.openxmlformats.org/presentationml/2006/main">
+  <p:cSld>
+    <p:spTree>
+      <p:nvGrpSpPr>
+        <p:cNvPr id="1" name=""/>
+        <p:cNvGrpSpPr/>
+        <p:nvPr/>
+      </p:nvGrpSpPr>
+      <p:grpSpPr>
+        <a:xfrm>
+          <a:off x="0" y="0"/>
+          <a:ext cx="0" cy="0"/>
+          <a:chOff x="0" y="0"/>
+          <a:chExt cx="0" cy="0"/>
+        </a:xfrm>
+      </p:grpSpPr>
+      <p:sp>
+        <p:nvSpPr>
+          <p:cNvPr id="2" name="Tijdelijke aanduiding voor dia-afbeelding 1"/>
+          <p:cNvSpPr>
+            <a:spLocks noGrp="1" noRot="1" noChangeAspect="1"/>
+          </p:cNvSpPr>
+          <p:nvPr>
+            <p:ph type="sldImg"/>
+          </p:nvPr>
+        </p:nvSpPr>
+        <p:spPr/>
+      </p:sp>
+      <p:sp>
+        <p:nvSpPr>
+          <p:cNvPr id="3" name="Tijdelijke aanduiding voor notities 2"/>
+          <p:cNvSpPr>
+            <a:spLocks noGrp="1"/>
+          </p:cNvSpPr>
+          <p:nvPr>
+            <p:ph type="body" idx="1"/>
+          </p:nvPr>
+        </p:nvSpPr>
+        <p:spPr/>
+        <p:txBody>
+          <a:bodyPr/>
+          <a:lstStyle/>
+          <a:p>
+            <a:endParaRPr lang="nl-NL" dirty="0"/>
+          </a:p>
+        </p:txBody>
+      </p:sp>
+      <p:sp>
+        <p:nvSpPr>
+          <p:cNvPr id="4" name="Tijdelijke aanduiding voor dianummer 3"/>
+          <p:cNvSpPr>
+            <a:spLocks noGrp="1"/>
+          </p:cNvSpPr>
+          <p:nvPr>
+            <p:ph type="sldNum" sz="quarter" idx="10"/>
+          </p:nvPr>
+        </p:nvSpPr>
+        <p:spPr/>
+        <p:txBody>
+          <a:bodyPr/>
+          <a:lstStyle/>
+          <a:p>
+            <a:fld id="{2AD8EA39-74BD-48E9-85FD-20DFA51CADF1}" type="slidenum">
+              <a:rPr lang="nl-NL" smtClean="0"/>
+              <a:t>14</a:t>
+            </a:fld>
+            <a:endParaRPr lang="nl-NL"/>
+          </a:p>
+        </p:txBody>
+      </p:sp>
+    </p:spTree>
+    <p:extLst>
+      <p:ext uri="{BB962C8B-B14F-4D97-AF65-F5344CB8AC3E}">
+        <p14:creationId xmlns:p14="http://schemas.microsoft.com/office/powerpoint/2010/main" val="3298911650"/>
+      </p:ext>
+    </p:extLst>
+  </p:cSld>
+  <p:clrMapOvr>
+    <a:masterClrMapping/>
+  </p:clrMapOvr>
+</p:notes>
 </file>
 
 <file path=ppt/slideLayouts/slideLayout1.xml><?xml version="1.0" encoding="utf-8"?>
@@ -5577,7 +6382,28 @@
               <a:rPr lang="nl-NL" dirty="0" smtClean="0"/>
               <a:t>Dit is echt helemaal mooi</a:t>
             </a:r>
+          </a:p>
+          <a:p>
+            <a:r>
+              <a:rPr lang="nl-NL" dirty="0" smtClean="0"/>
+              <a:t>Iedereen die mooi is, mag nog wat vragen</a:t>
+            </a:r>
+          </a:p>
+          <a:p>
             <a:endParaRPr lang="nl-NL" dirty="0"/>
+          </a:p>
+          <a:p>
+            <a:endParaRPr lang="nl-NL" dirty="0" smtClean="0"/>
+          </a:p>
+          <a:p>
+            <a:endParaRPr lang="nl-NL" dirty="0"/>
+          </a:p>
+          <a:p>
+            <a:r>
+              <a:rPr lang="nl-NL" sz="1400" dirty="0" smtClean="0"/>
+              <a:t>(Jullie zijn allemaal mooi)</a:t>
+            </a:r>
+            <a:endParaRPr lang="nl-NL" sz="1400" dirty="0"/>
           </a:p>
         </p:txBody>
       </p:sp>
@@ -5736,6 +6562,35 @@
           <a:chExt cx="0" cy="0"/>
         </a:xfrm>
       </p:grpSpPr>
+      <p:pic>
+        <p:nvPicPr>
+          <p:cNvPr id="4" name="Tijdelijke aanduiding voor inhoud 3"/>
+          <p:cNvPicPr>
+            <a:picLocks noGrp="1" noChangeAspect="1"/>
+          </p:cNvPicPr>
+          <p:nvPr>
+            <p:ph idx="1"/>
+          </p:nvPr>
+        </p:nvPicPr>
+        <p:blipFill>
+          <a:blip r:embed="rId2">
+            <a:extLst>
+              <a:ext uri="{28A0092B-C50C-407E-A947-70E740481C1C}">
+                <a14:useLocalDpi xmlns:a14="http://schemas.microsoft.com/office/drawing/2010/main" val="0"/>
+              </a:ext>
+            </a:extLst>
+          </a:blip>
+          <a:stretch>
+            <a:fillRect/>
+          </a:stretch>
+        </p:blipFill>
+        <p:spPr>
+          <a:xfrm>
+            <a:off x="107504" y="1124744"/>
+            <a:ext cx="5534761" cy="4525963"/>
+          </a:xfrm>
+        </p:spPr>
+      </p:pic>
       <p:sp>
         <p:nvSpPr>
           <p:cNvPr id="2" name="Titel 1"/>
@@ -5753,72 +6608,52 @@
           <a:p>
             <a:r>
               <a:rPr lang="nl-NL" dirty="0" smtClean="0"/>
-              <a:t>Praktijk</a:t>
+              <a:t>Originele klassendiagrammen</a:t>
             </a:r>
             <a:endParaRPr lang="nl-NL" dirty="0"/>
           </a:p>
         </p:txBody>
       </p:sp>
-      <p:sp>
-        <p:nvSpPr>
-          <p:cNvPr id="3" name="Tijdelijke aanduiding voor inhoud 2"/>
-          <p:cNvSpPr>
-            <a:spLocks noGrp="1"/>
-          </p:cNvSpPr>
-          <p:nvPr>
-            <p:ph sz="quarter" idx="1"/>
-          </p:nvPr>
-        </p:nvSpPr>
-        <p:spPr/>
-        <p:txBody>
-          <a:bodyPr/>
-          <a:lstStyle/>
-          <a:p>
-            <a:r>
-              <a:rPr lang="nl-NL" dirty="0" smtClean="0"/>
-              <a:t>Wat gedaan</a:t>
-            </a:r>
-          </a:p>
-          <a:p>
-            <a:pPr lvl="1"/>
-            <a:r>
-              <a:rPr lang="nl-NL" dirty="0" smtClean="0"/>
-              <a:t>Iets</a:t>
-            </a:r>
-          </a:p>
-          <a:p>
-            <a:r>
-              <a:rPr lang="nl-NL" dirty="0" smtClean="0"/>
-              <a:t>Wat niet gedaan</a:t>
-            </a:r>
-          </a:p>
-          <a:p>
-            <a:pPr lvl="1"/>
-            <a:r>
-              <a:rPr lang="nl-NL" dirty="0" smtClean="0"/>
-              <a:t>Iets anders</a:t>
-            </a:r>
-            <a:endParaRPr lang="nl-NL" dirty="0"/>
-          </a:p>
-        </p:txBody>
-      </p:sp>
+      <p:pic>
+        <p:nvPicPr>
+          <p:cNvPr id="5" name="Afbeelding 4"/>
+          <p:cNvPicPr>
+            <a:picLocks noChangeAspect="1"/>
+          </p:cNvPicPr>
+          <p:nvPr/>
+        </p:nvPicPr>
+        <p:blipFill>
+          <a:blip r:embed="rId3">
+            <a:extLst>
+              <a:ext uri="{28A0092B-C50C-407E-A947-70E740481C1C}">
+                <a14:useLocalDpi xmlns:a14="http://schemas.microsoft.com/office/drawing/2010/main" val="0"/>
+              </a:ext>
+            </a:extLst>
+          </a:blip>
+          <a:stretch>
+            <a:fillRect/>
+          </a:stretch>
+        </p:blipFill>
+        <p:spPr>
+          <a:xfrm>
+            <a:off x="4427984" y="4450482"/>
+            <a:ext cx="4667250" cy="2533650"/>
+          </a:xfrm>
+          <a:prstGeom prst="rect">
+            <a:avLst/>
+          </a:prstGeom>
+        </p:spPr>
+      </p:pic>
     </p:spTree>
     <p:extLst>
       <p:ext uri="{BB962C8B-B14F-4D97-AF65-F5344CB8AC3E}">
-        <p14:creationId xmlns:p14="http://schemas.microsoft.com/office/powerpoint/2010/main" val="4099016534"/>
+        <p14:creationId xmlns:p14="http://schemas.microsoft.com/office/powerpoint/2010/main" val="1569959721"/>
       </p:ext>
     </p:extLst>
   </p:cSld>
   <p:clrMapOvr>
     <a:masterClrMapping/>
   </p:clrMapOvr>
-  <p:timing>
-    <p:tnLst>
-      <p:par>
-        <p:cTn id="1" dur="indefinite" restart="never" nodeType="tmRoot"/>
-      </p:par>
-    </p:tnLst>
-  </p:timing>
 </p:sld>
 </file>
 
@@ -5856,7 +6691,7 @@
           <a:p>
             <a:r>
               <a:rPr lang="nl-NL" dirty="0" smtClean="0"/>
-              <a:t>Demo</a:t>
+              <a:t>Praktijk</a:t>
             </a:r>
             <a:endParaRPr lang="nl-NL" dirty="0"/>
           </a:p>
@@ -5879,28 +6714,27 @@
           <a:p>
             <a:r>
               <a:rPr lang="nl-NL" dirty="0" smtClean="0"/>
-              <a:t>Linkje naar site:</a:t>
-            </a:r>
-          </a:p>
-          <a:p>
-            <a:endParaRPr lang="nl-NL" dirty="0"/>
-          </a:p>
-          <a:p>
+              <a:t>Wat gedaan</a:t>
+            </a:r>
+          </a:p>
+          <a:p>
+            <a:pPr lvl="1"/>
             <a:r>
               <a:rPr lang="nl-NL" dirty="0" smtClean="0"/>
-              <a:t>(Canvas draaien</a:t>
+              <a:t>Iets</a:t>
             </a:r>
           </a:p>
           <a:p>
             <a:r>
               <a:rPr lang="nl-NL" dirty="0" smtClean="0"/>
-              <a:t>Bootjeswinkel</a:t>
-            </a:r>
-          </a:p>
-          <a:p>
+              <a:t>Wat niet gedaan</a:t>
+            </a:r>
+          </a:p>
+          <a:p>
+            <a:pPr lvl="1"/>
             <a:r>
               <a:rPr lang="nl-NL" dirty="0" smtClean="0"/>
-              <a:t>Database)</a:t>
+              <a:t>Iets anders</a:t>
             </a:r>
             <a:endParaRPr lang="nl-NL" dirty="0"/>
           </a:p>
@@ -5909,7 +6743,7 @@
     </p:spTree>
     <p:extLst>
       <p:ext uri="{BB962C8B-B14F-4D97-AF65-F5344CB8AC3E}">
-        <p14:creationId xmlns:p14="http://schemas.microsoft.com/office/powerpoint/2010/main" val="1706364572"/>
+        <p14:creationId xmlns:p14="http://schemas.microsoft.com/office/powerpoint/2010/main" val="4099016534"/>
       </p:ext>
     </p:extLst>
   </p:cSld>
@@ -5943,44 +6777,38 @@
           <a:chExt cx="0" cy="0"/>
         </a:xfrm>
       </p:grpSpPr>
-      <p:pic>
-        <p:nvPicPr>
-          <p:cNvPr id="4" name="Tijdelijke aanduiding voor inhoud 3"/>
-          <p:cNvPicPr>
-            <a:picLocks noGrp="1" noChangeAspect="1"/>
-          </p:cNvPicPr>
+      <p:sp>
+        <p:nvSpPr>
+          <p:cNvPr id="2" name="Titel 1"/>
+          <p:cNvSpPr>
+            <a:spLocks noGrp="1"/>
+          </p:cNvSpPr>
+          <p:nvPr>
+            <p:ph type="title"/>
+          </p:nvPr>
+        </p:nvSpPr>
+        <p:spPr/>
+        <p:txBody>
+          <a:bodyPr/>
+          <a:lstStyle/>
+          <a:p>
+            <a:r>
+              <a:rPr lang="nl-NL" dirty="0" smtClean="0"/>
+              <a:t>Uiteindelijk klassendiagram</a:t>
+            </a:r>
+            <a:endParaRPr lang="nl-NL" dirty="0"/>
+          </a:p>
+        </p:txBody>
+      </p:sp>
+      <p:sp>
+        <p:nvSpPr>
+          <p:cNvPr id="3" name="Tijdelijke aanduiding voor inhoud 2"/>
+          <p:cNvSpPr>
+            <a:spLocks noGrp="1"/>
+          </p:cNvSpPr>
           <p:nvPr>
             <p:ph idx="1"/>
           </p:nvPr>
-        </p:nvPicPr>
-        <p:blipFill>
-          <a:blip r:embed="rId2">
-            <a:extLst>
-              <a:ext uri="{28A0092B-C50C-407E-A947-70E740481C1C}">
-                <a14:useLocalDpi xmlns:a14="http://schemas.microsoft.com/office/drawing/2010/main" val="0"/>
-              </a:ext>
-            </a:extLst>
-          </a:blip>
-          <a:stretch>
-            <a:fillRect/>
-          </a:stretch>
-        </p:blipFill>
-        <p:spPr>
-          <a:xfrm>
-            <a:off x="107504" y="1124744"/>
-            <a:ext cx="5534761" cy="4525963"/>
-          </a:xfrm>
-        </p:spPr>
-      </p:pic>
-      <p:sp>
-        <p:nvSpPr>
-          <p:cNvPr id="2" name="Titel 1"/>
-          <p:cNvSpPr>
-            <a:spLocks noGrp="1"/>
-          </p:cNvSpPr>
-          <p:nvPr>
-            <p:ph type="title"/>
-          </p:nvPr>
         </p:nvSpPr>
         <p:spPr/>
         <p:txBody>
@@ -5989,46 +6817,43 @@
           <a:p>
             <a:r>
               <a:rPr lang="nl-NL" dirty="0" smtClean="0"/>
-              <a:t>Originele klassendiagrammen</a:t>
+              <a:t>Moet je nog tekenen! Maar doe maar alleen van de model klassen, niet van de controllers enz.</a:t>
+            </a:r>
+          </a:p>
+          <a:p>
+            <a:r>
+              <a:rPr lang="nl-NL" dirty="0" smtClean="0"/>
+              <a:t>Waarom is dat anders?</a:t>
+            </a:r>
+          </a:p>
+          <a:p>
+            <a:pPr lvl="1"/>
+            <a:r>
+              <a:rPr lang="nl-NL" dirty="0" smtClean="0"/>
+              <a:t>Tijdsgebrek</a:t>
+            </a:r>
+          </a:p>
+          <a:p>
+            <a:pPr lvl="1"/>
+            <a:r>
+              <a:rPr lang="nl-NL" dirty="0" smtClean="0"/>
+              <a:t>Praktische overwegingen (windstreek weg, bordkolom erbij)</a:t>
+            </a:r>
+          </a:p>
+          <a:p>
+            <a:pPr lvl="1"/>
+            <a:r>
+              <a:rPr lang="nl-NL" smtClean="0"/>
+              <a:t>…</a:t>
             </a:r>
             <a:endParaRPr lang="nl-NL" dirty="0"/>
           </a:p>
         </p:txBody>
       </p:sp>
-      <p:pic>
-        <p:nvPicPr>
-          <p:cNvPr id="5" name="Afbeelding 4"/>
-          <p:cNvPicPr>
-            <a:picLocks noChangeAspect="1"/>
-          </p:cNvPicPr>
-          <p:nvPr/>
-        </p:nvPicPr>
-        <p:blipFill>
-          <a:blip r:embed="rId3">
-            <a:extLst>
-              <a:ext uri="{28A0092B-C50C-407E-A947-70E740481C1C}">
-                <a14:useLocalDpi xmlns:a14="http://schemas.microsoft.com/office/drawing/2010/main" val="0"/>
-              </a:ext>
-            </a:extLst>
-          </a:blip>
-          <a:stretch>
-            <a:fillRect/>
-          </a:stretch>
-        </p:blipFill>
-        <p:spPr>
-          <a:xfrm>
-            <a:off x="4427984" y="4450482"/>
-            <a:ext cx="4667250" cy="2533650"/>
-          </a:xfrm>
-          <a:prstGeom prst="rect">
-            <a:avLst/>
-          </a:prstGeom>
-        </p:spPr>
-      </p:pic>
     </p:spTree>
     <p:extLst>
       <p:ext uri="{BB962C8B-B14F-4D97-AF65-F5344CB8AC3E}">
-        <p14:creationId xmlns:p14="http://schemas.microsoft.com/office/powerpoint/2010/main" val="1569959721"/>
+        <p14:creationId xmlns:p14="http://schemas.microsoft.com/office/powerpoint/2010/main" val="923071329"/>
       </p:ext>
     </p:extLst>
   </p:cSld>
@@ -6072,7 +6897,7 @@
           <a:p>
             <a:r>
               <a:rPr lang="nl-NL" dirty="0" smtClean="0"/>
-              <a:t>Uiteindelijk klassendiagram</a:t>
+              <a:t>Demo</a:t>
             </a:r>
             <a:endParaRPr lang="nl-NL" dirty="0"/>
           </a:p>
@@ -6085,7 +6910,7 @@
             <a:spLocks noGrp="1"/>
           </p:cNvSpPr>
           <p:nvPr>
-            <p:ph idx="1"/>
+            <p:ph sz="quarter" idx="1"/>
           </p:nvPr>
         </p:nvSpPr>
         <p:spPr/>
@@ -6095,34 +6920,36 @@
           <a:p>
             <a:r>
               <a:rPr lang="nl-NL" dirty="0" smtClean="0"/>
-              <a:t>Moet je nog tekenen! Maar doe maar alleen van de model klassen, niet van de controllers enz.</a:t>
-            </a:r>
+              <a:t>Linkje naar site</a:t>
+            </a:r>
+            <a:r>
+              <a:rPr lang="nl-NL" dirty="0"/>
+              <a:t>: </a:t>
+            </a:r>
+            <a:r>
+              <a:rPr lang="nl-NL" dirty="0">
+                <a:hlinkClick r:id="rId3"/>
+              </a:rPr>
+              <a:t>http://10.2.20.105:8080/</a:t>
+            </a:r>
+            <a:endParaRPr lang="nl-NL" dirty="0"/>
           </a:p>
           <a:p>
             <a:r>
               <a:rPr lang="nl-NL" dirty="0" smtClean="0"/>
-              <a:t>Waarom is dat anders?</a:t>
-            </a:r>
-          </a:p>
-          <a:p>
-            <a:pPr lvl="1"/>
+              <a:t>(Canvas draaien</a:t>
+            </a:r>
+          </a:p>
+          <a:p>
             <a:r>
               <a:rPr lang="nl-NL" dirty="0" smtClean="0"/>
-              <a:t>Tijdsgebrek</a:t>
-            </a:r>
-          </a:p>
-          <a:p>
-            <a:pPr lvl="1"/>
+              <a:t>Bootjeswinkel</a:t>
+            </a:r>
+          </a:p>
+          <a:p>
             <a:r>
               <a:rPr lang="nl-NL" dirty="0" smtClean="0"/>
-              <a:t>Praktische overwegingen (windstreek weg, bordkolom erbij)</a:t>
-            </a:r>
-          </a:p>
-          <a:p>
-            <a:pPr lvl="1"/>
-            <a:r>
-              <a:rPr lang="nl-NL" smtClean="0"/>
-              <a:t>…</a:t>
+              <a:t>Database)</a:t>
             </a:r>
             <a:endParaRPr lang="nl-NL" dirty="0"/>
           </a:p>
@@ -6131,13 +6958,20 @@
     </p:spTree>
     <p:extLst>
       <p:ext uri="{BB962C8B-B14F-4D97-AF65-F5344CB8AC3E}">
-        <p14:creationId xmlns:p14="http://schemas.microsoft.com/office/powerpoint/2010/main" val="923071329"/>
+        <p14:creationId xmlns:p14="http://schemas.microsoft.com/office/powerpoint/2010/main" val="1706364572"/>
       </p:ext>
     </p:extLst>
   </p:cSld>
   <p:clrMapOvr>
     <a:masterClrMapping/>
   </p:clrMapOvr>
+  <p:timing>
+    <p:tnLst>
+      <p:par>
+        <p:cTn id="1" dur="indefinite" restart="never" nodeType="tmRoot"/>
+      </p:par>
+    </p:tnLst>
+  </p:timing>
 </p:sld>
 </file>
 
@@ -6749,4 +7583,289 @@
   <a:objectDefaults/>
   <a:extraClrSchemeLst/>
 </a:theme>
+</file>
+
+<file path=ppt/theme/theme2.xml><?xml version="1.0" encoding="utf-8"?>
+<a:theme xmlns:a="http://schemas.openxmlformats.org/drawingml/2006/main" name="Kantoorthema">
+  <a:themeElements>
+    <a:clrScheme name="Kantoor">
+      <a:dk1>
+        <a:sysClr val="windowText" lastClr="000000"/>
+      </a:dk1>
+      <a:lt1>
+        <a:sysClr val="window" lastClr="FFFFFF"/>
+      </a:lt1>
+      <a:dk2>
+        <a:srgbClr val="1F497D"/>
+      </a:dk2>
+      <a:lt2>
+        <a:srgbClr val="EEECE1"/>
+      </a:lt2>
+      <a:accent1>
+        <a:srgbClr val="4F81BD"/>
+      </a:accent1>
+      <a:accent2>
+        <a:srgbClr val="C0504D"/>
+      </a:accent2>
+      <a:accent3>
+        <a:srgbClr val="9BBB59"/>
+      </a:accent3>
+      <a:accent4>
+        <a:srgbClr val="8064A2"/>
+      </a:accent4>
+      <a:accent5>
+        <a:srgbClr val="4BACC6"/>
+      </a:accent5>
+      <a:accent6>
+        <a:srgbClr val="F79646"/>
+      </a:accent6>
+      <a:hlink>
+        <a:srgbClr val="0000FF"/>
+      </a:hlink>
+      <a:folHlink>
+        <a:srgbClr val="800080"/>
+      </a:folHlink>
+    </a:clrScheme>
+    <a:fontScheme name="Kantoor">
+      <a:majorFont>
+        <a:latin typeface="Calibri"/>
+        <a:ea typeface=""/>
+        <a:cs typeface=""/>
+        <a:font script="Jpan" typeface="ＭＳ Ｐゴシック"/>
+        <a:font script="Hang" typeface="맑은 고딕"/>
+        <a:font script="Hans" typeface="宋体"/>
+        <a:font script="Hant" typeface="新細明體"/>
+        <a:font script="Arab" typeface="Times New Roman"/>
+        <a:font script="Hebr" typeface="Times New Roman"/>
+        <a:font script="Thai" typeface="Angsana New"/>
+        <a:font script="Ethi" typeface="Nyala"/>
+        <a:font script="Beng" typeface="Vrinda"/>
+        <a:font script="Gujr" typeface="Shruti"/>
+        <a:font script="Khmr" typeface="MoolBoran"/>
+        <a:font script="Knda" typeface="Tunga"/>
+        <a:font script="Guru" typeface="Raavi"/>
+        <a:font script="Cans" typeface="Euphemia"/>
+        <a:font script="Cher" typeface="Plantagenet Cherokee"/>
+        <a:font script="Yiii" typeface="Microsoft Yi Baiti"/>
+        <a:font script="Tibt" typeface="Microsoft Himalaya"/>
+        <a:font script="Thaa" typeface="MV Boli"/>
+        <a:font script="Deva" typeface="Mangal"/>
+        <a:font script="Telu" typeface="Gautami"/>
+        <a:font script="Taml" typeface="Latha"/>
+        <a:font script="Syrc" typeface="Estrangelo Edessa"/>
+        <a:font script="Orya" typeface="Kalinga"/>
+        <a:font script="Mlym" typeface="Kartika"/>
+        <a:font script="Laoo" typeface="DokChampa"/>
+        <a:font script="Sinh" typeface="Iskoola Pota"/>
+        <a:font script="Mong" typeface="Mongolian Baiti"/>
+        <a:font script="Viet" typeface="Times New Roman"/>
+        <a:font script="Uigh" typeface="Microsoft Uighur"/>
+        <a:font script="Geor" typeface="Sylfaen"/>
+      </a:majorFont>
+      <a:minorFont>
+        <a:latin typeface="Calibri"/>
+        <a:ea typeface=""/>
+        <a:cs typeface=""/>
+        <a:font script="Jpan" typeface="ＭＳ Ｐゴシック"/>
+        <a:font script="Hang" typeface="맑은 고딕"/>
+        <a:font script="Hans" typeface="宋体"/>
+        <a:font script="Hant" typeface="新細明體"/>
+        <a:font script="Arab" typeface="Arial"/>
+        <a:font script="Hebr" typeface="Arial"/>
+        <a:font script="Thai" typeface="Cordia New"/>
+        <a:font script="Ethi" typeface="Nyala"/>
+        <a:font script="Beng" typeface="Vrinda"/>
+        <a:font script="Gujr" typeface="Shruti"/>
+        <a:font script="Khmr" typeface="DaunPenh"/>
+        <a:font script="Knda" typeface="Tunga"/>
+        <a:font script="Guru" typeface="Raavi"/>
+        <a:font script="Cans" typeface="Euphemia"/>
+        <a:font script="Cher" typeface="Plantagenet Cherokee"/>
+        <a:font script="Yiii" typeface="Microsoft Yi Baiti"/>
+        <a:font script="Tibt" typeface="Microsoft Himalaya"/>
+        <a:font script="Thaa" typeface="MV Boli"/>
+        <a:font script="Deva" typeface="Mangal"/>
+        <a:font script="Telu" typeface="Gautami"/>
+        <a:font script="Taml" typeface="Latha"/>
+        <a:font script="Syrc" typeface="Estrangelo Edessa"/>
+        <a:font script="Orya" typeface="Kalinga"/>
+        <a:font script="Mlym" typeface="Kartika"/>
+        <a:font script="Laoo" typeface="DokChampa"/>
+        <a:font script="Sinh" typeface="Iskoola Pota"/>
+        <a:font script="Mong" typeface="Mongolian Baiti"/>
+        <a:font script="Viet" typeface="Arial"/>
+        <a:font script="Uigh" typeface="Microsoft Uighur"/>
+        <a:font script="Geor" typeface="Sylfaen"/>
+      </a:minorFont>
+    </a:fontScheme>
+    <a:fmtScheme name="Kantoor">
+      <a:fillStyleLst>
+        <a:solidFill>
+          <a:schemeClr val="phClr"/>
+        </a:solidFill>
+        <a:gradFill rotWithShape="1">
+          <a:gsLst>
+            <a:gs pos="0">
+              <a:schemeClr val="phClr">
+                <a:tint val="50000"/>
+                <a:satMod val="300000"/>
+              </a:schemeClr>
+            </a:gs>
+            <a:gs pos="35000">
+              <a:schemeClr val="phClr">
+                <a:tint val="37000"/>
+                <a:satMod val="300000"/>
+              </a:schemeClr>
+            </a:gs>
+            <a:gs pos="100000">
+              <a:schemeClr val="phClr">
+                <a:tint val="15000"/>
+                <a:satMod val="350000"/>
+              </a:schemeClr>
+            </a:gs>
+          </a:gsLst>
+          <a:lin ang="16200000" scaled="1"/>
+        </a:gradFill>
+        <a:gradFill rotWithShape="1">
+          <a:gsLst>
+            <a:gs pos="0">
+              <a:schemeClr val="phClr">
+                <a:shade val="51000"/>
+                <a:satMod val="130000"/>
+              </a:schemeClr>
+            </a:gs>
+            <a:gs pos="80000">
+              <a:schemeClr val="phClr">
+                <a:shade val="93000"/>
+                <a:satMod val="130000"/>
+              </a:schemeClr>
+            </a:gs>
+            <a:gs pos="100000">
+              <a:schemeClr val="phClr">
+                <a:shade val="94000"/>
+                <a:satMod val="135000"/>
+              </a:schemeClr>
+            </a:gs>
+          </a:gsLst>
+          <a:lin ang="16200000" scaled="0"/>
+        </a:gradFill>
+      </a:fillStyleLst>
+      <a:lnStyleLst>
+        <a:ln w="9525" cap="flat" cmpd="sng" algn="ctr">
+          <a:solidFill>
+            <a:schemeClr val="phClr">
+              <a:shade val="95000"/>
+              <a:satMod val="105000"/>
+            </a:schemeClr>
+          </a:solidFill>
+          <a:prstDash val="solid"/>
+        </a:ln>
+        <a:ln w="25400" cap="flat" cmpd="sng" algn="ctr">
+          <a:solidFill>
+            <a:schemeClr val="phClr"/>
+          </a:solidFill>
+          <a:prstDash val="solid"/>
+        </a:ln>
+        <a:ln w="38100" cap="flat" cmpd="sng" algn="ctr">
+          <a:solidFill>
+            <a:schemeClr val="phClr"/>
+          </a:solidFill>
+          <a:prstDash val="solid"/>
+        </a:ln>
+      </a:lnStyleLst>
+      <a:effectStyleLst>
+        <a:effectStyle>
+          <a:effectLst>
+            <a:outerShdw blurRad="40000" dist="20000" dir="5400000" rotWithShape="0">
+              <a:srgbClr val="000000">
+                <a:alpha val="38000"/>
+              </a:srgbClr>
+            </a:outerShdw>
+          </a:effectLst>
+        </a:effectStyle>
+        <a:effectStyle>
+          <a:effectLst>
+            <a:outerShdw blurRad="40000" dist="23000" dir="5400000" rotWithShape="0">
+              <a:srgbClr val="000000">
+                <a:alpha val="35000"/>
+              </a:srgbClr>
+            </a:outerShdw>
+          </a:effectLst>
+        </a:effectStyle>
+        <a:effectStyle>
+          <a:effectLst>
+            <a:outerShdw blurRad="40000" dist="23000" dir="5400000" rotWithShape="0">
+              <a:srgbClr val="000000">
+                <a:alpha val="35000"/>
+              </a:srgbClr>
+            </a:outerShdw>
+          </a:effectLst>
+          <a:scene3d>
+            <a:camera prst="orthographicFront">
+              <a:rot lat="0" lon="0" rev="0"/>
+            </a:camera>
+            <a:lightRig rig="threePt" dir="t">
+              <a:rot lat="0" lon="0" rev="1200000"/>
+            </a:lightRig>
+          </a:scene3d>
+          <a:sp3d>
+            <a:bevelT w="63500" h="25400"/>
+          </a:sp3d>
+        </a:effectStyle>
+      </a:effectStyleLst>
+      <a:bgFillStyleLst>
+        <a:solidFill>
+          <a:schemeClr val="phClr"/>
+        </a:solidFill>
+        <a:gradFill rotWithShape="1">
+          <a:gsLst>
+            <a:gs pos="0">
+              <a:schemeClr val="phClr">
+                <a:tint val="40000"/>
+                <a:satMod val="350000"/>
+              </a:schemeClr>
+            </a:gs>
+            <a:gs pos="40000">
+              <a:schemeClr val="phClr">
+                <a:tint val="45000"/>
+                <a:shade val="99000"/>
+                <a:satMod val="350000"/>
+              </a:schemeClr>
+            </a:gs>
+            <a:gs pos="100000">
+              <a:schemeClr val="phClr">
+                <a:shade val="20000"/>
+                <a:satMod val="255000"/>
+              </a:schemeClr>
+            </a:gs>
+          </a:gsLst>
+          <a:path path="circle">
+            <a:fillToRect l="50000" t="-80000" r="50000" b="180000"/>
+          </a:path>
+        </a:gradFill>
+        <a:gradFill rotWithShape="1">
+          <a:gsLst>
+            <a:gs pos="0">
+              <a:schemeClr val="phClr">
+                <a:tint val="80000"/>
+                <a:satMod val="300000"/>
+              </a:schemeClr>
+            </a:gs>
+            <a:gs pos="100000">
+              <a:schemeClr val="phClr">
+                <a:shade val="30000"/>
+                <a:satMod val="200000"/>
+              </a:schemeClr>
+            </a:gs>
+          </a:gsLst>
+          <a:path path="circle">
+            <a:fillToRect l="50000" t="50000" r="50000" b="50000"/>
+          </a:path>
+        </a:gradFill>
+      </a:bgFillStyleLst>
+    </a:fmtScheme>
+  </a:themeElements>
+  <a:objectDefaults/>
+  <a:extraClrSchemeLst/>
+</a:theme>
 </file>
</xml_diff>

<commit_message>
Presentatie sheets van mij (Jenny) beter gemaakt. Also een klassendiagram after ingevoegd
</commit_message>
<xml_diff>
--- a/presentatie.pptx
+++ b/presentatie.pptx
@@ -5,23 +5,17 @@
     <p:sldMasterId id="2147483780" r:id="rId1"/>
   </p:sldMasterIdLst>
   <p:notesMasterIdLst>
-    <p:notesMasterId r:id="rId16"/>
+    <p:notesMasterId r:id="rId10"/>
   </p:notesMasterIdLst>
   <p:sldIdLst>
     <p:sldId id="256" r:id="rId2"/>
     <p:sldId id="257" r:id="rId3"/>
     <p:sldId id="262" r:id="rId4"/>
-    <p:sldId id="258" r:id="rId5"/>
-    <p:sldId id="263" r:id="rId6"/>
-    <p:sldId id="259" r:id="rId7"/>
-    <p:sldId id="264" r:id="rId8"/>
-    <p:sldId id="265" r:id="rId9"/>
-    <p:sldId id="266" r:id="rId10"/>
-    <p:sldId id="267" r:id="rId11"/>
-    <p:sldId id="268" r:id="rId12"/>
-    <p:sldId id="269" r:id="rId13"/>
-    <p:sldId id="260" r:id="rId14"/>
-    <p:sldId id="261" r:id="rId15"/>
+    <p:sldId id="263" r:id="rId5"/>
+    <p:sldId id="270" r:id="rId6"/>
+    <p:sldId id="269" r:id="rId7"/>
+    <p:sldId id="260" r:id="rId8"/>
+    <p:sldId id="261" r:id="rId9"/>
   </p:sldIdLst>
   <p:sldSz cx="9144000" cy="6858000" type="screen4x3"/>
   <p:notesSz cx="6858000" cy="9144000"/>
@@ -205,7 +199,7 @@
           <a:p>
             <a:fld id="{3FABBBE2-9040-40DB-A1C3-37688CBDF225}" type="datetimeFigureOut">
               <a:rPr lang="nl-NL" smtClean="0"/>
-              <a:t>30-11-2016</a:t>
+              <a:t>1-12-2016</a:t>
             </a:fld>
             <a:endParaRPr lang="nl-NL"/>
           </a:p>
@@ -364,7 +358,7 @@
           <a:p>
             <a:fld id="{2AD8EA39-74BD-48E9-85FD-20DFA51CADF1}" type="slidenum">
               <a:rPr lang="nl-NL" smtClean="0"/>
-              <a:t>‹nr.›</a:t>
+              <a:t>‹#›</a:t>
             </a:fld>
             <a:endParaRPr lang="nl-NL"/>
           </a:p>
@@ -492,7 +486,7 @@
       </p:grpSpPr>
       <p:sp>
         <p:nvSpPr>
-          <p:cNvPr id="2" name="Tijdelijke aanduiding voor dia-afbeelding 1"/>
+          <p:cNvPr id="2" name="Slide Image Placeholder 1"/>
           <p:cNvSpPr>
             <a:spLocks noGrp="1" noRot="1" noChangeAspect="1"/>
           </p:cNvSpPr>
@@ -504,7 +498,7 @@
       </p:sp>
       <p:sp>
         <p:nvSpPr>
-          <p:cNvPr id="3" name="Tijdelijke aanduiding voor notities 2"/>
+          <p:cNvPr id="3" name="Notes Placeholder 2"/>
           <p:cNvSpPr>
             <a:spLocks noGrp="1"/>
           </p:cNvSpPr>
@@ -518,20 +512,16 @@
           <a:lstStyle/>
           <a:p>
             <a:r>
-              <a:rPr lang="nl-NL" dirty="0" smtClean="0"/>
-              <a:t>2</a:t>
-            </a:r>
-            <a:r>
-              <a:rPr lang="nl-NL" baseline="0" dirty="0" smtClean="0"/>
-              <a:t> minuten voor dit en het klassendiagram</a:t>
-            </a:r>
-            <a:endParaRPr lang="nl-NL" dirty="0"/>
-          </a:p>
-        </p:txBody>
-      </p:sp>
-      <p:sp>
-        <p:nvSpPr>
-          <p:cNvPr id="4" name="Tijdelijke aanduiding voor dianummer 3"/>
+              <a:rPr lang="en-US" dirty="0" smtClean="0"/>
+              <a:t>FEIA</a:t>
+            </a:r>
+            <a:endParaRPr lang="en-US" dirty="0"/>
+          </a:p>
+        </p:txBody>
+      </p:sp>
+      <p:sp>
+        <p:nvSpPr>
+          <p:cNvPr id="4" name="Slide Number Placeholder 3"/>
           <p:cNvSpPr>
             <a:spLocks noGrp="1"/>
           </p:cNvSpPr>
@@ -546,7 +536,7 @@
           <a:p>
             <a:fld id="{2AD8EA39-74BD-48E9-85FD-20DFA51CADF1}" type="slidenum">
               <a:rPr lang="nl-NL" smtClean="0"/>
-              <a:t>2</a:t>
+              <a:t>1</a:t>
             </a:fld>
             <a:endParaRPr lang="nl-NL"/>
           </a:p>
@@ -555,7 +545,7 @@
     </p:spTree>
     <p:extLst>
       <p:ext uri="{BB962C8B-B14F-4D97-AF65-F5344CB8AC3E}">
-        <p14:creationId xmlns:p14="http://schemas.microsoft.com/office/powerpoint/2010/main" val="1377582382"/>
+        <p14:creationId xmlns:p14="http://schemas.microsoft.com/office/powerpoint/2010/main" val="2790018363"/>
       </p:ext>
     </p:extLst>
   </p:cSld>
@@ -611,9 +601,30 @@
           <a:p>
             <a:r>
               <a:rPr lang="nl-NL" dirty="0" smtClean="0"/>
-              <a:t>2 minuten voor dit en het tweede klassendiagram</a:t>
-            </a:r>
-            <a:endParaRPr lang="nl-NL" dirty="0"/>
+              <a:t>2</a:t>
+            </a:r>
+            <a:r>
+              <a:rPr lang="nl-NL" baseline="0" dirty="0" smtClean="0"/>
+              <a:t> </a:t>
+            </a:r>
+            <a:r>
+              <a:rPr lang="nl-NL" baseline="0" dirty="0" smtClean="0"/>
+              <a:t>minuten voor </a:t>
+            </a:r>
+            <a:r>
+              <a:rPr lang="nl-NL" baseline="0" dirty="0" smtClean="0"/>
+              <a:t>dit en het </a:t>
+            </a:r>
+            <a:r>
+              <a:rPr lang="nl-NL" baseline="0" dirty="0" smtClean="0"/>
+              <a:t>klassendiagram</a:t>
+            </a:r>
+          </a:p>
+          <a:p>
+            <a:r>
+              <a:rPr lang="nl-NL" baseline="0" dirty="0" smtClean="0"/>
+              <a:t>FEIA</a:t>
+            </a:r>
           </a:p>
         </p:txBody>
       </p:sp>
@@ -634,7 +645,7 @@
           <a:p>
             <a:fld id="{2AD8EA39-74BD-48E9-85FD-20DFA51CADF1}" type="slidenum">
               <a:rPr lang="nl-NL" smtClean="0"/>
-              <a:t>4</a:t>
+              <a:t>2</a:t>
             </a:fld>
             <a:endParaRPr lang="nl-NL"/>
           </a:p>
@@ -643,7 +654,7 @@
     </p:spTree>
     <p:extLst>
       <p:ext uri="{BB962C8B-B14F-4D97-AF65-F5344CB8AC3E}">
-        <p14:creationId xmlns:p14="http://schemas.microsoft.com/office/powerpoint/2010/main" val="187992077"/>
+        <p14:creationId xmlns:p14="http://schemas.microsoft.com/office/powerpoint/2010/main" val="1377582382"/>
       </p:ext>
     </p:extLst>
   </p:cSld>
@@ -672,7 +683,7 @@
       </p:grpSpPr>
       <p:sp>
         <p:nvSpPr>
-          <p:cNvPr id="2" name="Tijdelijke aanduiding voor dia-afbeelding 1"/>
+          <p:cNvPr id="2" name="Slide Image Placeholder 1"/>
           <p:cNvSpPr>
             <a:spLocks noGrp="1" noRot="1" noChangeAspect="1"/>
           </p:cNvSpPr>
@@ -684,7 +695,7 @@
       </p:sp>
       <p:sp>
         <p:nvSpPr>
-          <p:cNvPr id="3" name="Tijdelijke aanduiding voor notities 2"/>
+          <p:cNvPr id="3" name="Notes Placeholder 2"/>
           <p:cNvSpPr>
             <a:spLocks noGrp="1"/>
           </p:cNvSpPr>
@@ -698,28 +709,16 @@
           <a:lstStyle/>
           <a:p>
             <a:r>
-              <a:rPr lang="nl-NL" dirty="0" smtClean="0"/>
-              <a:t>7 minuten demo:</a:t>
-            </a:r>
-            <a:r>
-              <a:rPr lang="nl-NL" baseline="0" dirty="0" smtClean="0"/>
-              <a:t> ieder 3.5 minuut. </a:t>
-            </a:r>
-            <a:r>
-              <a:rPr lang="nl-NL" baseline="0" dirty="0" err="1" smtClean="0"/>
-              <a:t>Feia</a:t>
-            </a:r>
-            <a:r>
-              <a:rPr lang="nl-NL" baseline="0" dirty="0" smtClean="0"/>
-              <a:t> doet huidige tegel en bord. Jenny doet de rest.</a:t>
-            </a:r>
-            <a:endParaRPr lang="nl-NL" dirty="0"/>
-          </a:p>
-        </p:txBody>
-      </p:sp>
-      <p:sp>
-        <p:nvSpPr>
-          <p:cNvPr id="4" name="Tijdelijke aanduiding voor dianummer 3"/>
+              <a:rPr lang="en-US" dirty="0" smtClean="0"/>
+              <a:t>FEIA</a:t>
+            </a:r>
+            <a:endParaRPr lang="en-US" dirty="0"/>
+          </a:p>
+        </p:txBody>
+      </p:sp>
+      <p:sp>
+        <p:nvSpPr>
+          <p:cNvPr id="4" name="Slide Number Placeholder 3"/>
           <p:cNvSpPr>
             <a:spLocks noGrp="1"/>
           </p:cNvSpPr>
@@ -734,7 +733,7 @@
           <a:p>
             <a:fld id="{2AD8EA39-74BD-48E9-85FD-20DFA51CADF1}" type="slidenum">
               <a:rPr lang="nl-NL" smtClean="0"/>
-              <a:t>6</a:t>
+              <a:t>3</a:t>
             </a:fld>
             <a:endParaRPr lang="nl-NL"/>
           </a:p>
@@ -743,7 +742,7 @@
     </p:spTree>
     <p:extLst>
       <p:ext uri="{BB962C8B-B14F-4D97-AF65-F5344CB8AC3E}">
-        <p14:creationId xmlns:p14="http://schemas.microsoft.com/office/powerpoint/2010/main" val="87282823"/>
+        <p14:creationId xmlns:p14="http://schemas.microsoft.com/office/powerpoint/2010/main" val="3828810523"/>
       </p:ext>
     </p:extLst>
   </p:cSld>
@@ -772,7 +771,7 @@
       </p:grpSpPr>
       <p:sp>
         <p:nvSpPr>
-          <p:cNvPr id="2" name="Tijdelijke aanduiding voor dia-afbeelding 1"/>
+          <p:cNvPr id="2" name="Slide Image Placeholder 1"/>
           <p:cNvSpPr>
             <a:spLocks noGrp="1" noRot="1" noChangeAspect="1"/>
           </p:cNvSpPr>
@@ -784,7 +783,7 @@
       </p:sp>
       <p:sp>
         <p:nvSpPr>
-          <p:cNvPr id="3" name="Tijdelijke aanduiding voor notities 2"/>
+          <p:cNvPr id="3" name="Notes Placeholder 2"/>
           <p:cNvSpPr>
             <a:spLocks noGrp="1"/>
           </p:cNvSpPr>
@@ -799,15 +798,98 @@
           <a:p>
             <a:r>
               <a:rPr lang="nl-NL" dirty="0" smtClean="0"/>
-              <a:t>2 minuten wat hebben we geleerd (per persoon)</a:t>
-            </a:r>
-            <a:endParaRPr lang="nl-NL" dirty="0"/>
-          </a:p>
-        </p:txBody>
-      </p:sp>
-      <p:sp>
-        <p:nvSpPr>
-          <p:cNvPr id="4" name="Tijdelijke aanduiding voor dianummer 3"/>
+              <a:t>2</a:t>
+            </a:r>
+            <a:r>
+              <a:rPr lang="nl-NL" baseline="0" dirty="0" smtClean="0"/>
+              <a:t> minuten</a:t>
+            </a:r>
+            <a:endParaRPr lang="nl-NL" dirty="0" smtClean="0"/>
+          </a:p>
+          <a:p>
+            <a:r>
+              <a:rPr lang="nl-NL" dirty="0" smtClean="0"/>
+              <a:t>JENNY</a:t>
+            </a:r>
+          </a:p>
+          <a:p>
+            <a:r>
+              <a:rPr lang="nl-NL" dirty="0" smtClean="0"/>
+              <a:t>Wat is anders?</a:t>
+            </a:r>
+          </a:p>
+          <a:p>
+            <a:r>
+              <a:rPr lang="nl-NL" dirty="0" smtClean="0"/>
+              <a:t>	weg:</a:t>
+            </a:r>
+          </a:p>
+          <a:p>
+            <a:r>
+              <a:rPr lang="nl-NL" dirty="0" smtClean="0"/>
+              <a:t>	Poppetje,</a:t>
+            </a:r>
+            <a:r>
+              <a:rPr lang="nl-NL" baseline="0" dirty="0" smtClean="0"/>
+              <a:t> Bord, Windstreek. Hele netwerk package</a:t>
+            </a:r>
+          </a:p>
+          <a:p>
+            <a:r>
+              <a:rPr lang="nl-NL" baseline="0" dirty="0" smtClean="0"/>
+              <a:t>	erbij:</a:t>
+            </a:r>
+          </a:p>
+          <a:p>
+            <a:r>
+              <a:rPr lang="nl-NL" baseline="0" dirty="0" smtClean="0"/>
+              <a:t>	</a:t>
+            </a:r>
+            <a:r>
+              <a:rPr lang="nl-NL" baseline="0" dirty="0" err="1" smtClean="0"/>
+              <a:t>BordKolom</a:t>
+            </a:r>
+            <a:r>
+              <a:rPr lang="nl-NL" baseline="0" dirty="0" smtClean="0"/>
+              <a:t>. Link tussen bootje en bootjeswinkel</a:t>
+            </a:r>
+            <a:endParaRPr lang="nl-NL" dirty="0" smtClean="0"/>
+          </a:p>
+          <a:p>
+            <a:r>
+              <a:rPr lang="nl-NL" dirty="0" smtClean="0"/>
+              <a:t>Waarom is dat anders?</a:t>
+            </a:r>
+          </a:p>
+          <a:p>
+            <a:pPr lvl="1"/>
+            <a:r>
+              <a:rPr lang="nl-NL" dirty="0" smtClean="0"/>
+              <a:t>Tijdsgebrek</a:t>
+            </a:r>
+          </a:p>
+          <a:p>
+            <a:pPr lvl="1"/>
+            <a:r>
+              <a:rPr lang="nl-NL" dirty="0" smtClean="0"/>
+              <a:t>Praktische overwegingen (windstreek weg, bordkolom erbij)</a:t>
+            </a:r>
+          </a:p>
+          <a:p>
+            <a:pPr lvl="1"/>
+            <a:r>
+              <a:rPr lang="nl-NL" dirty="0" smtClean="0"/>
+              <a:t>…</a:t>
+            </a:r>
+          </a:p>
+          <a:p>
+            <a:endParaRPr lang="en-US" dirty="0"/>
+          </a:p>
+        </p:txBody>
+      </p:sp>
+      <p:sp>
+        <p:nvSpPr>
+          <p:cNvPr id="4" name="Slide Number Placeholder 3"/>
           <p:cNvSpPr>
             <a:spLocks noGrp="1"/>
           </p:cNvSpPr>
@@ -822,7 +904,7 @@
           <a:p>
             <a:fld id="{2AD8EA39-74BD-48E9-85FD-20DFA51CADF1}" type="slidenum">
               <a:rPr lang="nl-NL" smtClean="0"/>
-              <a:t>12</a:t>
+              <a:t>4</a:t>
             </a:fld>
             <a:endParaRPr lang="nl-NL"/>
           </a:p>
@@ -831,7 +913,7 @@
     </p:spTree>
     <p:extLst>
       <p:ext uri="{BB962C8B-B14F-4D97-AF65-F5344CB8AC3E}">
-        <p14:creationId xmlns:p14="http://schemas.microsoft.com/office/powerpoint/2010/main" val="181902196"/>
+        <p14:creationId xmlns:p14="http://schemas.microsoft.com/office/powerpoint/2010/main" val="2359285320"/>
       </p:ext>
     </p:extLst>
   </p:cSld>
@@ -860,7 +942,7 @@
       </p:grpSpPr>
       <p:sp>
         <p:nvSpPr>
-          <p:cNvPr id="2" name="Tijdelijke aanduiding voor dia-afbeelding 1"/>
+          <p:cNvPr id="2" name="Slide Image Placeholder 1"/>
           <p:cNvSpPr>
             <a:spLocks noGrp="1" noRot="1" noChangeAspect="1"/>
           </p:cNvSpPr>
@@ -872,7 +954,7 @@
       </p:sp>
       <p:sp>
         <p:nvSpPr>
-          <p:cNvPr id="3" name="Tijdelijke aanduiding voor notities 2"/>
+          <p:cNvPr id="3" name="Notes Placeholder 2"/>
           <p:cNvSpPr>
             <a:spLocks noGrp="1"/>
           </p:cNvSpPr>
@@ -885,13 +967,264 @@
           <a:bodyPr/>
           <a:lstStyle/>
           <a:p>
-            <a:endParaRPr lang="nl-NL" dirty="0"/>
-          </a:p>
-        </p:txBody>
-      </p:sp>
-      <p:sp>
-        <p:nvSpPr>
-          <p:cNvPr id="4" name="Tijdelijke aanduiding voor dianummer 3"/>
+            <a:r>
+              <a:rPr lang="nl-NL" dirty="0" smtClean="0"/>
+              <a:t>7 minuten demo:</a:t>
+            </a:r>
+            <a:r>
+              <a:rPr lang="nl-NL" baseline="0" dirty="0" smtClean="0"/>
+              <a:t> ieder 3.5 minuut. </a:t>
+            </a:r>
+            <a:r>
+              <a:rPr lang="nl-NL" baseline="0" dirty="0" err="1" smtClean="0"/>
+              <a:t>Feia</a:t>
+            </a:r>
+            <a:r>
+              <a:rPr lang="nl-NL" baseline="0" dirty="0" smtClean="0"/>
+              <a:t> doet huidige tegel en bord. Jenny doet de rest</a:t>
+            </a:r>
+          </a:p>
+          <a:p>
+            <a:r>
+              <a:rPr lang="nl-NL" baseline="0" dirty="0" smtClean="0"/>
+              <a:t>JENNY (begint </a:t>
+            </a:r>
+            <a:r>
+              <a:rPr lang="nl-NL" baseline="0" dirty="0" err="1" smtClean="0"/>
+              <a:t>iig</a:t>
+            </a:r>
+            <a:r>
+              <a:rPr lang="nl-NL" baseline="0" dirty="0" smtClean="0"/>
+              <a:t>).</a:t>
+            </a:r>
+          </a:p>
+          <a:p>
+            <a:endParaRPr lang="nl-NL" baseline="0" dirty="0" smtClean="0"/>
+          </a:p>
+          <a:p>
+            <a:r>
+              <a:rPr lang="nl-NL" dirty="0" smtClean="0"/>
+              <a:t>Linkje naar site: </a:t>
+            </a:r>
+            <a:r>
+              <a:rPr lang="nl-NL" dirty="0" smtClean="0">
+                <a:hlinkClick r:id="rId3"/>
+              </a:rPr>
+              <a:t>http://10.2.20.105:8080/</a:t>
+            </a:r>
+            <a:endParaRPr lang="nl-NL" dirty="0" smtClean="0"/>
+          </a:p>
+          <a:p>
+            <a:r>
+              <a:rPr lang="nl-NL" dirty="0" smtClean="0"/>
+              <a:t>(Canvas draaien</a:t>
+            </a:r>
+          </a:p>
+          <a:p>
+            <a:r>
+              <a:rPr lang="nl-NL" dirty="0" smtClean="0"/>
+              <a:t>Bootjeswinkel</a:t>
+            </a:r>
+          </a:p>
+          <a:p>
+            <a:r>
+              <a:rPr lang="nl-NL" dirty="0" smtClean="0"/>
+              <a:t>Database)</a:t>
+            </a:r>
+          </a:p>
+          <a:p>
+            <a:endParaRPr lang="nl-NL" dirty="0" smtClean="0"/>
+          </a:p>
+          <a:p>
+            <a:r>
+              <a:rPr lang="nl-NL" dirty="0" smtClean="0"/>
+              <a:t>----</a:t>
+            </a:r>
+          </a:p>
+          <a:p>
+            <a:endParaRPr lang="nl-NL" dirty="0" smtClean="0"/>
+          </a:p>
+          <a:p>
+            <a:r>
+              <a:rPr lang="nl-NL" dirty="0" smtClean="0"/>
+              <a:t>Waarom is de bootjeswinkel cool?</a:t>
+            </a:r>
+          </a:p>
+          <a:p>
+            <a:pPr lvl="1"/>
+            <a:r>
+              <a:rPr lang="nl-NL" dirty="0" smtClean="0"/>
+              <a:t>Eerste ding wat werkte (mijn kindje)</a:t>
+            </a:r>
+          </a:p>
+          <a:p>
+            <a:pPr lvl="1"/>
+            <a:r>
+              <a:rPr lang="nl-NL" dirty="0" smtClean="0"/>
+              <a:t>Daarna eerste ding wat naar </a:t>
+            </a:r>
+            <a:r>
+              <a:rPr lang="nl-NL" dirty="0" err="1" smtClean="0"/>
+              <a:t>jquery</a:t>
+            </a:r>
+            <a:r>
+              <a:rPr lang="nl-NL" dirty="0" smtClean="0"/>
+              <a:t> was gebouwd</a:t>
+            </a:r>
+          </a:p>
+          <a:p>
+            <a:r>
+              <a:rPr lang="nl-NL" dirty="0" smtClean="0"/>
+              <a:t>Wat doet het?</a:t>
+            </a:r>
+          </a:p>
+          <a:p>
+            <a:pPr lvl="1"/>
+            <a:r>
+              <a:rPr lang="nl-NL" dirty="0" smtClean="0"/>
+              <a:t>Weergave van de bootjes die je kunt kopen</a:t>
+            </a:r>
+          </a:p>
+          <a:p>
+            <a:pPr lvl="1"/>
+            <a:r>
+              <a:rPr lang="nl-NL" dirty="0" smtClean="0"/>
+              <a:t>Als je op een bootje klikt, en je hebt genoeg “geld”, koopt de huidige speler deze en komt hij in diens inventaris</a:t>
+            </a:r>
+          </a:p>
+          <a:p>
+            <a:pPr lvl="1"/>
+            <a:r>
+              <a:rPr lang="nl-NL" dirty="0" smtClean="0"/>
+              <a:t>De bootjeswinkel wordt automatisch aangevuld tot een gegeven aantal bootjes</a:t>
+            </a:r>
+          </a:p>
+          <a:p>
+            <a:pPr lvl="1"/>
+            <a:r>
+              <a:rPr lang="nl-NL" dirty="0" smtClean="0"/>
+              <a:t>Als de bootjes op zijn, is de winkel gewoon leeg</a:t>
+            </a:r>
+          </a:p>
+          <a:p>
+            <a:pPr lvl="1"/>
+            <a:r>
+              <a:rPr lang="nl-NL" dirty="0" smtClean="0"/>
+              <a:t>(</a:t>
+            </a:r>
+            <a:r>
+              <a:rPr lang="nl-NL" dirty="0" err="1" smtClean="0"/>
+              <a:t>Evt</a:t>
+            </a:r>
+            <a:r>
+              <a:rPr lang="nl-NL" dirty="0" smtClean="0"/>
+              <a:t> nog verhaal over </a:t>
+            </a:r>
+            <a:r>
+              <a:rPr lang="nl-NL" dirty="0" err="1" smtClean="0"/>
+              <a:t>sessions</a:t>
+            </a:r>
+            <a:r>
+              <a:rPr lang="nl-NL" dirty="0" smtClean="0"/>
+              <a:t>)</a:t>
+            </a:r>
+          </a:p>
+          <a:p>
+            <a:pPr marL="0" marR="0" indent="0" algn="l" defTabSz="914400" rtl="0" eaLnBrk="1" fontAlgn="auto" latinLnBrk="0" hangingPunct="1">
+              <a:lnSpc>
+                <a:spcPct val="100000"/>
+              </a:lnSpc>
+              <a:spcBef>
+                <a:spcPts val="0"/>
+              </a:spcBef>
+              <a:spcAft>
+                <a:spcPts val="0"/>
+              </a:spcAft>
+              <a:buClrTx/>
+              <a:buSzTx/>
+              <a:buFontTx/>
+              <a:buNone/>
+              <a:tabLst/>
+              <a:defRPr/>
+            </a:pPr>
+            <a:r>
+              <a:rPr lang="nl-NL" dirty="0" smtClean="0"/>
+              <a:t>Data ophalen uit de database</a:t>
+            </a:r>
+          </a:p>
+          <a:p>
+            <a:pPr marL="0" marR="0" indent="0" algn="l" defTabSz="914400" rtl="0" eaLnBrk="1" fontAlgn="auto" latinLnBrk="0" hangingPunct="1">
+              <a:lnSpc>
+                <a:spcPct val="100000"/>
+              </a:lnSpc>
+              <a:spcBef>
+                <a:spcPts val="0"/>
+              </a:spcBef>
+              <a:spcAft>
+                <a:spcPts val="0"/>
+              </a:spcAft>
+              <a:buClrTx/>
+              <a:buSzTx/>
+              <a:buFontTx/>
+              <a:buNone/>
+              <a:tabLst/>
+              <a:defRPr/>
+            </a:pPr>
+            <a:r>
+              <a:rPr lang="nl-NL" dirty="0" smtClean="0"/>
+              <a:t>HTML code genereren met </a:t>
+            </a:r>
+            <a:r>
+              <a:rPr lang="nl-NL" dirty="0" err="1" smtClean="0"/>
+              <a:t>jquery</a:t>
+            </a:r>
+            <a:endParaRPr lang="nl-NL" dirty="0" smtClean="0"/>
+          </a:p>
+          <a:p>
+            <a:pPr marL="0" marR="0" indent="0" algn="l" defTabSz="914400" rtl="0" eaLnBrk="1" fontAlgn="auto" latinLnBrk="0" hangingPunct="1">
+              <a:lnSpc>
+                <a:spcPct val="100000"/>
+              </a:lnSpc>
+              <a:spcBef>
+                <a:spcPts val="0"/>
+              </a:spcBef>
+              <a:spcAft>
+                <a:spcPts val="0"/>
+              </a:spcAft>
+              <a:buClrTx/>
+              <a:buSzTx/>
+              <a:buFontTx/>
+              <a:buNone/>
+              <a:tabLst/>
+              <a:defRPr/>
+            </a:pPr>
+            <a:r>
+              <a:rPr lang="nl-NL" dirty="0" smtClean="0"/>
+              <a:t>Updaten van de pagina met </a:t>
+            </a:r>
+            <a:r>
+              <a:rPr lang="nl-NL" dirty="0" err="1" smtClean="0"/>
+              <a:t>jquery</a:t>
+            </a:r>
+            <a:r>
+              <a:rPr lang="nl-NL" dirty="0" smtClean="0"/>
+              <a:t> (en recursie… spannend)</a:t>
+            </a:r>
+          </a:p>
+          <a:p>
+            <a:endParaRPr lang="nl-NL" dirty="0" smtClean="0"/>
+          </a:p>
+          <a:p>
+            <a:endParaRPr lang="nl-NL" dirty="0" smtClean="0"/>
+          </a:p>
+          <a:p>
+            <a:endParaRPr lang="en-US" dirty="0"/>
+          </a:p>
+        </p:txBody>
+      </p:sp>
+      <p:sp>
+        <p:nvSpPr>
+          <p:cNvPr id="4" name="Slide Number Placeholder 3"/>
           <p:cNvSpPr>
             <a:spLocks noGrp="1"/>
           </p:cNvSpPr>
@@ -906,7 +1239,358 @@
           <a:p>
             <a:fld id="{2AD8EA39-74BD-48E9-85FD-20DFA51CADF1}" type="slidenum">
               <a:rPr lang="nl-NL" smtClean="0"/>
-              <a:t>14</a:t>
+              <a:t>5</a:t>
+            </a:fld>
+            <a:endParaRPr lang="nl-NL"/>
+          </a:p>
+        </p:txBody>
+      </p:sp>
+    </p:spTree>
+    <p:extLst>
+      <p:ext uri="{BB962C8B-B14F-4D97-AF65-F5344CB8AC3E}">
+        <p14:creationId xmlns:p14="http://schemas.microsoft.com/office/powerpoint/2010/main" val="683410245"/>
+      </p:ext>
+    </p:extLst>
+  </p:cSld>
+  <p:clrMapOvr>
+    <a:masterClrMapping/>
+  </p:clrMapOvr>
+</p:notes>
+</file>
+
+<file path=ppt/notesSlides/notesSlide6.xml><?xml version="1.0" encoding="utf-8"?>
+<p:notes xmlns:a="http://schemas.openxmlformats.org/drawingml/2006/main" xmlns:r="http://schemas.openxmlformats.org/officeDocument/2006/relationships" xmlns:p="http://schemas.openxmlformats.org/presentationml/2006/main">
+  <p:cSld>
+    <p:spTree>
+      <p:nvGrpSpPr>
+        <p:cNvPr id="1" name=""/>
+        <p:cNvGrpSpPr/>
+        <p:nvPr/>
+      </p:nvGrpSpPr>
+      <p:grpSpPr>
+        <a:xfrm>
+          <a:off x="0" y="0"/>
+          <a:ext cx="0" cy="0"/>
+          <a:chOff x="0" y="0"/>
+          <a:chExt cx="0" cy="0"/>
+        </a:xfrm>
+      </p:grpSpPr>
+      <p:sp>
+        <p:nvSpPr>
+          <p:cNvPr id="2" name="Tijdelijke aanduiding voor dia-afbeelding 1"/>
+          <p:cNvSpPr>
+            <a:spLocks noGrp="1" noRot="1" noChangeAspect="1"/>
+          </p:cNvSpPr>
+          <p:nvPr>
+            <p:ph type="sldImg"/>
+          </p:nvPr>
+        </p:nvSpPr>
+        <p:spPr/>
+      </p:sp>
+      <p:sp>
+        <p:nvSpPr>
+          <p:cNvPr id="3" name="Tijdelijke aanduiding voor notities 2"/>
+          <p:cNvSpPr>
+            <a:spLocks noGrp="1"/>
+          </p:cNvSpPr>
+          <p:nvPr>
+            <p:ph type="body" idx="1"/>
+          </p:nvPr>
+        </p:nvSpPr>
+        <p:spPr/>
+        <p:txBody>
+          <a:bodyPr/>
+          <a:lstStyle/>
+          <a:p>
+            <a:r>
+              <a:rPr lang="nl-NL" dirty="0" smtClean="0"/>
+              <a:t>2 minuten wat hebben we </a:t>
+            </a:r>
+            <a:r>
+              <a:rPr lang="nl-NL" dirty="0" smtClean="0"/>
+              <a:t>geleerd (per persoon)</a:t>
+            </a:r>
+          </a:p>
+          <a:p>
+            <a:r>
+              <a:rPr lang="nl-NL" dirty="0" smtClean="0"/>
+              <a:t>JENNY</a:t>
+            </a:r>
+          </a:p>
+          <a:p>
+            <a:endParaRPr lang="nl-NL" dirty="0" smtClean="0"/>
+          </a:p>
+          <a:p>
+            <a:r>
+              <a:rPr lang="nl-NL" dirty="0" smtClean="0"/>
+              <a:t>Hele hoop nieuwe technieken </a:t>
+            </a:r>
+            <a:r>
+              <a:rPr lang="nl-NL" dirty="0" err="1" smtClean="0"/>
+              <a:t>ofc</a:t>
+            </a:r>
+            <a:r>
+              <a:rPr lang="nl-NL" dirty="0" smtClean="0"/>
+              <a:t> (</a:t>
+            </a:r>
+            <a:r>
+              <a:rPr lang="nl-NL" dirty="0" err="1" smtClean="0"/>
+              <a:t>java</a:t>
+            </a:r>
+            <a:r>
+              <a:rPr lang="nl-NL" dirty="0" smtClean="0"/>
+              <a:t> kon ik al een beetje, maar de rest nog niet. Ik vond ook de volgorde best fijn, ondanks dat we eerst een hele hoop “oude” dingen hebben geleerd)</a:t>
+            </a:r>
+          </a:p>
+          <a:p>
+            <a:r>
+              <a:rPr lang="nl-NL" dirty="0" smtClean="0"/>
+              <a:t>Het is fijn om een direct line of </a:t>
+            </a:r>
+            <a:r>
+              <a:rPr lang="nl-NL" dirty="0" err="1" smtClean="0"/>
+              <a:t>communication</a:t>
+            </a:r>
+            <a:r>
+              <a:rPr lang="nl-NL" dirty="0" smtClean="0"/>
+              <a:t> te hebben met je medeprogrammeurs.</a:t>
+            </a:r>
+          </a:p>
+          <a:p>
+            <a:r>
+              <a:rPr lang="nl-NL" dirty="0" smtClean="0"/>
+              <a:t>Git is handig, maar soms verwarrend</a:t>
+            </a:r>
+          </a:p>
+          <a:p>
+            <a:r>
+              <a:rPr lang="nl-NL" dirty="0" smtClean="0"/>
+              <a:t>Ik ben niet heel goed in het overzicht van alles bewaren. Ik zou </a:t>
+            </a:r>
+            <a:r>
+              <a:rPr lang="nl-NL" dirty="0" err="1" smtClean="0"/>
+              <a:t>gestructureerder</a:t>
+            </a:r>
+            <a:r>
+              <a:rPr lang="nl-NL" dirty="0" smtClean="0"/>
+              <a:t> aan de slag gaan, met duidelijke naamgeving, en verschillende code apart (geen javascript tussen de html </a:t>
+            </a:r>
+            <a:r>
+              <a:rPr lang="nl-NL" dirty="0" err="1" smtClean="0"/>
+              <a:t>enzo</a:t>
+            </a:r>
+            <a:r>
+              <a:rPr lang="nl-NL" dirty="0" smtClean="0"/>
+              <a:t>). En dingen documenteren! Dat deed ik nog heel braaf op dag 1 (en </a:t>
+            </a:r>
+            <a:r>
+              <a:rPr lang="nl-NL" dirty="0" err="1" smtClean="0"/>
+              <a:t>mss</a:t>
+            </a:r>
+            <a:r>
+              <a:rPr lang="nl-NL" dirty="0" smtClean="0"/>
+              <a:t> 2), maar daarna niet echt meer, terwijl dat echt nuttig is naderhand, of als je teamgenoot met jouw code wil werken.</a:t>
+            </a:r>
+          </a:p>
+          <a:p>
+            <a:endParaRPr lang="nl-NL" dirty="0"/>
+          </a:p>
+        </p:txBody>
+      </p:sp>
+      <p:sp>
+        <p:nvSpPr>
+          <p:cNvPr id="4" name="Tijdelijke aanduiding voor dianummer 3"/>
+          <p:cNvSpPr>
+            <a:spLocks noGrp="1"/>
+          </p:cNvSpPr>
+          <p:nvPr>
+            <p:ph type="sldNum" sz="quarter" idx="10"/>
+          </p:nvPr>
+        </p:nvSpPr>
+        <p:spPr/>
+        <p:txBody>
+          <a:bodyPr/>
+          <a:lstStyle/>
+          <a:p>
+            <a:fld id="{2AD8EA39-74BD-48E9-85FD-20DFA51CADF1}" type="slidenum">
+              <a:rPr lang="nl-NL" smtClean="0"/>
+              <a:t>6</a:t>
+            </a:fld>
+            <a:endParaRPr lang="nl-NL"/>
+          </a:p>
+        </p:txBody>
+      </p:sp>
+    </p:spTree>
+    <p:extLst>
+      <p:ext uri="{BB962C8B-B14F-4D97-AF65-F5344CB8AC3E}">
+        <p14:creationId xmlns:p14="http://schemas.microsoft.com/office/powerpoint/2010/main" val="181902196"/>
+      </p:ext>
+    </p:extLst>
+  </p:cSld>
+  <p:clrMapOvr>
+    <a:masterClrMapping/>
+  </p:clrMapOvr>
+</p:notes>
+</file>
+
+<file path=ppt/notesSlides/notesSlide7.xml><?xml version="1.0" encoding="utf-8"?>
+<p:notes xmlns:a="http://schemas.openxmlformats.org/drawingml/2006/main" xmlns:r="http://schemas.openxmlformats.org/officeDocument/2006/relationships" xmlns:p="http://schemas.openxmlformats.org/presentationml/2006/main">
+  <p:cSld>
+    <p:spTree>
+      <p:nvGrpSpPr>
+        <p:cNvPr id="1" name=""/>
+        <p:cNvGrpSpPr/>
+        <p:nvPr/>
+      </p:nvGrpSpPr>
+      <p:grpSpPr>
+        <a:xfrm>
+          <a:off x="0" y="0"/>
+          <a:ext cx="0" cy="0"/>
+          <a:chOff x="0" y="0"/>
+          <a:chExt cx="0" cy="0"/>
+        </a:xfrm>
+      </p:grpSpPr>
+      <p:sp>
+        <p:nvSpPr>
+          <p:cNvPr id="2" name="Slide Image Placeholder 1"/>
+          <p:cNvSpPr>
+            <a:spLocks noGrp="1" noRot="1" noChangeAspect="1"/>
+          </p:cNvSpPr>
+          <p:nvPr>
+            <p:ph type="sldImg"/>
+          </p:nvPr>
+        </p:nvSpPr>
+        <p:spPr/>
+      </p:sp>
+      <p:sp>
+        <p:nvSpPr>
+          <p:cNvPr id="3" name="Notes Placeholder 2"/>
+          <p:cNvSpPr>
+            <a:spLocks noGrp="1"/>
+          </p:cNvSpPr>
+          <p:nvPr>
+            <p:ph type="body" idx="1"/>
+          </p:nvPr>
+        </p:nvSpPr>
+        <p:spPr/>
+        <p:txBody>
+          <a:bodyPr/>
+          <a:lstStyle/>
+          <a:p>
+            <a:r>
+              <a:rPr lang="en-US" dirty="0" smtClean="0"/>
+              <a:t>FEIA</a:t>
+            </a:r>
+            <a:endParaRPr lang="en-US" dirty="0"/>
+          </a:p>
+        </p:txBody>
+      </p:sp>
+      <p:sp>
+        <p:nvSpPr>
+          <p:cNvPr id="4" name="Slide Number Placeholder 3"/>
+          <p:cNvSpPr>
+            <a:spLocks noGrp="1"/>
+          </p:cNvSpPr>
+          <p:nvPr>
+            <p:ph type="sldNum" sz="quarter" idx="10"/>
+          </p:nvPr>
+        </p:nvSpPr>
+        <p:spPr/>
+        <p:txBody>
+          <a:bodyPr/>
+          <a:lstStyle/>
+          <a:p>
+            <a:fld id="{2AD8EA39-74BD-48E9-85FD-20DFA51CADF1}" type="slidenum">
+              <a:rPr lang="nl-NL" smtClean="0"/>
+              <a:t>7</a:t>
+            </a:fld>
+            <a:endParaRPr lang="nl-NL"/>
+          </a:p>
+        </p:txBody>
+      </p:sp>
+    </p:spTree>
+    <p:extLst>
+      <p:ext uri="{BB962C8B-B14F-4D97-AF65-F5344CB8AC3E}">
+        <p14:creationId xmlns:p14="http://schemas.microsoft.com/office/powerpoint/2010/main" val="2390474930"/>
+      </p:ext>
+    </p:extLst>
+  </p:cSld>
+  <p:clrMapOvr>
+    <a:masterClrMapping/>
+  </p:clrMapOvr>
+</p:notes>
+</file>
+
+<file path=ppt/notesSlides/notesSlide8.xml><?xml version="1.0" encoding="utf-8"?>
+<p:notes xmlns:a="http://schemas.openxmlformats.org/drawingml/2006/main" xmlns:r="http://schemas.openxmlformats.org/officeDocument/2006/relationships" xmlns:p="http://schemas.openxmlformats.org/presentationml/2006/main">
+  <p:cSld>
+    <p:spTree>
+      <p:nvGrpSpPr>
+        <p:cNvPr id="1" name=""/>
+        <p:cNvGrpSpPr/>
+        <p:nvPr/>
+      </p:nvGrpSpPr>
+      <p:grpSpPr>
+        <a:xfrm>
+          <a:off x="0" y="0"/>
+          <a:ext cx="0" cy="0"/>
+          <a:chOff x="0" y="0"/>
+          <a:chExt cx="0" cy="0"/>
+        </a:xfrm>
+      </p:grpSpPr>
+      <p:sp>
+        <p:nvSpPr>
+          <p:cNvPr id="2" name="Tijdelijke aanduiding voor dia-afbeelding 1"/>
+          <p:cNvSpPr>
+            <a:spLocks noGrp="1" noRot="1" noChangeAspect="1"/>
+          </p:cNvSpPr>
+          <p:nvPr>
+            <p:ph type="sldImg"/>
+          </p:nvPr>
+        </p:nvSpPr>
+        <p:spPr/>
+      </p:sp>
+      <p:sp>
+        <p:nvSpPr>
+          <p:cNvPr id="3" name="Tijdelijke aanduiding voor notities 2"/>
+          <p:cNvSpPr>
+            <a:spLocks noGrp="1"/>
+          </p:cNvSpPr>
+          <p:nvPr>
+            <p:ph type="body" idx="1"/>
+          </p:nvPr>
+        </p:nvSpPr>
+        <p:spPr/>
+        <p:txBody>
+          <a:bodyPr/>
+          <a:lstStyle/>
+          <a:p>
+            <a:r>
+              <a:rPr lang="nl-NL" smtClean="0"/>
+              <a:t>???</a:t>
+            </a:r>
+            <a:endParaRPr lang="nl-NL" dirty="0"/>
+          </a:p>
+        </p:txBody>
+      </p:sp>
+      <p:sp>
+        <p:nvSpPr>
+          <p:cNvPr id="4" name="Tijdelijke aanduiding voor dianummer 3"/>
+          <p:cNvSpPr>
+            <a:spLocks noGrp="1"/>
+          </p:cNvSpPr>
+          <p:nvPr>
+            <p:ph type="sldNum" sz="quarter" idx="10"/>
+          </p:nvPr>
+        </p:nvSpPr>
+        <p:spPr/>
+        <p:txBody>
+          <a:bodyPr/>
+          <a:lstStyle/>
+          <a:p>
+            <a:fld id="{2AD8EA39-74BD-48E9-85FD-20DFA51CADF1}" type="slidenum">
+              <a:rPr lang="nl-NL" smtClean="0"/>
+              <a:t>8</a:t>
             </a:fld>
             <a:endParaRPr lang="nl-NL"/>
           </a:p>
@@ -1062,7 +1746,7 @@
           <a:p>
             <a:fld id="{AF58D60E-D8F5-48EF-A192-7693313C4D1D}" type="datetimeFigureOut">
               <a:rPr lang="nl-NL" smtClean="0"/>
-              <a:t>30-11-2016</a:t>
+              <a:t>1-12-2016</a:t>
             </a:fld>
             <a:endParaRPr lang="nl-NL"/>
           </a:p>
@@ -1808,7 +2492,7 @@
           <a:p>
             <a:fld id="{CB490E28-A421-436F-AF86-663DDF5272C0}" type="slidenum">
               <a:rPr lang="nl-NL" smtClean="0"/>
-              <a:t>‹nr.›</a:t>
+              <a:t>‹#›</a:t>
             </a:fld>
             <a:endParaRPr lang="nl-NL"/>
           </a:p>
@@ -1931,7 +2615,7 @@
           <a:p>
             <a:fld id="{AF58D60E-D8F5-48EF-A192-7693313C4D1D}" type="datetimeFigureOut">
               <a:rPr lang="nl-NL" smtClean="0"/>
-              <a:t>30-11-2016</a:t>
+              <a:t>1-12-2016</a:t>
             </a:fld>
             <a:endParaRPr lang="nl-NL"/>
           </a:p>
@@ -1973,7 +2657,7 @@
           <a:p>
             <a:fld id="{CB490E28-A421-436F-AF86-663DDF5272C0}" type="slidenum">
               <a:rPr lang="nl-NL" smtClean="0"/>
-              <a:t>‹nr.›</a:t>
+              <a:t>‹#›</a:t>
             </a:fld>
             <a:endParaRPr lang="nl-NL"/>
           </a:p>
@@ -2106,7 +2790,7 @@
           <a:p>
             <a:fld id="{AF58D60E-D8F5-48EF-A192-7693313C4D1D}" type="datetimeFigureOut">
               <a:rPr lang="nl-NL" smtClean="0"/>
-              <a:t>30-11-2016</a:t>
+              <a:t>1-12-2016</a:t>
             </a:fld>
             <a:endParaRPr lang="nl-NL"/>
           </a:p>
@@ -2148,7 +2832,7 @@
           <a:p>
             <a:fld id="{CB490E28-A421-436F-AF86-663DDF5272C0}" type="slidenum">
               <a:rPr lang="nl-NL" smtClean="0"/>
-              <a:t>‹nr.›</a:t>
+              <a:t>‹#›</a:t>
             </a:fld>
             <a:endParaRPr lang="nl-NL"/>
           </a:p>
@@ -2276,7 +2960,7 @@
           <a:p>
             <a:fld id="{AF58D60E-D8F5-48EF-A192-7693313C4D1D}" type="datetimeFigureOut">
               <a:rPr lang="nl-NL" smtClean="0"/>
-              <a:t>30-11-2016</a:t>
+              <a:t>1-12-2016</a:t>
             </a:fld>
             <a:endParaRPr lang="nl-NL"/>
           </a:p>
@@ -2299,7 +2983,7 @@
           <a:p>
             <a:fld id="{CB490E28-A421-436F-AF86-663DDF5272C0}" type="slidenum">
               <a:rPr lang="nl-NL" smtClean="0"/>
-              <a:t>‹nr.›</a:t>
+              <a:t>‹#›</a:t>
             </a:fld>
             <a:endParaRPr lang="nl-NL"/>
           </a:p>
@@ -2486,7 +3170,7 @@
           <a:p>
             <a:fld id="{AF58D60E-D8F5-48EF-A192-7693313C4D1D}" type="datetimeFigureOut">
               <a:rPr lang="nl-NL" smtClean="0"/>
-              <a:t>30-11-2016</a:t>
+              <a:t>1-12-2016</a:t>
             </a:fld>
             <a:endParaRPr lang="nl-NL"/>
           </a:p>
@@ -3229,7 +3913,7 @@
           <a:p>
             <a:fld id="{CB490E28-A421-436F-AF86-663DDF5272C0}" type="slidenum">
               <a:rPr lang="nl-NL" smtClean="0"/>
-              <a:t>‹nr.›</a:t>
+              <a:t>‹#›</a:t>
             </a:fld>
             <a:endParaRPr lang="nl-NL"/>
           </a:p>
@@ -3300,7 +3984,7 @@
           <a:p>
             <a:fld id="{AF58D60E-D8F5-48EF-A192-7693313C4D1D}" type="datetimeFigureOut">
               <a:rPr lang="nl-NL" smtClean="0"/>
-              <a:t>30-11-2016</a:t>
+              <a:t>1-12-2016</a:t>
             </a:fld>
             <a:endParaRPr lang="nl-NL"/>
           </a:p>
@@ -3342,7 +4026,7 @@
           <a:p>
             <a:fld id="{CB490E28-A421-436F-AF86-663DDF5272C0}" type="slidenum">
               <a:rPr lang="nl-NL" smtClean="0"/>
-              <a:t>‹nr.›</a:t>
+              <a:t>‹#›</a:t>
             </a:fld>
             <a:endParaRPr lang="nl-NL"/>
           </a:p>
@@ -3536,7 +4220,7 @@
           <a:p>
             <a:fld id="{AF58D60E-D8F5-48EF-A192-7693313C4D1D}" type="datetimeFigureOut">
               <a:rPr lang="nl-NL" smtClean="0"/>
-              <a:t>30-11-2016</a:t>
+              <a:t>1-12-2016</a:t>
             </a:fld>
             <a:endParaRPr lang="nl-NL"/>
           </a:p>
@@ -3578,7 +4262,7 @@
           <a:p>
             <a:fld id="{CB490E28-A421-436F-AF86-663DDF5272C0}" type="slidenum">
               <a:rPr lang="nl-NL" smtClean="0"/>
-              <a:t>‹nr.›</a:t>
+              <a:t>‹#›</a:t>
             </a:fld>
             <a:endParaRPr lang="nl-NL"/>
           </a:p>
@@ -3859,7 +4543,7 @@
           <a:p>
             <a:fld id="{AF58D60E-D8F5-48EF-A192-7693313C4D1D}" type="datetimeFigureOut">
               <a:rPr lang="nl-NL" smtClean="0"/>
-              <a:t>30-11-2016</a:t>
+              <a:t>1-12-2016</a:t>
             </a:fld>
             <a:endParaRPr lang="nl-NL"/>
           </a:p>
@@ -3882,7 +4566,7 @@
           <a:p>
             <a:fld id="{CB490E28-A421-436F-AF86-663DDF5272C0}" type="slidenum">
               <a:rPr lang="nl-NL" smtClean="0"/>
-              <a:t>‹nr.›</a:t>
+              <a:t>‹#›</a:t>
             </a:fld>
             <a:endParaRPr lang="nl-NL"/>
           </a:p>
@@ -3949,7 +4633,7 @@
           <a:p>
             <a:fld id="{AF58D60E-D8F5-48EF-A192-7693313C4D1D}" type="datetimeFigureOut">
               <a:rPr lang="nl-NL" smtClean="0"/>
-              <a:t>30-11-2016</a:t>
+              <a:t>1-12-2016</a:t>
             </a:fld>
             <a:endParaRPr lang="nl-NL"/>
           </a:p>
@@ -3991,7 +4675,7 @@
           <a:p>
             <a:fld id="{CB490E28-A421-436F-AF86-663DDF5272C0}" type="slidenum">
               <a:rPr lang="nl-NL" smtClean="0"/>
-              <a:t>‹nr.›</a:t>
+              <a:t>‹#›</a:t>
             </a:fld>
             <a:endParaRPr lang="nl-NL"/>
           </a:p>
@@ -4466,7 +5150,7 @@
           <a:p>
             <a:fld id="{AF58D60E-D8F5-48EF-A192-7693313C4D1D}" type="datetimeFigureOut">
               <a:rPr lang="nl-NL" smtClean="0"/>
-              <a:t>30-11-2016</a:t>
+              <a:t>1-12-2016</a:t>
             </a:fld>
             <a:endParaRPr lang="nl-NL"/>
           </a:p>
@@ -4489,7 +5173,7 @@
           <a:p>
             <a:fld id="{CB490E28-A421-436F-AF86-663DDF5272C0}" type="slidenum">
               <a:rPr lang="nl-NL" smtClean="0"/>
-              <a:t>‹nr.›</a:t>
+              <a:t>‹#›</a:t>
             </a:fld>
             <a:endParaRPr lang="nl-NL"/>
           </a:p>
@@ -4977,7 +5661,7 @@
           <a:p>
             <a:fld id="{AF58D60E-D8F5-48EF-A192-7693313C4D1D}" type="datetimeFigureOut">
               <a:rPr lang="nl-NL" smtClean="0"/>
-              <a:t>30-11-2016</a:t>
+              <a:t>1-12-2016</a:t>
             </a:fld>
             <a:endParaRPr lang="nl-NL"/>
           </a:p>
@@ -5000,7 +5684,7 @@
           <a:p>
             <a:fld id="{CB490E28-A421-436F-AF86-663DDF5272C0}" type="slidenum">
               <a:rPr lang="nl-NL" smtClean="0"/>
-              <a:t>‹nr.›</a:t>
+              <a:t>‹#›</a:t>
             </a:fld>
             <a:endParaRPr lang="nl-NL"/>
           </a:p>
@@ -5222,7 +5906,7 @@
           <a:p>
             <a:fld id="{AF58D60E-D8F5-48EF-A192-7693313C4D1D}" type="datetimeFigureOut">
               <a:rPr lang="nl-NL" smtClean="0"/>
-              <a:t>30-11-2016</a:t>
+              <a:t>1-12-2016</a:t>
             </a:fld>
             <a:endParaRPr lang="nl-NL"/>
           </a:p>
@@ -5498,7 +6182,7 @@
           <a:p>
             <a:fld id="{CB490E28-A421-436F-AF86-663DDF5272C0}" type="slidenum">
               <a:rPr lang="nl-NL" smtClean="0"/>
-              <a:t>‹nr.›</a:t>
+              <a:t>‹#›</a:t>
             </a:fld>
             <a:endParaRPr lang="nl-NL"/>
           </a:p>
@@ -5844,7 +6528,7 @@
           <a:p>
             <a:r>
               <a:rPr lang="nl-NL" dirty="0" smtClean="0"/>
-              <a:t>Spel</a:t>
+              <a:t>Carcassonne</a:t>
             </a:r>
             <a:endParaRPr lang="nl-NL" dirty="0"/>
           </a:p>
@@ -5865,6 +6549,14 @@
           <a:bodyPr/>
           <a:lstStyle/>
           <a:p>
+            <a:r>
+              <a:rPr lang="nl-NL" dirty="0" err="1" smtClean="0"/>
+              <a:t>Feia</a:t>
+            </a:r>
+            <a:r>
+              <a:rPr lang="nl-NL" dirty="0" smtClean="0"/>
+              <a:t> &amp; Jenny</a:t>
+            </a:r>
             <a:endParaRPr lang="nl-NL" dirty="0"/>
           </a:p>
         </p:txBody>
@@ -5873,544 +6565,6 @@
     <p:extLst>
       <p:ext uri="{BB962C8B-B14F-4D97-AF65-F5344CB8AC3E}">
         <p14:creationId xmlns:p14="http://schemas.microsoft.com/office/powerpoint/2010/main" val="1455546737"/>
-      </p:ext>
-    </p:extLst>
-  </p:cSld>
-  <p:clrMapOvr>
-    <a:masterClrMapping/>
-  </p:clrMapOvr>
-  <p:timing>
-    <p:tnLst>
-      <p:par>
-        <p:cTn id="1" dur="indefinite" restart="never" nodeType="tmRoot"/>
-      </p:par>
-    </p:tnLst>
-  </p:timing>
-</p:sld>
-</file>
-
-<file path=ppt/slides/slide10.xml><?xml version="1.0" encoding="utf-8"?>
-<p:sld xmlns:a="http://schemas.openxmlformats.org/drawingml/2006/main" xmlns:r="http://schemas.openxmlformats.org/officeDocument/2006/relationships" xmlns:p="http://schemas.openxmlformats.org/presentationml/2006/main">
-  <p:cSld>
-    <p:spTree>
-      <p:nvGrpSpPr>
-        <p:cNvPr id="1" name=""/>
-        <p:cNvGrpSpPr/>
-        <p:nvPr/>
-      </p:nvGrpSpPr>
-      <p:grpSpPr>
-        <a:xfrm>
-          <a:off x="0" y="0"/>
-          <a:ext cx="0" cy="0"/>
-          <a:chOff x="0" y="0"/>
-          <a:chExt cx="0" cy="0"/>
-        </a:xfrm>
-      </p:grpSpPr>
-      <p:sp>
-        <p:nvSpPr>
-          <p:cNvPr id="2" name="Titel 1"/>
-          <p:cNvSpPr>
-            <a:spLocks noGrp="1"/>
-          </p:cNvSpPr>
-          <p:nvPr>
-            <p:ph type="title"/>
-          </p:nvPr>
-        </p:nvSpPr>
-        <p:spPr/>
-        <p:txBody>
-          <a:bodyPr/>
-          <a:lstStyle/>
-          <a:p>
-            <a:r>
-              <a:rPr lang="nl-NL" dirty="0" smtClean="0"/>
-              <a:t>Bootjeswinkel</a:t>
-            </a:r>
-            <a:endParaRPr lang="nl-NL" dirty="0"/>
-          </a:p>
-        </p:txBody>
-      </p:sp>
-      <p:sp>
-        <p:nvSpPr>
-          <p:cNvPr id="3" name="Tijdelijke aanduiding voor inhoud 2"/>
-          <p:cNvSpPr>
-            <a:spLocks noGrp="1"/>
-          </p:cNvSpPr>
-          <p:nvPr>
-            <p:ph idx="1"/>
-          </p:nvPr>
-        </p:nvSpPr>
-        <p:spPr/>
-        <p:txBody>
-          <a:bodyPr/>
-          <a:lstStyle/>
-          <a:p>
-            <a:r>
-              <a:rPr lang="nl-NL" dirty="0" smtClean="0"/>
-              <a:t>HTML code genereren met </a:t>
-            </a:r>
-            <a:r>
-              <a:rPr lang="nl-NL" dirty="0" err="1" smtClean="0"/>
-              <a:t>jquery</a:t>
-            </a:r>
-            <a:endParaRPr lang="nl-NL" dirty="0" smtClean="0"/>
-          </a:p>
-          <a:p>
-            <a:pPr lvl="1"/>
-            <a:r>
-              <a:rPr lang="nl-NL" dirty="0" smtClean="0"/>
-              <a:t>Code?</a:t>
-            </a:r>
-            <a:endParaRPr lang="nl-NL" dirty="0"/>
-          </a:p>
-        </p:txBody>
-      </p:sp>
-    </p:spTree>
-    <p:extLst>
-      <p:ext uri="{BB962C8B-B14F-4D97-AF65-F5344CB8AC3E}">
-        <p14:creationId xmlns:p14="http://schemas.microsoft.com/office/powerpoint/2010/main" val="4216259755"/>
-      </p:ext>
-    </p:extLst>
-  </p:cSld>
-  <p:clrMapOvr>
-    <a:masterClrMapping/>
-  </p:clrMapOvr>
-</p:sld>
-</file>
-
-<file path=ppt/slides/slide11.xml><?xml version="1.0" encoding="utf-8"?>
-<p:sld xmlns:a="http://schemas.openxmlformats.org/drawingml/2006/main" xmlns:r="http://schemas.openxmlformats.org/officeDocument/2006/relationships" xmlns:p="http://schemas.openxmlformats.org/presentationml/2006/main">
-  <p:cSld>
-    <p:spTree>
-      <p:nvGrpSpPr>
-        <p:cNvPr id="1" name=""/>
-        <p:cNvGrpSpPr/>
-        <p:nvPr/>
-      </p:nvGrpSpPr>
-      <p:grpSpPr>
-        <a:xfrm>
-          <a:off x="0" y="0"/>
-          <a:ext cx="0" cy="0"/>
-          <a:chOff x="0" y="0"/>
-          <a:chExt cx="0" cy="0"/>
-        </a:xfrm>
-      </p:grpSpPr>
-      <p:sp>
-        <p:nvSpPr>
-          <p:cNvPr id="2" name="Titel 1"/>
-          <p:cNvSpPr>
-            <a:spLocks noGrp="1"/>
-          </p:cNvSpPr>
-          <p:nvPr>
-            <p:ph type="title"/>
-          </p:nvPr>
-        </p:nvSpPr>
-        <p:spPr/>
-        <p:txBody>
-          <a:bodyPr/>
-          <a:lstStyle/>
-          <a:p>
-            <a:r>
-              <a:rPr lang="nl-NL" dirty="0" smtClean="0"/>
-              <a:t>Bootjeswinkel</a:t>
-            </a:r>
-            <a:endParaRPr lang="nl-NL" dirty="0"/>
-          </a:p>
-        </p:txBody>
-      </p:sp>
-      <p:sp>
-        <p:nvSpPr>
-          <p:cNvPr id="3" name="Tijdelijke aanduiding voor inhoud 2"/>
-          <p:cNvSpPr>
-            <a:spLocks noGrp="1"/>
-          </p:cNvSpPr>
-          <p:nvPr>
-            <p:ph idx="1"/>
-          </p:nvPr>
-        </p:nvSpPr>
-        <p:spPr/>
-        <p:txBody>
-          <a:bodyPr/>
-          <a:lstStyle/>
-          <a:p>
-            <a:r>
-              <a:rPr lang="nl-NL" dirty="0" smtClean="0"/>
-              <a:t>Updaten van de pagina met </a:t>
-            </a:r>
-            <a:r>
-              <a:rPr lang="nl-NL" dirty="0" err="1" smtClean="0"/>
-              <a:t>jquery</a:t>
-            </a:r>
-            <a:r>
-              <a:rPr lang="nl-NL" dirty="0" smtClean="0"/>
-              <a:t> (en </a:t>
-            </a:r>
-            <a:r>
-              <a:rPr lang="nl-NL" dirty="0" err="1" smtClean="0"/>
-              <a:t>recursie</a:t>
-            </a:r>
-            <a:r>
-              <a:rPr lang="nl-NL" dirty="0" smtClean="0"/>
-              <a:t>… spannend)</a:t>
-            </a:r>
-          </a:p>
-          <a:p>
-            <a:pPr lvl="1"/>
-            <a:r>
-              <a:rPr lang="nl-NL" dirty="0" smtClean="0"/>
-              <a:t>Code?</a:t>
-            </a:r>
-            <a:endParaRPr lang="nl-NL" dirty="0"/>
-          </a:p>
-        </p:txBody>
-      </p:sp>
-    </p:spTree>
-    <p:extLst>
-      <p:ext uri="{BB962C8B-B14F-4D97-AF65-F5344CB8AC3E}">
-        <p14:creationId xmlns:p14="http://schemas.microsoft.com/office/powerpoint/2010/main" val="3997746775"/>
-      </p:ext>
-    </p:extLst>
-  </p:cSld>
-  <p:clrMapOvr>
-    <a:masterClrMapping/>
-  </p:clrMapOvr>
-</p:sld>
-</file>
-
-<file path=ppt/slides/slide12.xml><?xml version="1.0" encoding="utf-8"?>
-<p:sld xmlns:a="http://schemas.openxmlformats.org/drawingml/2006/main" xmlns:r="http://schemas.openxmlformats.org/officeDocument/2006/relationships" xmlns:p="http://schemas.openxmlformats.org/presentationml/2006/main">
-  <p:cSld>
-    <p:spTree>
-      <p:nvGrpSpPr>
-        <p:cNvPr id="1" name=""/>
-        <p:cNvGrpSpPr/>
-        <p:nvPr/>
-      </p:nvGrpSpPr>
-      <p:grpSpPr>
-        <a:xfrm>
-          <a:off x="0" y="0"/>
-          <a:ext cx="0" cy="0"/>
-          <a:chOff x="0" y="0"/>
-          <a:chExt cx="0" cy="0"/>
-        </a:xfrm>
-      </p:grpSpPr>
-      <p:sp>
-        <p:nvSpPr>
-          <p:cNvPr id="2" name="Titel 1"/>
-          <p:cNvSpPr>
-            <a:spLocks noGrp="1"/>
-          </p:cNvSpPr>
-          <p:nvPr>
-            <p:ph type="title"/>
-          </p:nvPr>
-        </p:nvSpPr>
-        <p:spPr/>
-        <p:txBody>
-          <a:bodyPr/>
-          <a:lstStyle/>
-          <a:p>
-            <a:r>
-              <a:rPr lang="nl-NL" dirty="0" smtClean="0"/>
-              <a:t>Wat hebben we/ ik geleerd</a:t>
-            </a:r>
-            <a:endParaRPr lang="nl-NL" dirty="0"/>
-          </a:p>
-        </p:txBody>
-      </p:sp>
-      <p:sp>
-        <p:nvSpPr>
-          <p:cNvPr id="3" name="Tijdelijke aanduiding voor inhoud 2"/>
-          <p:cNvSpPr>
-            <a:spLocks noGrp="1"/>
-          </p:cNvSpPr>
-          <p:nvPr>
-            <p:ph idx="1"/>
-          </p:nvPr>
-        </p:nvSpPr>
-        <p:spPr/>
-        <p:txBody>
-          <a:bodyPr>
-            <a:normAutofit fontScale="92500" lnSpcReduction="20000"/>
-          </a:bodyPr>
-          <a:lstStyle/>
-          <a:p>
-            <a:r>
-              <a:rPr lang="nl-NL" dirty="0" smtClean="0"/>
-              <a:t>Hele hoop nieuwe technieken </a:t>
-            </a:r>
-            <a:r>
-              <a:rPr lang="nl-NL" dirty="0" err="1" smtClean="0"/>
-              <a:t>ofc</a:t>
-            </a:r>
-            <a:r>
-              <a:rPr lang="nl-NL" dirty="0" smtClean="0"/>
-              <a:t> (</a:t>
-            </a:r>
-            <a:r>
-              <a:rPr lang="nl-NL" dirty="0" err="1" smtClean="0"/>
-              <a:t>java</a:t>
-            </a:r>
-            <a:r>
-              <a:rPr lang="nl-NL" dirty="0" smtClean="0"/>
-              <a:t> kon ik al een beetje, maar de rest nog niet. Ik vond ook de volgorde best fijn, ondanks dat we eerst een hele hoop “oude” dingen hebben geleerd)</a:t>
-            </a:r>
-          </a:p>
-          <a:p>
-            <a:r>
-              <a:rPr lang="nl-NL" dirty="0" smtClean="0"/>
-              <a:t>Het is fijn om een direct line of </a:t>
-            </a:r>
-            <a:r>
-              <a:rPr lang="nl-NL" dirty="0" err="1" smtClean="0"/>
-              <a:t>communication</a:t>
-            </a:r>
-            <a:r>
-              <a:rPr lang="nl-NL" dirty="0" smtClean="0"/>
-              <a:t> te hebben met je medeprogrammeurs.</a:t>
-            </a:r>
-          </a:p>
-          <a:p>
-            <a:r>
-              <a:rPr lang="nl-NL" dirty="0" smtClean="0"/>
-              <a:t>Git is handig, maar soms verwarrend</a:t>
-            </a:r>
-          </a:p>
-          <a:p>
-            <a:r>
-              <a:rPr lang="nl-NL" dirty="0" smtClean="0"/>
-              <a:t>Ik ben niet heel goed in het overzicht van alles bewaren. Ik zou </a:t>
-            </a:r>
-            <a:r>
-              <a:rPr lang="nl-NL" dirty="0" err="1" smtClean="0"/>
-              <a:t>gestructureerder</a:t>
-            </a:r>
-            <a:r>
-              <a:rPr lang="nl-NL" dirty="0" smtClean="0"/>
-              <a:t> aan de slag gaan, met duidelijke naamgeving, en verschillende code apart (geen javascript tussen de html </a:t>
-            </a:r>
-            <a:r>
-              <a:rPr lang="nl-NL" dirty="0" err="1" smtClean="0"/>
-              <a:t>enzo</a:t>
-            </a:r>
-            <a:r>
-              <a:rPr lang="nl-NL" dirty="0" smtClean="0"/>
-              <a:t>). En dingen documenteren! Dat deed ik nog heel braaf op dag 1 (en </a:t>
-            </a:r>
-            <a:r>
-              <a:rPr lang="nl-NL" dirty="0" err="1" smtClean="0"/>
-              <a:t>mss</a:t>
-            </a:r>
-            <a:r>
-              <a:rPr lang="nl-NL" dirty="0" smtClean="0"/>
-              <a:t> 2), maar daarna niet echt meer, terwijl dat echt nuttig is naderhand, of als je teamgenoot met jouw code wil werken.</a:t>
-            </a:r>
-          </a:p>
-          <a:p>
-            <a:r>
-              <a:rPr lang="nl-NL" dirty="0" smtClean="0"/>
-              <a:t>…</a:t>
-            </a:r>
-            <a:endParaRPr lang="nl-NL" dirty="0"/>
-          </a:p>
-        </p:txBody>
-      </p:sp>
-    </p:spTree>
-    <p:extLst>
-      <p:ext uri="{BB962C8B-B14F-4D97-AF65-F5344CB8AC3E}">
-        <p14:creationId xmlns:p14="http://schemas.microsoft.com/office/powerpoint/2010/main" val="3961685479"/>
-      </p:ext>
-    </p:extLst>
-  </p:cSld>
-  <p:clrMapOvr>
-    <a:masterClrMapping/>
-  </p:clrMapOvr>
-</p:sld>
-</file>
-
-<file path=ppt/slides/slide13.xml><?xml version="1.0" encoding="utf-8"?>
-<p:sld xmlns:a="http://schemas.openxmlformats.org/drawingml/2006/main" xmlns:r="http://schemas.openxmlformats.org/officeDocument/2006/relationships" xmlns:p="http://schemas.openxmlformats.org/presentationml/2006/main">
-  <p:cSld>
-    <p:spTree>
-      <p:nvGrpSpPr>
-        <p:cNvPr id="1" name=""/>
-        <p:cNvGrpSpPr/>
-        <p:nvPr/>
-      </p:nvGrpSpPr>
-      <p:grpSpPr>
-        <a:xfrm>
-          <a:off x="0" y="0"/>
-          <a:ext cx="0" cy="0"/>
-          <a:chOff x="0" y="0"/>
-          <a:chExt cx="0" cy="0"/>
-        </a:xfrm>
-      </p:grpSpPr>
-      <p:sp>
-        <p:nvSpPr>
-          <p:cNvPr id="2" name="Titel 1"/>
-          <p:cNvSpPr>
-            <a:spLocks noGrp="1"/>
-          </p:cNvSpPr>
-          <p:nvPr>
-            <p:ph type="title"/>
-          </p:nvPr>
-        </p:nvSpPr>
-        <p:spPr/>
-        <p:txBody>
-          <a:bodyPr/>
-          <a:lstStyle/>
-          <a:p>
-            <a:r>
-              <a:rPr lang="nl-NL" dirty="0" smtClean="0"/>
-              <a:t>Hoe kon het beter</a:t>
-            </a:r>
-            <a:endParaRPr lang="nl-NL" dirty="0"/>
-          </a:p>
-        </p:txBody>
-      </p:sp>
-      <p:sp>
-        <p:nvSpPr>
-          <p:cNvPr id="3" name="Tijdelijke aanduiding voor inhoud 2"/>
-          <p:cNvSpPr>
-            <a:spLocks noGrp="1"/>
-          </p:cNvSpPr>
-          <p:nvPr>
-            <p:ph sz="quarter" idx="1"/>
-          </p:nvPr>
-        </p:nvSpPr>
-        <p:spPr/>
-        <p:txBody>
-          <a:bodyPr/>
-          <a:lstStyle/>
-          <a:p>
-            <a:r>
-              <a:rPr lang="nl-NL" dirty="0" smtClean="0"/>
-              <a:t>Structuur in </a:t>
-            </a:r>
-            <a:r>
-              <a:rPr lang="nl-NL" dirty="0" err="1" smtClean="0"/>
-              <a:t>to</a:t>
-            </a:r>
-            <a:r>
-              <a:rPr lang="nl-NL" dirty="0" smtClean="0"/>
-              <a:t>-do</a:t>
-            </a:r>
-          </a:p>
-          <a:p>
-            <a:r>
-              <a:rPr lang="nl-NL" dirty="0" smtClean="0"/>
-              <a:t>Iets </a:t>
-            </a:r>
-            <a:endParaRPr lang="nl-NL" dirty="0"/>
-          </a:p>
-        </p:txBody>
-      </p:sp>
-    </p:spTree>
-    <p:extLst>
-      <p:ext uri="{BB962C8B-B14F-4D97-AF65-F5344CB8AC3E}">
-        <p14:creationId xmlns:p14="http://schemas.microsoft.com/office/powerpoint/2010/main" val="3070980931"/>
-      </p:ext>
-    </p:extLst>
-  </p:cSld>
-  <p:clrMapOvr>
-    <a:masterClrMapping/>
-  </p:clrMapOvr>
-  <p:timing>
-    <p:tnLst>
-      <p:par>
-        <p:cTn id="1" dur="indefinite" restart="never" nodeType="tmRoot"/>
-      </p:par>
-    </p:tnLst>
-  </p:timing>
-</p:sld>
-</file>
-
-<file path=ppt/slides/slide14.xml><?xml version="1.0" encoding="utf-8"?>
-<p:sld xmlns:a="http://schemas.openxmlformats.org/drawingml/2006/main" xmlns:r="http://schemas.openxmlformats.org/officeDocument/2006/relationships" xmlns:p="http://schemas.openxmlformats.org/presentationml/2006/main">
-  <p:cSld>
-    <p:spTree>
-      <p:nvGrpSpPr>
-        <p:cNvPr id="1" name=""/>
-        <p:cNvGrpSpPr/>
-        <p:nvPr/>
-      </p:nvGrpSpPr>
-      <p:grpSpPr>
-        <a:xfrm>
-          <a:off x="0" y="0"/>
-          <a:ext cx="0" cy="0"/>
-          <a:chOff x="0" y="0"/>
-          <a:chExt cx="0" cy="0"/>
-        </a:xfrm>
-      </p:grpSpPr>
-      <p:sp>
-        <p:nvSpPr>
-          <p:cNvPr id="2" name="Titel 1"/>
-          <p:cNvSpPr>
-            <a:spLocks noGrp="1"/>
-          </p:cNvSpPr>
-          <p:nvPr>
-            <p:ph type="title"/>
-          </p:nvPr>
-        </p:nvSpPr>
-        <p:spPr/>
-        <p:txBody>
-          <a:bodyPr/>
-          <a:lstStyle/>
-          <a:p>
-            <a:r>
-              <a:rPr lang="nl-NL" dirty="0" smtClean="0"/>
-              <a:t>Mooi nawoord</a:t>
-            </a:r>
-            <a:endParaRPr lang="nl-NL" dirty="0"/>
-          </a:p>
-        </p:txBody>
-      </p:sp>
-      <p:sp>
-        <p:nvSpPr>
-          <p:cNvPr id="3" name="Tijdelijke aanduiding voor inhoud 2"/>
-          <p:cNvSpPr>
-            <a:spLocks noGrp="1"/>
-          </p:cNvSpPr>
-          <p:nvPr>
-            <p:ph sz="quarter" idx="1"/>
-          </p:nvPr>
-        </p:nvSpPr>
-        <p:spPr/>
-        <p:txBody>
-          <a:bodyPr/>
-          <a:lstStyle/>
-          <a:p>
-            <a:r>
-              <a:rPr lang="nl-NL" dirty="0" smtClean="0"/>
-              <a:t>Dit is echt helemaal mooi</a:t>
-            </a:r>
-          </a:p>
-          <a:p>
-            <a:r>
-              <a:rPr lang="nl-NL" dirty="0" smtClean="0"/>
-              <a:t>Iedereen die mooi is, mag nog wat vragen</a:t>
-            </a:r>
-          </a:p>
-          <a:p>
-            <a:endParaRPr lang="nl-NL" dirty="0"/>
-          </a:p>
-          <a:p>
-            <a:endParaRPr lang="nl-NL" dirty="0" smtClean="0"/>
-          </a:p>
-          <a:p>
-            <a:endParaRPr lang="nl-NL" dirty="0"/>
-          </a:p>
-          <a:p>
-            <a:r>
-              <a:rPr lang="nl-NL" sz="1400" dirty="0" smtClean="0"/>
-              <a:t>(Jullie zijn allemaal mooi)</a:t>
-            </a:r>
-            <a:endParaRPr lang="nl-NL" sz="1400" dirty="0"/>
-          </a:p>
-        </p:txBody>
-      </p:sp>
-    </p:spTree>
-    <p:extLst>
-      <p:ext uri="{BB962C8B-B14F-4D97-AF65-F5344CB8AC3E}">
-        <p14:creationId xmlns:p14="http://schemas.microsoft.com/office/powerpoint/2010/main" val="273009132"/>
       </p:ext>
     </p:extLst>
   </p:cSld>
@@ -6573,56 +6727,6 @@
           </p:nvPr>
         </p:nvPicPr>
         <p:blipFill>
-          <a:blip r:embed="rId2">
-            <a:extLst>
-              <a:ext uri="{28A0092B-C50C-407E-A947-70E740481C1C}">
-                <a14:useLocalDpi xmlns:a14="http://schemas.microsoft.com/office/drawing/2010/main" val="0"/>
-              </a:ext>
-            </a:extLst>
-          </a:blip>
-          <a:stretch>
-            <a:fillRect/>
-          </a:stretch>
-        </p:blipFill>
-        <p:spPr>
-          <a:xfrm>
-            <a:off x="107504" y="1124744"/>
-            <a:ext cx="5534761" cy="4525963"/>
-          </a:xfrm>
-        </p:spPr>
-      </p:pic>
-      <p:sp>
-        <p:nvSpPr>
-          <p:cNvPr id="2" name="Titel 1"/>
-          <p:cNvSpPr>
-            <a:spLocks noGrp="1"/>
-          </p:cNvSpPr>
-          <p:nvPr>
-            <p:ph type="title"/>
-          </p:nvPr>
-        </p:nvSpPr>
-        <p:spPr/>
-        <p:txBody>
-          <a:bodyPr/>
-          <a:lstStyle/>
-          <a:p>
-            <a:r>
-              <a:rPr lang="nl-NL" dirty="0" smtClean="0"/>
-              <a:t>Originele klassendiagrammen</a:t>
-            </a:r>
-            <a:endParaRPr lang="nl-NL" dirty="0"/>
-          </a:p>
-        </p:txBody>
-      </p:sp>
-      <p:pic>
-        <p:nvPicPr>
-          <p:cNvPr id="5" name="Afbeelding 4"/>
-          <p:cNvPicPr>
-            <a:picLocks noChangeAspect="1"/>
-          </p:cNvPicPr>
-          <p:nvPr/>
-        </p:nvPicPr>
-        <p:blipFill>
           <a:blip r:embed="rId3">
             <a:extLst>
               <a:ext uri="{28A0092B-C50C-407E-A947-70E740481C1C}">
@@ -6636,6 +6740,56 @@
         </p:blipFill>
         <p:spPr>
           <a:xfrm>
+            <a:off x="107504" y="1124744"/>
+            <a:ext cx="5534761" cy="4525963"/>
+          </a:xfrm>
+        </p:spPr>
+      </p:pic>
+      <p:sp>
+        <p:nvSpPr>
+          <p:cNvPr id="2" name="Titel 1"/>
+          <p:cNvSpPr>
+            <a:spLocks noGrp="1"/>
+          </p:cNvSpPr>
+          <p:nvPr>
+            <p:ph type="title"/>
+          </p:nvPr>
+        </p:nvSpPr>
+        <p:spPr/>
+        <p:txBody>
+          <a:bodyPr/>
+          <a:lstStyle/>
+          <a:p>
+            <a:r>
+              <a:rPr lang="nl-NL" dirty="0" smtClean="0"/>
+              <a:t>Originele klassendiagrammen</a:t>
+            </a:r>
+            <a:endParaRPr lang="nl-NL" dirty="0"/>
+          </a:p>
+        </p:txBody>
+      </p:sp>
+      <p:pic>
+        <p:nvPicPr>
+          <p:cNvPr id="5" name="Afbeelding 4"/>
+          <p:cNvPicPr>
+            <a:picLocks noChangeAspect="1"/>
+          </p:cNvPicPr>
+          <p:nvPr/>
+        </p:nvPicPr>
+        <p:blipFill>
+          <a:blip r:embed="rId4">
+            <a:extLst>
+              <a:ext uri="{28A0092B-C50C-407E-A947-70E740481C1C}">
+                <a14:useLocalDpi xmlns:a14="http://schemas.microsoft.com/office/drawing/2010/main" val="0"/>
+              </a:ext>
+            </a:extLst>
+          </a:blip>
+          <a:stretch>
+            <a:fillRect/>
+          </a:stretch>
+        </p:blipFill>
+        <p:spPr>
+          <a:xfrm>
             <a:off x="4427984" y="4450482"/>
             <a:ext cx="4667250" cy="2533650"/>
           </a:xfrm>
@@ -6654,6 +6808,13 @@
   <p:clrMapOvr>
     <a:masterClrMapping/>
   </p:clrMapOvr>
+  <p:timing>
+    <p:tnLst>
+      <p:par>
+        <p:cTn id="1" dur="indefinite" restart="never" nodeType="tmRoot"/>
+      </p:par>
+    </p:tnLst>
+  </p:timing>
 </p:sld>
 </file>
 
@@ -6691,59 +6852,45 @@
           <a:p>
             <a:r>
               <a:rPr lang="nl-NL" dirty="0" smtClean="0"/>
-              <a:t>Praktijk</a:t>
+              <a:t>Uiteindelijk klassendiagram</a:t>
             </a:r>
             <a:endParaRPr lang="nl-NL" dirty="0"/>
           </a:p>
         </p:txBody>
       </p:sp>
-      <p:sp>
-        <p:nvSpPr>
-          <p:cNvPr id="3" name="Tijdelijke aanduiding voor inhoud 2"/>
-          <p:cNvSpPr>
-            <a:spLocks noGrp="1"/>
-          </p:cNvSpPr>
-          <p:nvPr>
-            <p:ph sz="quarter" idx="1"/>
-          </p:nvPr>
-        </p:nvSpPr>
-        <p:spPr/>
-        <p:txBody>
-          <a:bodyPr/>
-          <a:lstStyle/>
-          <a:p>
-            <a:r>
-              <a:rPr lang="nl-NL" dirty="0" smtClean="0"/>
-              <a:t>Wat gedaan</a:t>
-            </a:r>
-          </a:p>
-          <a:p>
-            <a:pPr lvl="1"/>
-            <a:r>
-              <a:rPr lang="nl-NL" dirty="0" smtClean="0"/>
-              <a:t>Iets</a:t>
-            </a:r>
-          </a:p>
-          <a:p>
-            <a:r>
-              <a:rPr lang="nl-NL" dirty="0" smtClean="0"/>
-              <a:t>Wat niet gedaan</a:t>
-            </a:r>
-          </a:p>
-          <a:p>
-            <a:pPr lvl="1"/>
-            <a:r>
-              <a:rPr lang="nl-NL" dirty="0" smtClean="0"/>
-              <a:t>Iets anders</a:t>
-            </a:r>
-            <a:endParaRPr lang="nl-NL" dirty="0"/>
-          </a:p>
-        </p:txBody>
-      </p:sp>
+      <p:pic>
+        <p:nvPicPr>
+          <p:cNvPr id="4" name="Content Placeholder 3"/>
+          <p:cNvPicPr>
+            <a:picLocks noGrp="1" noChangeAspect="1"/>
+          </p:cNvPicPr>
+          <p:nvPr>
+            <p:ph idx="1"/>
+          </p:nvPr>
+        </p:nvPicPr>
+        <p:blipFill>
+          <a:blip r:embed="rId3">
+            <a:extLst>
+              <a:ext uri="{28A0092B-C50C-407E-A947-70E740481C1C}">
+                <a14:useLocalDpi xmlns:a14="http://schemas.microsoft.com/office/drawing/2010/main" val="0"/>
+              </a:ext>
+            </a:extLst>
+          </a:blip>
+          <a:stretch>
+            <a:fillRect/>
+          </a:stretch>
+        </p:blipFill>
+        <p:spPr>
+          <a:xfrm>
+            <a:off x="1331640" y="1484784"/>
+            <a:ext cx="5800725" cy="4743450"/>
+          </a:xfrm>
+        </p:spPr>
+      </p:pic>
     </p:spTree>
     <p:extLst>
       <p:ext uri="{BB962C8B-B14F-4D97-AF65-F5344CB8AC3E}">
-        <p14:creationId xmlns:p14="http://schemas.microsoft.com/office/powerpoint/2010/main" val="4099016534"/>
+        <p14:creationId xmlns:p14="http://schemas.microsoft.com/office/powerpoint/2010/main" val="923071329"/>
       </p:ext>
     </p:extLst>
   </p:cSld>
@@ -6777,9 +6924,50 @@
           <a:chExt cx="0" cy="0"/>
         </a:xfrm>
       </p:grpSpPr>
-      <p:sp>
-        <p:nvSpPr>
-          <p:cNvPr id="2" name="Titel 1"/>
+      <p:pic>
+        <p:nvPicPr>
+          <p:cNvPr id="3076" name="Picture 4" descr="https://si.wsj.net/public/resources/images/BN-LK314_MAGIC_J_20151123141056.jpg"/>
+          <p:cNvPicPr>
+            <a:picLocks noChangeAspect="1" noChangeArrowheads="1"/>
+          </p:cNvPicPr>
+          <p:nvPr/>
+        </p:nvPicPr>
+        <p:blipFill>
+          <a:blip r:embed="rId3">
+            <a:extLst>
+              <a:ext uri="{28A0092B-C50C-407E-A947-70E740481C1C}">
+                <a14:useLocalDpi xmlns:a14="http://schemas.microsoft.com/office/drawing/2010/main" val="0"/>
+              </a:ext>
+            </a:extLst>
+          </a:blip>
+          <a:srcRect/>
+          <a:stretch>
+            <a:fillRect/>
+          </a:stretch>
+        </p:blipFill>
+        <p:spPr bwMode="auto">
+          <a:xfrm>
+            <a:off x="187598" y="620688"/>
+            <a:ext cx="8636245" cy="5760640"/>
+          </a:xfrm>
+          <a:prstGeom prst="rect">
+            <a:avLst/>
+          </a:prstGeom>
+          <a:noFill/>
+          <a:extLst>
+            <a:ext uri="{909E8E84-426E-40DD-AFC4-6F175D3DCCD1}">
+              <a14:hiddenFill xmlns:a14="http://schemas.microsoft.com/office/drawing/2010/main">
+                <a:solidFill>
+                  <a:srgbClr val="FFFFFF"/>
+                </a:solidFill>
+              </a14:hiddenFill>
+            </a:ext>
+          </a:extLst>
+        </p:spPr>
+      </p:pic>
+      <p:sp>
+        <p:nvSpPr>
+          <p:cNvPr id="4" name="Title 3"/>
           <p:cNvSpPr>
             <a:spLocks noGrp="1"/>
           </p:cNvSpPr>
@@ -6793,73 +6981,38 @@
           <a:lstStyle/>
           <a:p>
             <a:r>
-              <a:rPr lang="nl-NL" dirty="0" smtClean="0"/>
-              <a:t>Uiteindelijk klassendiagram</a:t>
-            </a:r>
-            <a:endParaRPr lang="nl-NL" dirty="0"/>
-          </a:p>
-        </p:txBody>
-      </p:sp>
-      <p:sp>
-        <p:nvSpPr>
-          <p:cNvPr id="3" name="Tijdelijke aanduiding voor inhoud 2"/>
-          <p:cNvSpPr>
-            <a:spLocks noGrp="1"/>
-          </p:cNvSpPr>
-          <p:nvPr>
-            <p:ph idx="1"/>
-          </p:nvPr>
-        </p:nvSpPr>
-        <p:spPr/>
-        <p:txBody>
-          <a:bodyPr/>
-          <a:lstStyle/>
-          <a:p>
-            <a:r>
-              <a:rPr lang="nl-NL" dirty="0" smtClean="0"/>
-              <a:t>Moet je nog tekenen! Maar doe maar alleen van de model klassen, niet van de controllers enz.</a:t>
-            </a:r>
-          </a:p>
-          <a:p>
-            <a:r>
-              <a:rPr lang="nl-NL" dirty="0" smtClean="0"/>
-              <a:t>Waarom is dat anders?</a:t>
-            </a:r>
-          </a:p>
-          <a:p>
-            <a:pPr lvl="1"/>
-            <a:r>
-              <a:rPr lang="nl-NL" dirty="0" smtClean="0"/>
-              <a:t>Tijdsgebrek</a:t>
-            </a:r>
-          </a:p>
-          <a:p>
-            <a:pPr lvl="1"/>
-            <a:r>
-              <a:rPr lang="nl-NL" dirty="0" smtClean="0"/>
-              <a:t>Praktische overwegingen (windstreek weg, bordkolom erbij)</a:t>
-            </a:r>
-          </a:p>
-          <a:p>
-            <a:pPr lvl="1"/>
-            <a:r>
-              <a:rPr lang="nl-NL" smtClean="0"/>
-              <a:t>…</a:t>
-            </a:r>
-            <a:endParaRPr lang="nl-NL" dirty="0"/>
+              <a:rPr lang="en-US" dirty="0" smtClean="0">
+                <a:solidFill>
+                  <a:schemeClr val="bg1"/>
+                </a:solidFill>
+              </a:rPr>
+              <a:t>DEMO</a:t>
+            </a:r>
+            <a:endParaRPr lang="en-US" dirty="0">
+              <a:solidFill>
+                <a:schemeClr val="bg1"/>
+              </a:solidFill>
+            </a:endParaRPr>
           </a:p>
         </p:txBody>
       </p:sp>
     </p:spTree>
     <p:extLst>
       <p:ext uri="{BB962C8B-B14F-4D97-AF65-F5344CB8AC3E}">
-        <p14:creationId xmlns:p14="http://schemas.microsoft.com/office/powerpoint/2010/main" val="923071329"/>
+        <p14:creationId xmlns:p14="http://schemas.microsoft.com/office/powerpoint/2010/main" val="1168195213"/>
       </p:ext>
     </p:extLst>
   </p:cSld>
   <p:clrMapOvr>
     <a:masterClrMapping/>
   </p:clrMapOvr>
+  <p:timing>
+    <p:tnLst>
+      <p:par>
+        <p:cTn id="1" dur="indefinite" restart="never" nodeType="tmRoot"/>
+      </p:par>
+    </p:tnLst>
+  </p:timing>
 </p:sld>
 </file>
 
@@ -6880,6 +7033,129 @@
           <a:chExt cx="0" cy="0"/>
         </a:xfrm>
       </p:grpSpPr>
+      <p:pic>
+        <p:nvPicPr>
+          <p:cNvPr id="1032" name="Picture 8" descr="http://orig08.deviantart.net/dc9b/f/2012/245/a/6/lost_in_cornfield_by_mustake-d5da7au.jpg"/>
+          <p:cNvPicPr>
+            <a:picLocks noChangeAspect="1" noChangeArrowheads="1"/>
+          </p:cNvPicPr>
+          <p:nvPr/>
+        </p:nvPicPr>
+        <p:blipFill>
+          <a:blip r:embed="rId3">
+            <a:extLst>
+              <a:ext uri="{28A0092B-C50C-407E-A947-70E740481C1C}">
+                <a14:useLocalDpi xmlns:a14="http://schemas.microsoft.com/office/drawing/2010/main" val="0"/>
+              </a:ext>
+            </a:extLst>
+          </a:blip>
+          <a:srcRect/>
+          <a:stretch>
+            <a:fillRect/>
+          </a:stretch>
+        </p:blipFill>
+        <p:spPr bwMode="auto">
+          <a:xfrm>
+            <a:off x="179512" y="4210819"/>
+            <a:ext cx="3498766" cy="2415176"/>
+          </a:xfrm>
+          <a:prstGeom prst="rect">
+            <a:avLst/>
+          </a:prstGeom>
+          <a:noFill/>
+          <a:extLst>
+            <a:ext uri="{909E8E84-426E-40DD-AFC4-6F175D3DCCD1}">
+              <a14:hiddenFill xmlns:a14="http://schemas.microsoft.com/office/drawing/2010/main">
+                <a:solidFill>
+                  <a:srgbClr val="FFFFFF"/>
+                </a:solidFill>
+              </a14:hiddenFill>
+            </a:ext>
+          </a:extLst>
+        </p:spPr>
+      </p:pic>
+      <p:pic>
+        <p:nvPicPr>
+          <p:cNvPr id="1034" name="Picture 10" descr="http://www.stthomas.edu/media/schooloflaw/lawlibrarytest/writing.jpg"/>
+          <p:cNvPicPr>
+            <a:picLocks noChangeAspect="1" noChangeArrowheads="1"/>
+          </p:cNvPicPr>
+          <p:nvPr/>
+        </p:nvPicPr>
+        <p:blipFill>
+          <a:blip r:embed="rId4">
+            <a:extLst>
+              <a:ext uri="{28A0092B-C50C-407E-A947-70E740481C1C}">
+                <a14:useLocalDpi xmlns:a14="http://schemas.microsoft.com/office/drawing/2010/main" val="0"/>
+              </a:ext>
+            </a:extLst>
+          </a:blip>
+          <a:srcRect/>
+          <a:stretch>
+            <a:fillRect/>
+          </a:stretch>
+        </p:blipFill>
+        <p:spPr bwMode="auto">
+          <a:xfrm>
+            <a:off x="4776076" y="954711"/>
+            <a:ext cx="3945532" cy="2304256"/>
+          </a:xfrm>
+          <a:prstGeom prst="rect">
+            <a:avLst/>
+          </a:prstGeom>
+          <a:noFill/>
+          <a:extLst>
+            <a:ext uri="{909E8E84-426E-40DD-AFC4-6F175D3DCCD1}">
+              <a14:hiddenFill xmlns:a14="http://schemas.microsoft.com/office/drawing/2010/main">
+                <a:solidFill>
+                  <a:srgbClr val="FFFFFF"/>
+                </a:solidFill>
+              </a14:hiddenFill>
+            </a:ext>
+          </a:extLst>
+        </p:spPr>
+      </p:pic>
+      <p:pic>
+        <p:nvPicPr>
+          <p:cNvPr id="1028" name="Picture 4" descr="http://blogs-images.forbes.com/amyanderson/files/2014/06/shutterstock_62989189.jpg?width=960"/>
+          <p:cNvPicPr>
+            <a:picLocks noChangeAspect="1" noChangeArrowheads="1"/>
+          </p:cNvPicPr>
+          <p:nvPr/>
+        </p:nvPicPr>
+        <p:blipFill>
+          <a:blip r:embed="rId5">
+            <a:extLst>
+              <a:ext uri="{28A0092B-C50C-407E-A947-70E740481C1C}">
+                <a14:useLocalDpi xmlns:a14="http://schemas.microsoft.com/office/drawing/2010/main" val="0"/>
+              </a:ext>
+            </a:extLst>
+          </a:blip>
+          <a:srcRect/>
+          <a:stretch>
+            <a:fillRect/>
+          </a:stretch>
+        </p:blipFill>
+        <p:spPr bwMode="auto">
+          <a:xfrm>
+            <a:off x="179512" y="407749"/>
+            <a:ext cx="4818467" cy="3789040"/>
+          </a:xfrm>
+          <a:prstGeom prst="rect">
+            <a:avLst/>
+          </a:prstGeom>
+          <a:noFill/>
+          <a:extLst>
+            <a:ext uri="{909E8E84-426E-40DD-AFC4-6F175D3DCCD1}">
+              <a14:hiddenFill xmlns:a14="http://schemas.microsoft.com/office/drawing/2010/main">
+                <a:solidFill>
+                  <a:srgbClr val="FFFFFF"/>
+                </a:solidFill>
+              </a14:hiddenFill>
+            </a:ext>
+          </a:extLst>
+        </p:spPr>
+      </p:pic>
       <p:sp>
         <p:nvSpPr>
           <p:cNvPr id="2" name="Titel 1"/>
@@ -6890,75 +7166,112 @@
             <p:ph type="title"/>
           </p:nvPr>
         </p:nvSpPr>
-        <p:spPr/>
-        <p:txBody>
-          <a:bodyPr/>
-          <a:lstStyle/>
-          <a:p>
-            <a:r>
-              <a:rPr lang="nl-NL" dirty="0" smtClean="0"/>
-              <a:t>Demo</a:t>
-            </a:r>
-            <a:endParaRPr lang="nl-NL" dirty="0"/>
-          </a:p>
-        </p:txBody>
-      </p:sp>
-      <p:sp>
-        <p:nvSpPr>
-          <p:cNvPr id="3" name="Tijdelijke aanduiding voor inhoud 2"/>
-          <p:cNvSpPr>
-            <a:spLocks noGrp="1"/>
-          </p:cNvSpPr>
-          <p:nvPr>
-            <p:ph sz="quarter" idx="1"/>
-          </p:nvPr>
-        </p:nvSpPr>
-        <p:spPr/>
-        <p:txBody>
-          <a:bodyPr/>
-          <a:lstStyle/>
-          <a:p>
-            <a:r>
-              <a:rPr lang="nl-NL" dirty="0" smtClean="0"/>
-              <a:t>Linkje naar site</a:t>
-            </a:r>
-            <a:r>
-              <a:rPr lang="nl-NL" dirty="0"/>
-              <a:t>: </a:t>
-            </a:r>
-            <a:r>
-              <a:rPr lang="nl-NL" dirty="0">
-                <a:hlinkClick r:id="rId3"/>
-              </a:rPr>
-              <a:t>http://10.2.20.105:8080/</a:t>
-            </a:r>
-            <a:endParaRPr lang="nl-NL" dirty="0"/>
-          </a:p>
-          <a:p>
-            <a:r>
-              <a:rPr lang="nl-NL" dirty="0" smtClean="0"/>
-              <a:t>(Canvas draaien</a:t>
-            </a:r>
-          </a:p>
-          <a:p>
-            <a:r>
-              <a:rPr lang="nl-NL" dirty="0" smtClean="0"/>
-              <a:t>Bootjeswinkel</a:t>
-            </a:r>
-          </a:p>
-          <a:p>
-            <a:r>
-              <a:rPr lang="nl-NL" dirty="0" smtClean="0"/>
-              <a:t>Database)</a:t>
-            </a:r>
-            <a:endParaRPr lang="nl-NL" dirty="0"/>
-          </a:p>
-        </p:txBody>
-      </p:sp>
+        <p:spPr>
+          <a:xfrm>
+            <a:off x="390445" y="-30814"/>
+            <a:ext cx="7467600" cy="1143000"/>
+          </a:xfrm>
+        </p:spPr>
+        <p:txBody>
+          <a:bodyPr>
+            <a:noAutofit/>
+          </a:bodyPr>
+          <a:lstStyle/>
+          <a:p>
+            <a:r>
+              <a:rPr lang="nl-NL" sz="4400" b="1" dirty="0" smtClean="0"/>
+              <a:t>Leerproces Jenny</a:t>
+            </a:r>
+            <a:endParaRPr lang="nl-NL" sz="4400" b="1" dirty="0"/>
+          </a:p>
+        </p:txBody>
+      </p:sp>
+      <p:pic>
+        <p:nvPicPr>
+          <p:cNvPr id="1026" name="Picture 2" descr="http://peteradcockportfolio.weebly.com/uploads/1/9/2/6/19269507/1185258_orig.jpg"/>
+          <p:cNvPicPr>
+            <a:picLocks noChangeAspect="1" noChangeArrowheads="1"/>
+          </p:cNvPicPr>
+          <p:nvPr/>
+        </p:nvPicPr>
+        <p:blipFill>
+          <a:blip r:embed="rId6">
+            <a:extLst>
+              <a:ext uri="{28A0092B-C50C-407E-A947-70E740481C1C}">
+                <a14:useLocalDpi xmlns:a14="http://schemas.microsoft.com/office/drawing/2010/main" val="0"/>
+              </a:ext>
+            </a:extLst>
+          </a:blip>
+          <a:srcRect/>
+          <a:stretch>
+            <a:fillRect/>
+          </a:stretch>
+        </p:blipFill>
+        <p:spPr bwMode="auto">
+          <a:xfrm>
+            <a:off x="3678278" y="3416442"/>
+            <a:ext cx="2129845" cy="3209553"/>
+          </a:xfrm>
+          <a:prstGeom prst="rect">
+            <a:avLst/>
+          </a:prstGeom>
+          <a:noFill/>
+          <a:extLst>
+            <a:ext uri="{909E8E84-426E-40DD-AFC4-6F175D3DCCD1}">
+              <a14:hiddenFill xmlns:a14="http://schemas.microsoft.com/office/drawing/2010/main">
+                <a:solidFill>
+                  <a:srgbClr val="FFFFFF"/>
+                </a:solidFill>
+              </a14:hiddenFill>
+            </a:ext>
+          </a:extLst>
+        </p:spPr>
+      </p:pic>
+      <p:pic>
+        <p:nvPicPr>
+          <p:cNvPr id="1030" name="Picture 6" descr="https://erinjoansnyder.files.wordpress.com/2014/04/merge_conflicts.jpg?w=640"/>
+          <p:cNvPicPr>
+            <a:picLocks noChangeAspect="1" noChangeArrowheads="1"/>
+          </p:cNvPicPr>
+          <p:nvPr/>
+        </p:nvPicPr>
+        <p:blipFill>
+          <a:blip r:embed="rId7">
+            <a:extLst>
+              <a:ext uri="{28A0092B-C50C-407E-A947-70E740481C1C}">
+                <a14:useLocalDpi xmlns:a14="http://schemas.microsoft.com/office/drawing/2010/main" val="0"/>
+              </a:ext>
+            </a:extLst>
+          </a:blip>
+          <a:srcRect/>
+          <a:stretch>
+            <a:fillRect/>
+          </a:stretch>
+        </p:blipFill>
+        <p:spPr bwMode="auto">
+          <a:xfrm>
+            <a:off x="5868144" y="3284984"/>
+            <a:ext cx="2865412" cy="3443826"/>
+          </a:xfrm>
+          <a:prstGeom prst="rect">
+            <a:avLst/>
+          </a:prstGeom>
+          <a:noFill/>
+          <a:extLst>
+            <a:ext uri="{909E8E84-426E-40DD-AFC4-6F175D3DCCD1}">
+              <a14:hiddenFill xmlns:a14="http://schemas.microsoft.com/office/drawing/2010/main">
+                <a:solidFill>
+                  <a:srgbClr val="FFFFFF"/>
+                </a:solidFill>
+              </a14:hiddenFill>
+            </a:ext>
+          </a:extLst>
+        </p:spPr>
+      </p:pic>
     </p:spTree>
     <p:extLst>
       <p:ext uri="{BB962C8B-B14F-4D97-AF65-F5344CB8AC3E}">
-        <p14:creationId xmlns:p14="http://schemas.microsoft.com/office/powerpoint/2010/main" val="1706364572"/>
+        <p14:creationId xmlns:p14="http://schemas.microsoft.com/office/powerpoint/2010/main" val="3961685479"/>
       </p:ext>
     </p:extLst>
   </p:cSld>
@@ -7009,7 +7322,11 @@
           <a:p>
             <a:r>
               <a:rPr lang="nl-NL" dirty="0" smtClean="0"/>
-              <a:t>Bootjeswinkel</a:t>
+              <a:t>Leerproces </a:t>
+            </a:r>
+            <a:r>
+              <a:rPr lang="nl-NL" dirty="0" err="1" smtClean="0"/>
+              <a:t>Feia</a:t>
             </a:r>
             <a:endParaRPr lang="nl-NL" dirty="0"/>
           </a:p>
@@ -7022,7 +7339,7 @@
             <a:spLocks noGrp="1"/>
           </p:cNvSpPr>
           <p:nvPr>
-            <p:ph idx="1"/>
+            <p:ph sz="quarter" idx="1"/>
           </p:nvPr>
         </p:nvSpPr>
         <p:spPr/>
@@ -7032,36 +7349,21 @@
           <a:p>
             <a:r>
               <a:rPr lang="nl-NL" dirty="0" smtClean="0"/>
-              <a:t>Waarom is de bootjeswinkel cool?</a:t>
-            </a:r>
-          </a:p>
-          <a:p>
-            <a:endParaRPr lang="nl-NL" dirty="0" smtClean="0"/>
-          </a:p>
-          <a:p>
-            <a:pPr lvl="1"/>
+              <a:t>Structuur in </a:t>
+            </a:r>
+            <a:r>
+              <a:rPr lang="nl-NL" dirty="0" err="1" smtClean="0"/>
+              <a:t>to</a:t>
+            </a:r>
             <a:r>
               <a:rPr lang="nl-NL" dirty="0" smtClean="0"/>
-              <a:t>Eerste ding wat werkte (mijn kindje)</a:t>
-            </a:r>
-          </a:p>
-          <a:p>
-            <a:pPr lvl="1"/>
-            <a:endParaRPr lang="nl-NL" dirty="0" smtClean="0"/>
-          </a:p>
-          <a:p>
-            <a:pPr lvl="1"/>
+              <a:t>-do</a:t>
+            </a:r>
+          </a:p>
+          <a:p>
             <a:r>
               <a:rPr lang="nl-NL" dirty="0" smtClean="0"/>
-              <a:t>Daarna eerste ding wat naar </a:t>
-            </a:r>
-            <a:r>
-              <a:rPr lang="nl-NL" dirty="0" err="1" smtClean="0"/>
-              <a:t>jquery</a:t>
-            </a:r>
-            <a:r>
-              <a:rPr lang="nl-NL" dirty="0" smtClean="0"/>
-              <a:t> was gebouwd</a:t>
+              <a:t>Iets </a:t>
             </a:r>
             <a:endParaRPr lang="nl-NL" dirty="0"/>
           </a:p>
@@ -7070,13 +7372,20 @@
     </p:spTree>
     <p:extLst>
       <p:ext uri="{BB962C8B-B14F-4D97-AF65-F5344CB8AC3E}">
-        <p14:creationId xmlns:p14="http://schemas.microsoft.com/office/powerpoint/2010/main" val="2642701995"/>
+        <p14:creationId xmlns:p14="http://schemas.microsoft.com/office/powerpoint/2010/main" val="3070980931"/>
       </p:ext>
     </p:extLst>
   </p:cSld>
   <p:clrMapOvr>
     <a:masterClrMapping/>
   </p:clrMapOvr>
+  <p:timing>
+    <p:tnLst>
+      <p:par>
+        <p:cTn id="1" dur="indefinite" restart="never" nodeType="tmRoot"/>
+      </p:par>
+    </p:tnLst>
+  </p:timing>
 </p:sld>
 </file>
 
@@ -7113,8 +7422,20 @@
           <a:lstStyle/>
           <a:p>
             <a:r>
+              <a:rPr lang="nl-NL" dirty="0" err="1" smtClean="0"/>
+              <a:t>Any</a:t>
+            </a:r>
+            <a:r>
               <a:rPr lang="nl-NL" dirty="0" smtClean="0"/>
-              <a:t>Bootjeswinkel</a:t>
+              <a:t> </a:t>
+            </a:r>
+            <a:r>
+              <a:rPr lang="nl-NL" dirty="0" err="1" smtClean="0"/>
+              <a:t>questions</a:t>
+            </a:r>
+            <a:r>
+              <a:rPr lang="nl-NL" dirty="0" smtClean="0"/>
+              <a:t>?</a:t>
             </a:r>
             <a:endParaRPr lang="nl-NL" dirty="0"/>
           </a:p>
@@ -7122,12 +7443,12 @@
       </p:sp>
       <p:sp>
         <p:nvSpPr>
-          <p:cNvPr id="3" name="Tijdelijke aanduiding voor inhoud 2"/>
-          <p:cNvSpPr>
-            <a:spLocks noGrp="1"/>
-          </p:cNvSpPr>
-          <p:nvPr>
-            <p:ph idx="1"/>
+          <p:cNvPr id="4" name="Content Placeholder 3"/>
+          <p:cNvSpPr>
+            <a:spLocks noGrp="1"/>
+          </p:cNvSpPr>
+          <p:nvPr>
+            <p:ph sz="quarter" idx="1"/>
           </p:nvPr>
         </p:nvSpPr>
         <p:spPr/>
@@ -7135,158 +7456,66 @@
           <a:bodyPr/>
           <a:lstStyle/>
           <a:p>
-            <a:r>
-              <a:rPr lang="nl-NL" dirty="0" smtClean="0"/>
-              <a:t>Wat doet het?</a:t>
-            </a:r>
-          </a:p>
-          <a:p>
-            <a:pPr lvl="1"/>
-            <a:r>
-              <a:rPr lang="nl-NL" dirty="0" smtClean="0"/>
-              <a:t>Weergave van de bootjes die je kunt kopen</a:t>
-            </a:r>
-          </a:p>
-          <a:p>
-            <a:pPr lvl="1"/>
-            <a:r>
-              <a:rPr lang="nl-NL" dirty="0" smtClean="0"/>
-              <a:t>Als je op een bootje klikt, en je hebt genoeg “geld”, koopt de huidige speler deze en komt hij in diens inventaris</a:t>
-            </a:r>
-          </a:p>
-          <a:p>
-            <a:pPr lvl="1"/>
-            <a:r>
-              <a:rPr lang="nl-NL" dirty="0" smtClean="0"/>
-              <a:t>De bootjeswinkel wordt automatisch aangevuld tot een gegeven aantal bootjes</a:t>
-            </a:r>
-          </a:p>
-          <a:p>
-            <a:pPr lvl="1"/>
-            <a:r>
-              <a:rPr lang="nl-NL" dirty="0" smtClean="0"/>
-              <a:t>Als de bootjes op zijn, is de winkel gewoon leeg</a:t>
-            </a:r>
-          </a:p>
-          <a:p>
-            <a:pPr lvl="1"/>
-            <a:r>
-              <a:rPr lang="nl-NL" dirty="0" smtClean="0"/>
-              <a:t>(</a:t>
-            </a:r>
-            <a:r>
-              <a:rPr lang="nl-NL" dirty="0" err="1" smtClean="0"/>
-              <a:t>Evt</a:t>
-            </a:r>
-            <a:r>
-              <a:rPr lang="nl-NL" dirty="0" smtClean="0"/>
-              <a:t> nog verhaal over </a:t>
-            </a:r>
-            <a:r>
-              <a:rPr lang="nl-NL" dirty="0" err="1" smtClean="0"/>
-              <a:t>sessions</a:t>
-            </a:r>
-            <a:r>
-              <a:rPr lang="nl-NL" dirty="0" smtClean="0"/>
-              <a:t>)</a:t>
-            </a:r>
-            <a:endParaRPr lang="nl-NL" dirty="0"/>
-          </a:p>
-        </p:txBody>
-      </p:sp>
+            <a:endParaRPr lang="en-US"/>
+          </a:p>
+        </p:txBody>
+      </p:sp>
+      <p:pic>
+        <p:nvPicPr>
+          <p:cNvPr id="4098" name="Picture 2" descr="http://news.bbc.co.uk/media/images/46942000/jpg/_46942801_766_hands.jpg"/>
+          <p:cNvPicPr>
+            <a:picLocks noChangeAspect="1" noChangeArrowheads="1"/>
+          </p:cNvPicPr>
+          <p:nvPr/>
+        </p:nvPicPr>
+        <p:blipFill rotWithShape="1">
+          <a:blip r:embed="rId3">
+            <a:extLst>
+              <a:ext uri="{28A0092B-C50C-407E-A947-70E740481C1C}">
+                <a14:useLocalDpi xmlns:a14="http://schemas.microsoft.com/office/drawing/2010/main" val="0"/>
+              </a:ext>
+            </a:extLst>
+          </a:blip>
+          <a:srcRect b="3466"/>
+          <a:stretch/>
+        </p:blipFill>
+        <p:spPr bwMode="auto">
+          <a:xfrm>
+            <a:off x="229641" y="1484784"/>
+            <a:ext cx="8577504" cy="5004916"/>
+          </a:xfrm>
+          <a:prstGeom prst="rect">
+            <a:avLst/>
+          </a:prstGeom>
+          <a:noFill/>
+          <a:extLst>
+            <a:ext uri="{909E8E84-426E-40DD-AFC4-6F175D3DCCD1}">
+              <a14:hiddenFill xmlns:a14="http://schemas.microsoft.com/office/drawing/2010/main">
+                <a:solidFill>
+                  <a:srgbClr val="FFFFFF"/>
+                </a:solidFill>
+              </a14:hiddenFill>
+            </a:ext>
+          </a:extLst>
+        </p:spPr>
+      </p:pic>
     </p:spTree>
     <p:extLst>
       <p:ext uri="{BB962C8B-B14F-4D97-AF65-F5344CB8AC3E}">
-        <p14:creationId xmlns:p14="http://schemas.microsoft.com/office/powerpoint/2010/main" val="3437739375"/>
+        <p14:creationId xmlns:p14="http://schemas.microsoft.com/office/powerpoint/2010/main" val="273009132"/>
       </p:ext>
     </p:extLst>
   </p:cSld>
   <p:clrMapOvr>
     <a:masterClrMapping/>
   </p:clrMapOvr>
-</p:sld>
-</file>
-
-<file path=ppt/slides/slide9.xml><?xml version="1.0" encoding="utf-8"?>
-<p:sld xmlns:a="http://schemas.openxmlformats.org/drawingml/2006/main" xmlns:r="http://schemas.openxmlformats.org/officeDocument/2006/relationships" xmlns:p="http://schemas.openxmlformats.org/presentationml/2006/main">
-  <p:cSld>
-    <p:spTree>
-      <p:nvGrpSpPr>
-        <p:cNvPr id="1" name=""/>
-        <p:cNvGrpSpPr/>
-        <p:nvPr/>
-      </p:nvGrpSpPr>
-      <p:grpSpPr>
-        <a:xfrm>
-          <a:off x="0" y="0"/>
-          <a:ext cx="0" cy="0"/>
-          <a:chOff x="0" y="0"/>
-          <a:chExt cx="0" cy="0"/>
-        </a:xfrm>
-      </p:grpSpPr>
-      <p:sp>
-        <p:nvSpPr>
-          <p:cNvPr id="2" name="Titel 1"/>
-          <p:cNvSpPr>
-            <a:spLocks noGrp="1"/>
-          </p:cNvSpPr>
-          <p:nvPr>
-            <p:ph type="title"/>
-          </p:nvPr>
-        </p:nvSpPr>
-        <p:spPr/>
-        <p:txBody>
-          <a:bodyPr/>
-          <a:lstStyle/>
-          <a:p>
-            <a:r>
-              <a:rPr lang="nl-NL" dirty="0" smtClean="0"/>
-              <a:t>Bootjeswinkel</a:t>
-            </a:r>
-            <a:endParaRPr lang="nl-NL" dirty="0"/>
-          </a:p>
-        </p:txBody>
-      </p:sp>
-      <p:sp>
-        <p:nvSpPr>
-          <p:cNvPr id="3" name="Tijdelijke aanduiding voor inhoud 2"/>
-          <p:cNvSpPr>
-            <a:spLocks noGrp="1"/>
-          </p:cNvSpPr>
-          <p:nvPr>
-            <p:ph idx="1"/>
-          </p:nvPr>
-        </p:nvSpPr>
-        <p:spPr/>
-        <p:txBody>
-          <a:bodyPr/>
-          <a:lstStyle/>
-          <a:p>
-            <a:r>
-              <a:rPr lang="nl-NL" dirty="0" smtClean="0"/>
-              <a:t>Data ophalen uit de database</a:t>
-            </a:r>
-          </a:p>
-          <a:p>
-            <a:pPr lvl="1"/>
-            <a:r>
-              <a:rPr lang="nl-NL" dirty="0" smtClean="0"/>
-              <a:t>Pseudocode?</a:t>
-            </a:r>
-            <a:endParaRPr lang="nl-NL" dirty="0"/>
-          </a:p>
-        </p:txBody>
-      </p:sp>
-    </p:spTree>
-    <p:extLst>
-      <p:ext uri="{BB962C8B-B14F-4D97-AF65-F5344CB8AC3E}">
-        <p14:creationId xmlns:p14="http://schemas.microsoft.com/office/powerpoint/2010/main" val="2928454808"/>
-      </p:ext>
-    </p:extLst>
-  </p:cSld>
-  <p:clrMapOvr>
-    <a:masterClrMapping/>
-  </p:clrMapOvr>
+  <p:timing>
+    <p:tnLst>
+      <p:par>
+        <p:cTn id="1" dur="indefinite" restart="never" nodeType="tmRoot"/>
+      </p:par>
+    </p:tnLst>
+  </p:timing>
 </p:sld>
 </file>
 

</xml_diff>